<commit_message>
updates made to project flow powerpoint
</commit_message>
<xml_diff>
--- a/rtquicProjectFlow.pptx
+++ b/rtquicProjectFlow.pptx
@@ -4,8 +4,12 @@
   <p:sldMasterIdLst>
     <p:sldMasterId id="2147483648" r:id="rId4"/>
   </p:sldMasterIdLst>
+  <p:notesMasterIdLst>
+    <p:notesMasterId r:id="rId7"/>
+  </p:notesMasterIdLst>
   <p:sldIdLst>
     <p:sldId id="257" r:id="rId5"/>
+    <p:sldId id="258" r:id="rId6"/>
   </p:sldIdLst>
   <p:sldSz cx="12192000" cy="6858000"/>
   <p:notesSz cx="6858000" cy="9144000"/>
@@ -104,7 +108,1080 @@
       </a:defRPr>
     </a:lvl9pPr>
   </p:defaultTextStyle>
+  <p:extLst>
+    <p:ext uri="{EFAFB233-063F-42B5-8137-9DF3F51BA10A}">
+      <p15:sldGuideLst xmlns:p15="http://schemas.microsoft.com/office/powerpoint/2012/main"/>
+    </p:ext>
+  </p:extLst>
 </p:presentation>
+</file>
+
+<file path=ppt/notesMasters/notesMaster1.xml><?xml version="1.0" encoding="utf-8"?>
+<p:notesMaster xmlns:a="http://schemas.openxmlformats.org/drawingml/2006/main" xmlns:r="http://schemas.openxmlformats.org/officeDocument/2006/relationships" xmlns:p="http://schemas.openxmlformats.org/presentationml/2006/main">
+  <p:cSld>
+    <p:bg>
+      <p:bgRef idx="1001">
+        <a:schemeClr val="bg1"/>
+      </p:bgRef>
+    </p:bg>
+    <p:spTree>
+      <p:nvGrpSpPr>
+        <p:cNvPr id="1" name=""/>
+        <p:cNvGrpSpPr/>
+        <p:nvPr/>
+      </p:nvGrpSpPr>
+      <p:grpSpPr>
+        <a:xfrm>
+          <a:off x="0" y="0"/>
+          <a:ext cx="0" cy="0"/>
+          <a:chOff x="0" y="0"/>
+          <a:chExt cx="0" cy="0"/>
+        </a:xfrm>
+      </p:grpSpPr>
+      <p:sp>
+        <p:nvSpPr>
+          <p:cNvPr id="2" name="Header Placeholder 1"/>
+          <p:cNvSpPr>
+            <a:spLocks noGrp="1"/>
+          </p:cNvSpPr>
+          <p:nvPr>
+            <p:ph type="hdr" sz="quarter"/>
+          </p:nvPr>
+        </p:nvSpPr>
+        <p:spPr>
+          <a:xfrm>
+            <a:off x="0" y="0"/>
+            <a:ext cx="2971800" cy="458788"/>
+          </a:xfrm>
+          <a:prstGeom prst="rect">
+            <a:avLst/>
+          </a:prstGeom>
+        </p:spPr>
+        <p:txBody>
+          <a:bodyPr vert="horz" lIns="91440" tIns="45720" rIns="91440" bIns="45720" rtlCol="0"/>
+          <a:lstStyle>
+            <a:lvl1pPr algn="l">
+              <a:defRPr sz="1200"/>
+            </a:lvl1pPr>
+          </a:lstStyle>
+          <a:p>
+            <a:endParaRPr lang="en-GB"/>
+          </a:p>
+        </p:txBody>
+      </p:sp>
+      <p:sp>
+        <p:nvSpPr>
+          <p:cNvPr id="3" name="Date Placeholder 2"/>
+          <p:cNvSpPr>
+            <a:spLocks noGrp="1"/>
+          </p:cNvSpPr>
+          <p:nvPr>
+            <p:ph type="dt" idx="1"/>
+          </p:nvPr>
+        </p:nvSpPr>
+        <p:spPr>
+          <a:xfrm>
+            <a:off x="3884613" y="0"/>
+            <a:ext cx="2971800" cy="458788"/>
+          </a:xfrm>
+          <a:prstGeom prst="rect">
+            <a:avLst/>
+          </a:prstGeom>
+        </p:spPr>
+        <p:txBody>
+          <a:bodyPr vert="horz" lIns="91440" tIns="45720" rIns="91440" bIns="45720" rtlCol="0"/>
+          <a:lstStyle>
+            <a:lvl1pPr algn="r">
+              <a:defRPr sz="1200"/>
+            </a:lvl1pPr>
+          </a:lstStyle>
+          <a:p>
+            <a:fld id="{6ACC95B4-A8D6-484E-BAB1-BF699BEA950E}" type="datetimeFigureOut">
+              <a:rPr lang="en-GB" smtClean="0"/>
+              <a:t>23/09/2019</a:t>
+            </a:fld>
+            <a:endParaRPr lang="en-GB"/>
+          </a:p>
+        </p:txBody>
+      </p:sp>
+      <p:sp>
+        <p:nvSpPr>
+          <p:cNvPr id="4" name="Slide Image Placeholder 3"/>
+          <p:cNvSpPr>
+            <a:spLocks noGrp="1" noRot="1" noChangeAspect="1"/>
+          </p:cNvSpPr>
+          <p:nvPr>
+            <p:ph type="sldImg" idx="2"/>
+          </p:nvPr>
+        </p:nvSpPr>
+        <p:spPr>
+          <a:xfrm>
+            <a:off x="685800" y="1143000"/>
+            <a:ext cx="5486400" cy="3086100"/>
+          </a:xfrm>
+          <a:prstGeom prst="rect">
+            <a:avLst/>
+          </a:prstGeom>
+          <a:noFill/>
+          <a:ln w="12700">
+            <a:solidFill>
+              <a:prstClr val="black"/>
+            </a:solidFill>
+          </a:ln>
+        </p:spPr>
+        <p:txBody>
+          <a:bodyPr vert="horz" lIns="91440" tIns="45720" rIns="91440" bIns="45720" rtlCol="0" anchor="ctr"/>
+          <a:lstStyle/>
+          <a:p>
+            <a:endParaRPr lang="en-GB"/>
+          </a:p>
+        </p:txBody>
+      </p:sp>
+      <p:sp>
+        <p:nvSpPr>
+          <p:cNvPr id="5" name="Notes Placeholder 4"/>
+          <p:cNvSpPr>
+            <a:spLocks noGrp="1"/>
+          </p:cNvSpPr>
+          <p:nvPr>
+            <p:ph type="body" sz="quarter" idx="3"/>
+          </p:nvPr>
+        </p:nvSpPr>
+        <p:spPr>
+          <a:xfrm>
+            <a:off x="685800" y="4400550"/>
+            <a:ext cx="5486400" cy="3600450"/>
+          </a:xfrm>
+          <a:prstGeom prst="rect">
+            <a:avLst/>
+          </a:prstGeom>
+        </p:spPr>
+        <p:txBody>
+          <a:bodyPr vert="horz" lIns="91440" tIns="45720" rIns="91440" bIns="45720" rtlCol="0"/>
+          <a:lstStyle/>
+          <a:p>
+            <a:pPr lvl="0"/>
+            <a:r>
+              <a:rPr lang="en-US" smtClean="0"/>
+              <a:t>Click to edit Master text styles</a:t>
+            </a:r>
+          </a:p>
+          <a:p>
+            <a:pPr lvl="1"/>
+            <a:r>
+              <a:rPr lang="en-US" smtClean="0"/>
+              <a:t>Second level</a:t>
+            </a:r>
+          </a:p>
+          <a:p>
+            <a:pPr lvl="2"/>
+            <a:r>
+              <a:rPr lang="en-US" smtClean="0"/>
+              <a:t>Third level</a:t>
+            </a:r>
+          </a:p>
+          <a:p>
+            <a:pPr lvl="3"/>
+            <a:r>
+              <a:rPr lang="en-US" smtClean="0"/>
+              <a:t>Fourth level</a:t>
+            </a:r>
+          </a:p>
+          <a:p>
+            <a:pPr lvl="4"/>
+            <a:r>
+              <a:rPr lang="en-US" smtClean="0"/>
+              <a:t>Fifth level</a:t>
+            </a:r>
+            <a:endParaRPr lang="en-GB"/>
+          </a:p>
+        </p:txBody>
+      </p:sp>
+      <p:sp>
+        <p:nvSpPr>
+          <p:cNvPr id="6" name="Footer Placeholder 5"/>
+          <p:cNvSpPr>
+            <a:spLocks noGrp="1"/>
+          </p:cNvSpPr>
+          <p:nvPr>
+            <p:ph type="ftr" sz="quarter" idx="4"/>
+          </p:nvPr>
+        </p:nvSpPr>
+        <p:spPr>
+          <a:xfrm>
+            <a:off x="0" y="8685213"/>
+            <a:ext cx="2971800" cy="458787"/>
+          </a:xfrm>
+          <a:prstGeom prst="rect">
+            <a:avLst/>
+          </a:prstGeom>
+        </p:spPr>
+        <p:txBody>
+          <a:bodyPr vert="horz" lIns="91440" tIns="45720" rIns="91440" bIns="45720" rtlCol="0" anchor="b"/>
+          <a:lstStyle>
+            <a:lvl1pPr algn="l">
+              <a:defRPr sz="1200"/>
+            </a:lvl1pPr>
+          </a:lstStyle>
+          <a:p>
+            <a:endParaRPr lang="en-GB"/>
+          </a:p>
+        </p:txBody>
+      </p:sp>
+      <p:sp>
+        <p:nvSpPr>
+          <p:cNvPr id="7" name="Slide Number Placeholder 6"/>
+          <p:cNvSpPr>
+            <a:spLocks noGrp="1"/>
+          </p:cNvSpPr>
+          <p:nvPr>
+            <p:ph type="sldNum" sz="quarter" idx="5"/>
+          </p:nvPr>
+        </p:nvSpPr>
+        <p:spPr>
+          <a:xfrm>
+            <a:off x="3884613" y="8685213"/>
+            <a:ext cx="2971800" cy="458787"/>
+          </a:xfrm>
+          <a:prstGeom prst="rect">
+            <a:avLst/>
+          </a:prstGeom>
+        </p:spPr>
+        <p:txBody>
+          <a:bodyPr vert="horz" lIns="91440" tIns="45720" rIns="91440" bIns="45720" rtlCol="0" anchor="b"/>
+          <a:lstStyle>
+            <a:lvl1pPr algn="r">
+              <a:defRPr sz="1200"/>
+            </a:lvl1pPr>
+          </a:lstStyle>
+          <a:p>
+            <a:fld id="{E8477D5E-6547-4F9C-A69F-DD5DA01D31CA}" type="slidenum">
+              <a:rPr lang="en-GB" smtClean="0"/>
+              <a:t>‹#›</a:t>
+            </a:fld>
+            <a:endParaRPr lang="en-GB"/>
+          </a:p>
+        </p:txBody>
+      </p:sp>
+    </p:spTree>
+    <p:extLst>
+      <p:ext uri="{BB962C8B-B14F-4D97-AF65-F5344CB8AC3E}">
+        <p14:creationId xmlns:p14="http://schemas.microsoft.com/office/powerpoint/2010/main" val="580753799"/>
+      </p:ext>
+    </p:extLst>
+  </p:cSld>
+  <p:clrMap bg1="lt1" tx1="dk1" bg2="lt2" tx2="dk2" accent1="accent1" accent2="accent2" accent3="accent3" accent4="accent4" accent5="accent5" accent6="accent6" hlink="hlink" folHlink="folHlink"/>
+  <p:notesStyle>
+    <a:lvl1pPr marL="0" algn="l" defTabSz="914400" rtl="0" eaLnBrk="1" latinLnBrk="0" hangingPunct="1">
+      <a:defRPr sz="1200" kern="1200">
+        <a:solidFill>
+          <a:schemeClr val="tx1"/>
+        </a:solidFill>
+        <a:latin typeface="+mn-lt"/>
+        <a:ea typeface="+mn-ea"/>
+        <a:cs typeface="+mn-cs"/>
+      </a:defRPr>
+    </a:lvl1pPr>
+    <a:lvl2pPr marL="457200" algn="l" defTabSz="914400" rtl="0" eaLnBrk="1" latinLnBrk="0" hangingPunct="1">
+      <a:defRPr sz="1200" kern="1200">
+        <a:solidFill>
+          <a:schemeClr val="tx1"/>
+        </a:solidFill>
+        <a:latin typeface="+mn-lt"/>
+        <a:ea typeface="+mn-ea"/>
+        <a:cs typeface="+mn-cs"/>
+      </a:defRPr>
+    </a:lvl2pPr>
+    <a:lvl3pPr marL="914400" algn="l" defTabSz="914400" rtl="0" eaLnBrk="1" latinLnBrk="0" hangingPunct="1">
+      <a:defRPr sz="1200" kern="1200">
+        <a:solidFill>
+          <a:schemeClr val="tx1"/>
+        </a:solidFill>
+        <a:latin typeface="+mn-lt"/>
+        <a:ea typeface="+mn-ea"/>
+        <a:cs typeface="+mn-cs"/>
+      </a:defRPr>
+    </a:lvl3pPr>
+    <a:lvl4pPr marL="1371600" algn="l" defTabSz="914400" rtl="0" eaLnBrk="1" latinLnBrk="0" hangingPunct="1">
+      <a:defRPr sz="1200" kern="1200">
+        <a:solidFill>
+          <a:schemeClr val="tx1"/>
+        </a:solidFill>
+        <a:latin typeface="+mn-lt"/>
+        <a:ea typeface="+mn-ea"/>
+        <a:cs typeface="+mn-cs"/>
+      </a:defRPr>
+    </a:lvl4pPr>
+    <a:lvl5pPr marL="1828800" algn="l" defTabSz="914400" rtl="0" eaLnBrk="1" latinLnBrk="0" hangingPunct="1">
+      <a:defRPr sz="1200" kern="1200">
+        <a:solidFill>
+          <a:schemeClr val="tx1"/>
+        </a:solidFill>
+        <a:latin typeface="+mn-lt"/>
+        <a:ea typeface="+mn-ea"/>
+        <a:cs typeface="+mn-cs"/>
+      </a:defRPr>
+    </a:lvl5pPr>
+    <a:lvl6pPr marL="2286000" algn="l" defTabSz="914400" rtl="0" eaLnBrk="1" latinLnBrk="0" hangingPunct="1">
+      <a:defRPr sz="1200" kern="1200">
+        <a:solidFill>
+          <a:schemeClr val="tx1"/>
+        </a:solidFill>
+        <a:latin typeface="+mn-lt"/>
+        <a:ea typeface="+mn-ea"/>
+        <a:cs typeface="+mn-cs"/>
+      </a:defRPr>
+    </a:lvl6pPr>
+    <a:lvl7pPr marL="2743200" algn="l" defTabSz="914400" rtl="0" eaLnBrk="1" latinLnBrk="0" hangingPunct="1">
+      <a:defRPr sz="1200" kern="1200">
+        <a:solidFill>
+          <a:schemeClr val="tx1"/>
+        </a:solidFill>
+        <a:latin typeface="+mn-lt"/>
+        <a:ea typeface="+mn-ea"/>
+        <a:cs typeface="+mn-cs"/>
+      </a:defRPr>
+    </a:lvl7pPr>
+    <a:lvl8pPr marL="3200400" algn="l" defTabSz="914400" rtl="0" eaLnBrk="1" latinLnBrk="0" hangingPunct="1">
+      <a:defRPr sz="1200" kern="1200">
+        <a:solidFill>
+          <a:schemeClr val="tx1"/>
+        </a:solidFill>
+        <a:latin typeface="+mn-lt"/>
+        <a:ea typeface="+mn-ea"/>
+        <a:cs typeface="+mn-cs"/>
+      </a:defRPr>
+    </a:lvl8pPr>
+    <a:lvl9pPr marL="3657600" algn="l" defTabSz="914400" rtl="0" eaLnBrk="1" latinLnBrk="0" hangingPunct="1">
+      <a:defRPr sz="1200" kern="1200">
+        <a:solidFill>
+          <a:schemeClr val="tx1"/>
+        </a:solidFill>
+        <a:latin typeface="+mn-lt"/>
+        <a:ea typeface="+mn-ea"/>
+        <a:cs typeface="+mn-cs"/>
+      </a:defRPr>
+    </a:lvl9pPr>
+  </p:notesStyle>
+</p:notesMaster>
+</file>
+
+<file path=ppt/notesSlides/notesSlide1.xml><?xml version="1.0" encoding="utf-8"?>
+<p:notes xmlns:a="http://schemas.openxmlformats.org/drawingml/2006/main" xmlns:r="http://schemas.openxmlformats.org/officeDocument/2006/relationships" xmlns:p="http://schemas.openxmlformats.org/presentationml/2006/main">
+  <p:cSld>
+    <p:spTree>
+      <p:nvGrpSpPr>
+        <p:cNvPr id="1" name=""/>
+        <p:cNvGrpSpPr/>
+        <p:nvPr/>
+      </p:nvGrpSpPr>
+      <p:grpSpPr>
+        <a:xfrm>
+          <a:off x="0" y="0"/>
+          <a:ext cx="0" cy="0"/>
+          <a:chOff x="0" y="0"/>
+          <a:chExt cx="0" cy="0"/>
+        </a:xfrm>
+      </p:grpSpPr>
+      <p:sp>
+        <p:nvSpPr>
+          <p:cNvPr id="2" name="Slide Image Placeholder 1"/>
+          <p:cNvSpPr>
+            <a:spLocks noGrp="1" noRot="1" noChangeAspect="1"/>
+          </p:cNvSpPr>
+          <p:nvPr>
+            <p:ph type="sldImg"/>
+          </p:nvPr>
+        </p:nvSpPr>
+        <p:spPr/>
+      </p:sp>
+      <p:sp>
+        <p:nvSpPr>
+          <p:cNvPr id="3" name="Notes Placeholder 2"/>
+          <p:cNvSpPr>
+            <a:spLocks noGrp="1"/>
+          </p:cNvSpPr>
+          <p:nvPr>
+            <p:ph type="body" idx="1"/>
+          </p:nvPr>
+        </p:nvSpPr>
+        <p:spPr/>
+        <p:txBody>
+          <a:bodyPr/>
+          <a:lstStyle/>
+          <a:p>
+            <a:r>
+              <a:rPr lang="en-GB" dirty="0" smtClean="0">
+                <a:effectLst/>
+              </a:rPr>
+              <a:t>GET THIS ON POWERPOINT</a:t>
+            </a:r>
+          </a:p>
+          <a:p>
+            <a:r>
+              <a:rPr lang="en-GB" dirty="0" smtClean="0"/>
+              <a:t/>
+            </a:r>
+            <a:br>
+              <a:rPr lang="en-GB" dirty="0" smtClean="0"/>
+            </a:br>
+            <a:endParaRPr lang="en-GB" dirty="0" smtClean="0"/>
+          </a:p>
+          <a:p>
+            <a:r>
+              <a:rPr lang="en-GB" dirty="0" smtClean="0"/>
+              <a:t>Path:</a:t>
+            </a:r>
+          </a:p>
+          <a:p>
+            <a:r>
+              <a:rPr lang="en-GB" dirty="0" smtClean="0"/>
+              <a:t>write programme that analyses </a:t>
+            </a:r>
+            <a:r>
+              <a:rPr lang="en-GB" dirty="0" err="1" smtClean="0"/>
+              <a:t>rtquic</a:t>
+            </a:r>
+            <a:r>
+              <a:rPr lang="en-GB" dirty="0" smtClean="0"/>
+              <a:t> data -&gt; </a:t>
+            </a:r>
+          </a:p>
+          <a:p>
+            <a:r>
+              <a:rPr lang="en-GB" dirty="0" smtClean="0"/>
+              <a:t>(method for cleaning data</a:t>
+            </a:r>
+            <a:r>
+              <a:rPr lang="en-GB" dirty="0" smtClean="0">
+                <a:effectLst/>
+              </a:rPr>
+              <a:t> -&gt;)</a:t>
+            </a:r>
+            <a:endParaRPr lang="en-GB" dirty="0" smtClean="0"/>
+          </a:p>
+          <a:p>
+            <a:r>
+              <a:rPr lang="en-GB" dirty="0" smtClean="0">
+                <a:effectLst/>
+              </a:rPr>
+              <a:t>(method for extracting SD numbers from word) </a:t>
+            </a:r>
+            <a:r>
+              <a:rPr lang="en-GB" dirty="0" smtClean="0"/>
+              <a:t> </a:t>
+            </a:r>
+            <a:r>
+              <a:rPr lang="en-GB" dirty="0" smtClean="0">
+                <a:effectLst/>
+              </a:rPr>
+              <a:t>-&gt; </a:t>
+            </a:r>
+            <a:endParaRPr lang="en-GB" dirty="0" smtClean="0"/>
+          </a:p>
+          <a:p>
+            <a:r>
+              <a:rPr lang="en-GB" dirty="0" smtClean="0"/>
+              <a:t>display full data for lag time...DONE, gradient DONE area under curve DONE, max </a:t>
+            </a:r>
+            <a:r>
+              <a:rPr lang="en-GB" dirty="0" err="1" smtClean="0"/>
+              <a:t>val</a:t>
+            </a:r>
+            <a:r>
+              <a:rPr lang="en-GB" dirty="0" smtClean="0"/>
+              <a:t> DONE, time to max DONE -&gt;</a:t>
+            </a:r>
+          </a:p>
+          <a:p>
+            <a:r>
+              <a:rPr lang="en-GB" dirty="0" smtClean="0"/>
+              <a:t>also procure/design method for regression to obtain a, b, c, d for </a:t>
+            </a:r>
+            <a:r>
+              <a:rPr lang="en-GB" dirty="0" smtClean="0">
+                <a:hlinkClick r:id="rId3"/>
+              </a:rPr>
+              <a:t>sigmoidal curve</a:t>
+            </a:r>
+            <a:r>
+              <a:rPr lang="en-GB" dirty="0" smtClean="0"/>
+              <a:t>-&gt;</a:t>
+            </a:r>
+          </a:p>
+          <a:p>
+            <a:r>
+              <a:rPr lang="en-GB" dirty="0" smtClean="0">
+                <a:effectLst/>
+              </a:rPr>
+              <a:t>ensure programme can analyse multiple excel files-&gt;</a:t>
+            </a:r>
+            <a:endParaRPr lang="en-GB" dirty="0" smtClean="0"/>
+          </a:p>
+          <a:p>
+            <a:r>
+              <a:rPr lang="en-GB" dirty="0" smtClean="0">
+                <a:effectLst/>
+              </a:rPr>
+              <a:t>ensure programme could filter by name or another condition-&gt;</a:t>
+            </a:r>
+            <a:endParaRPr lang="en-GB" dirty="0" smtClean="0"/>
+          </a:p>
+          <a:p>
+            <a:r>
+              <a:rPr lang="en-GB" dirty="0" smtClean="0"/>
+              <a:t>upload as python library after documenting </a:t>
+            </a:r>
+            <a:r>
+              <a:rPr lang="en-GB" dirty="0" smtClean="0">
+                <a:effectLst/>
+              </a:rPr>
+              <a:t> </a:t>
+            </a:r>
+            <a:r>
+              <a:rPr lang="en-GB" dirty="0" smtClean="0">
+                <a:effectLst/>
+                <a:hlinkClick r:id="rId4"/>
+              </a:rPr>
+              <a:t>https://www.python.org/dev/peps/pep-0257/</a:t>
+            </a:r>
+            <a:r>
+              <a:rPr lang="en-GB" dirty="0" smtClean="0">
+                <a:effectLst/>
+              </a:rPr>
+              <a:t> </a:t>
+            </a:r>
+            <a:r>
+              <a:rPr lang="en-GB" dirty="0" smtClean="0"/>
+              <a:t>-&gt;</a:t>
+            </a:r>
+          </a:p>
+          <a:p>
+            <a:r>
+              <a:rPr lang="en-GB" dirty="0" smtClean="0"/>
+              <a:t>chose features for vector to be used in cluster analysis -&gt;</a:t>
+            </a:r>
+          </a:p>
+          <a:p>
+            <a:r>
+              <a:rPr lang="en-GB" dirty="0" smtClean="0">
+                <a:effectLst/>
+              </a:rPr>
+              <a:t>select k for k means clustering -&gt;</a:t>
+            </a:r>
+            <a:endParaRPr lang="en-GB" dirty="0" smtClean="0"/>
+          </a:p>
+          <a:p>
+            <a:r>
+              <a:rPr lang="en-GB" dirty="0" smtClean="0">
+                <a:effectLst/>
+              </a:rPr>
+              <a:t>select metric for k means clustering -&gt;</a:t>
+            </a:r>
+            <a:endParaRPr lang="en-GB" dirty="0" smtClean="0"/>
+          </a:p>
+          <a:p>
+            <a:r>
+              <a:rPr lang="en-GB" dirty="0" smtClean="0">
+                <a:effectLst/>
+              </a:rPr>
+              <a:t>select metric for k means clustering -&gt;</a:t>
+            </a:r>
+            <a:r>
+              <a:rPr lang="en-GB" dirty="0" smtClean="0"/>
+              <a:t> </a:t>
+            </a:r>
+          </a:p>
+          <a:p>
+            <a:r>
+              <a:rPr lang="en-GB" dirty="0" smtClean="0"/>
+              <a:t/>
+            </a:r>
+            <a:br>
+              <a:rPr lang="en-GB" dirty="0" smtClean="0"/>
+            </a:br>
+            <a:endParaRPr lang="en-GB" dirty="0" smtClean="0"/>
+          </a:p>
+          <a:p>
+            <a:r>
+              <a:rPr lang="en-GB" dirty="0" smtClean="0"/>
+              <a:t>what kind of paper could </a:t>
+            </a:r>
+            <a:r>
+              <a:rPr lang="en-GB" dirty="0" err="1" smtClean="0"/>
+              <a:t>i</a:t>
+            </a:r>
+            <a:r>
+              <a:rPr lang="en-GB" dirty="0" smtClean="0"/>
+              <a:t> publish? -&gt;</a:t>
+            </a:r>
+          </a:p>
+          <a:p>
+            <a:r>
+              <a:rPr lang="en-GB" dirty="0" smtClean="0">
+                <a:effectLst/>
+              </a:rPr>
+              <a:t>Could it be describing a python package</a:t>
+            </a:r>
+            <a:endParaRPr lang="en-GB" dirty="0" smtClean="0"/>
+          </a:p>
+          <a:p>
+            <a:r>
+              <a:rPr lang="en-GB" dirty="0" smtClean="0">
+                <a:effectLst/>
+              </a:rPr>
+              <a:t>How should I go about uploading a python package?</a:t>
+            </a:r>
+            <a:endParaRPr lang="en-GB" dirty="0" smtClean="0"/>
+          </a:p>
+          <a:p>
+            <a:r>
+              <a:rPr lang="en-GB" dirty="0" smtClean="0">
+                <a:effectLst/>
+              </a:rPr>
+              <a:t>decide what features</a:t>
+            </a:r>
+            <a:endParaRPr lang="en-GB" dirty="0" smtClean="0"/>
+          </a:p>
+          <a:p>
+            <a:r>
+              <a:rPr lang="en-GB" dirty="0" smtClean="0">
+                <a:effectLst/>
+              </a:rPr>
+              <a:t/>
+            </a:r>
+            <a:br>
+              <a:rPr lang="en-GB" dirty="0" smtClean="0">
+                <a:effectLst/>
+              </a:rPr>
+            </a:br>
+            <a:endParaRPr lang="en-GB" dirty="0" smtClean="0"/>
+          </a:p>
+          <a:p>
+            <a:r>
+              <a:rPr lang="en-GB" dirty="0" smtClean="0"/>
+              <a:t>file i/o</a:t>
+            </a:r>
+          </a:p>
+          <a:p>
+            <a:r>
+              <a:rPr lang="en-GB" dirty="0" smtClean="0">
+                <a:effectLst/>
+              </a:rPr>
+              <a:t>read exported excel files</a:t>
+            </a:r>
+            <a:r>
+              <a:rPr lang="en-GB" dirty="0" smtClean="0"/>
+              <a:t> </a:t>
+            </a:r>
+            <a:r>
+              <a:rPr lang="en-GB" dirty="0" smtClean="0">
+                <a:effectLst/>
+              </a:rPr>
+              <a:t>   </a:t>
+            </a:r>
+            <a:endParaRPr lang="en-GB" dirty="0" smtClean="0"/>
+          </a:p>
+          <a:p>
+            <a:r>
+              <a:rPr lang="en-GB" dirty="0" smtClean="0">
+                <a:effectLst/>
+              </a:rPr>
+              <a:t/>
+            </a:r>
+            <a:br>
+              <a:rPr lang="en-GB" dirty="0" smtClean="0">
+                <a:effectLst/>
+              </a:rPr>
+            </a:br>
+            <a:endParaRPr lang="en-GB" dirty="0" smtClean="0"/>
+          </a:p>
+          <a:p>
+            <a:r>
+              <a:rPr lang="en-GB" dirty="0" smtClean="0">
+                <a:effectLst/>
+              </a:rPr>
+              <a:t>analysis</a:t>
+            </a:r>
+            <a:endParaRPr lang="en-GB" dirty="0" smtClean="0"/>
+          </a:p>
+          <a:p>
+            <a:r>
+              <a:rPr lang="en-GB" dirty="0" smtClean="0">
+                <a:effectLst/>
+              </a:rPr>
+              <a:t>use </a:t>
+            </a:r>
+            <a:r>
+              <a:rPr lang="en-GB" dirty="0" err="1" smtClean="0">
+                <a:effectLst/>
+              </a:rPr>
+              <a:t>sci</a:t>
+            </a:r>
+            <a:r>
+              <a:rPr lang="en-GB" dirty="0" smtClean="0">
+                <a:effectLst/>
+              </a:rPr>
+              <a:t> kit for k means cluster analysis</a:t>
+            </a:r>
+            <a:r>
+              <a:rPr lang="en-GB" dirty="0" smtClean="0"/>
+              <a:t> </a:t>
+            </a:r>
+          </a:p>
+          <a:p>
+            <a:r>
+              <a:rPr lang="en-GB" dirty="0" smtClean="0">
+                <a:effectLst/>
+              </a:rPr>
+              <a:t/>
+            </a:r>
+            <a:br>
+              <a:rPr lang="en-GB" dirty="0" smtClean="0">
+                <a:effectLst/>
+              </a:rPr>
+            </a:br>
+            <a:endParaRPr lang="en-GB" dirty="0" smtClean="0"/>
+          </a:p>
+          <a:p>
+            <a:r>
+              <a:rPr lang="en-GB" dirty="0" smtClean="0">
+                <a:effectLst/>
+              </a:rPr>
+              <a:t>print cluster groups</a:t>
+            </a:r>
+            <a:endParaRPr lang="en-GB" dirty="0" smtClean="0"/>
+          </a:p>
+          <a:p>
+            <a:r>
+              <a:rPr lang="en-GB" dirty="0" smtClean="0">
+                <a:effectLst/>
+              </a:rPr>
+              <a:t>plot parameter data for cluster groups</a:t>
+            </a:r>
+            <a:endParaRPr lang="en-GB" dirty="0" smtClean="0"/>
+          </a:p>
+          <a:p>
+            <a:r>
+              <a:rPr lang="en-GB" dirty="0" smtClean="0">
+                <a:effectLst/>
+              </a:rPr>
+              <a:t/>
+            </a:r>
+            <a:br>
+              <a:rPr lang="en-GB" dirty="0" smtClean="0">
+                <a:effectLst/>
+              </a:rPr>
+            </a:br>
+            <a:endParaRPr lang="en-GB" dirty="0" smtClean="0"/>
+          </a:p>
+          <a:p>
+            <a:r>
+              <a:rPr lang="en-GB" dirty="0" smtClean="0">
+                <a:effectLst/>
+              </a:rPr>
+              <a:t>plot</a:t>
+            </a:r>
+            <a:endParaRPr lang="en-GB" dirty="0" smtClean="0"/>
+          </a:p>
+          <a:p>
+            <a:r>
+              <a:rPr lang="en-GB" dirty="0" smtClean="0">
+                <a:effectLst/>
+              </a:rPr>
+              <a:t>plot actual curves</a:t>
+            </a:r>
+            <a:endParaRPr lang="en-GB" dirty="0" smtClean="0"/>
+          </a:p>
+          <a:p>
+            <a:r>
+              <a:rPr lang="en-GB" dirty="0" smtClean="0">
+                <a:effectLst/>
+              </a:rPr>
+              <a:t>plot parameters as box plots or </a:t>
+            </a:r>
+            <a:r>
+              <a:rPr lang="en-GB" dirty="0" err="1" smtClean="0">
+                <a:effectLst/>
+              </a:rPr>
+              <a:t>scattergrams</a:t>
+            </a:r>
+            <a:endParaRPr lang="en-GB" dirty="0" smtClean="0"/>
+          </a:p>
+          <a:p>
+            <a:r>
+              <a:rPr lang="en-GB" dirty="0" smtClean="0">
+                <a:effectLst/>
+              </a:rPr>
+              <a:t/>
+            </a:r>
+            <a:br>
+              <a:rPr lang="en-GB" dirty="0" smtClean="0">
+                <a:effectLst/>
+              </a:rPr>
+            </a:br>
+            <a:endParaRPr lang="en-GB" dirty="0" smtClean="0"/>
+          </a:p>
+          <a:p>
+            <a:r>
+              <a:rPr lang="en-GB" dirty="0" smtClean="0">
+                <a:effectLst/>
+              </a:rPr>
+              <a:t>deal with missing data</a:t>
+            </a:r>
+            <a:endParaRPr lang="en-GB" dirty="0" smtClean="0"/>
+          </a:p>
+          <a:p>
+            <a:r>
+              <a:rPr lang="en-GB" dirty="0" smtClean="0">
+                <a:effectLst/>
+              </a:rPr>
+              <a:t>return to a an excel file </a:t>
+            </a:r>
+            <a:endParaRPr lang="en-GB" dirty="0" smtClean="0"/>
+          </a:p>
+          <a:p>
+            <a:r>
+              <a:rPr lang="en-GB" dirty="0" smtClean="0">
+                <a:effectLst/>
+              </a:rPr>
+              <a:t/>
+            </a:r>
+            <a:br>
+              <a:rPr lang="en-GB" dirty="0" smtClean="0">
+                <a:effectLst/>
+              </a:rPr>
+            </a:br>
+            <a:endParaRPr lang="en-GB" dirty="0" smtClean="0"/>
+          </a:p>
+          <a:p>
+            <a:r>
+              <a:rPr lang="en-GB" dirty="0" err="1" smtClean="0">
+                <a:effectLst/>
+              </a:rPr>
+              <a:t>excelNegativeVsPositive</a:t>
+            </a:r>
+            <a:r>
+              <a:rPr lang="en-GB" dirty="0" smtClean="0">
+                <a:effectLst/>
+              </a:rPr>
+              <a:t>: </a:t>
+            </a:r>
+            <a:endParaRPr lang="en-GB" dirty="0" smtClean="0"/>
+          </a:p>
+          <a:p>
+            <a:r>
+              <a:rPr lang="en-GB" dirty="0" smtClean="0">
+                <a:effectLst/>
+              </a:rPr>
+              <a:t>get </a:t>
+            </a:r>
+            <a:r>
+              <a:rPr lang="en-GB" dirty="0" err="1" smtClean="0">
+                <a:effectLst/>
+              </a:rPr>
+              <a:t>excelRowMax</a:t>
+            </a:r>
+            <a:r>
+              <a:rPr lang="en-GB" dirty="0" smtClean="0">
+                <a:effectLst/>
+              </a:rPr>
+              <a:t> programme to </a:t>
+            </a:r>
+            <a:endParaRPr lang="en-GB" dirty="0" smtClean="0"/>
+          </a:p>
+          <a:p>
+            <a:r>
+              <a:rPr lang="en-GB" dirty="0" smtClean="0"/>
+              <a:t> </a:t>
+            </a:r>
+          </a:p>
+          <a:p>
+            <a:r>
+              <a:rPr lang="en-GB" dirty="0" smtClean="0">
+                <a:effectLst/>
+              </a:rPr>
+              <a:t>further simplify code for </a:t>
+            </a:r>
+            <a:r>
+              <a:rPr lang="en-GB" dirty="0" err="1" smtClean="0">
+                <a:effectLst/>
+              </a:rPr>
+              <a:t>RTquicsheet</a:t>
+            </a:r>
+            <a:r>
+              <a:rPr lang="en-GB" dirty="0" smtClean="0">
+                <a:effectLst/>
+              </a:rPr>
+              <a:t> (extract the stuff to do with getting the sheet)</a:t>
+            </a:r>
+            <a:endParaRPr lang="en-GB" dirty="0" smtClean="0"/>
+          </a:p>
+          <a:p>
+            <a:r>
+              <a:rPr lang="en-GB" dirty="0" smtClean="0">
+                <a:effectLst/>
+              </a:rPr>
+              <a:t>plot demo figure illustrating baseline </a:t>
+            </a:r>
+            <a:r>
+              <a:rPr lang="en-GB" dirty="0" err="1" smtClean="0">
+                <a:effectLst/>
+              </a:rPr>
+              <a:t>threehold</a:t>
+            </a:r>
+            <a:r>
+              <a:rPr lang="en-GB" dirty="0" smtClean="0">
+                <a:effectLst/>
+              </a:rPr>
+              <a:t>, lag time, gradient, time to max, max </a:t>
+            </a:r>
+            <a:r>
+              <a:rPr lang="en-GB" dirty="0" err="1" smtClean="0">
+                <a:effectLst/>
+              </a:rPr>
+              <a:t>val</a:t>
+            </a:r>
+            <a:endParaRPr lang="en-GB" dirty="0" smtClean="0"/>
+          </a:p>
+          <a:p>
+            <a:r>
+              <a:rPr lang="en-GB" dirty="0" smtClean="0">
+                <a:effectLst/>
+              </a:rPr>
+              <a:t>get parameter generator sorted</a:t>
+            </a:r>
+            <a:endParaRPr lang="en-GB" dirty="0" smtClean="0"/>
+          </a:p>
+          <a:p>
+            <a:r>
+              <a:rPr lang="en-GB" dirty="0" smtClean="0"/>
+              <a:t> </a:t>
+            </a:r>
+          </a:p>
+          <a:p>
+            <a:r>
+              <a:rPr lang="en-GB" dirty="0" smtClean="0">
+                <a:effectLst/>
+              </a:rPr>
+              <a:t>cluster analysis: on all samples showing conversion. </a:t>
+            </a:r>
+            <a:endParaRPr lang="en-GB" dirty="0" smtClean="0"/>
+          </a:p>
+          <a:p>
+            <a:r>
+              <a:rPr lang="en-GB" dirty="0" smtClean="0">
+                <a:effectLst/>
+              </a:rPr>
+              <a:t>two things</a:t>
+            </a:r>
+            <a:endParaRPr lang="en-GB" dirty="0" smtClean="0"/>
+          </a:p>
+          <a:p>
+            <a:r>
+              <a:rPr lang="en-GB" dirty="0" smtClean="0">
+                <a:effectLst/>
+              </a:rPr>
+              <a:t>single out column </a:t>
+            </a:r>
+            <a:endParaRPr lang="en-GB" dirty="0" smtClean="0"/>
+          </a:p>
+          <a:p>
+            <a:r>
+              <a:rPr lang="en-GB" dirty="0" smtClean="0">
+                <a:effectLst/>
+              </a:rPr>
+              <a:t>one line, one result</a:t>
+            </a:r>
+            <a:endParaRPr lang="en-GB" dirty="0" smtClean="0"/>
+          </a:p>
+          <a:p>
+            <a:r>
+              <a:rPr lang="en-GB" dirty="0" smtClean="0">
+                <a:effectLst/>
+              </a:rPr>
+              <a:t>classify line</a:t>
+            </a:r>
+            <a:endParaRPr lang="en-GB" dirty="0" smtClean="0"/>
+          </a:p>
+          <a:p>
+            <a:r>
+              <a:rPr lang="en-GB" dirty="0" err="1" smtClean="0">
+                <a:effectLst/>
+              </a:rPr>
+              <a:t>creat</a:t>
+            </a:r>
+            <a:r>
+              <a:rPr lang="en-GB" dirty="0" smtClean="0">
+                <a:effectLst/>
+              </a:rPr>
+              <a:t> </a:t>
+            </a:r>
+            <a:r>
+              <a:rPr lang="en-GB" dirty="0" err="1" smtClean="0">
+                <a:effectLst/>
+              </a:rPr>
+              <a:t>dict</a:t>
+            </a:r>
+            <a:r>
+              <a:rPr lang="en-GB" dirty="0" smtClean="0">
+                <a:effectLst/>
+              </a:rPr>
+              <a:t> of </a:t>
+            </a:r>
+            <a:r>
+              <a:rPr lang="en-GB" dirty="0" err="1" smtClean="0">
+                <a:effectLst/>
+              </a:rPr>
+              <a:t>classifiications</a:t>
+            </a:r>
+            <a:r>
+              <a:rPr lang="en-GB" smtClean="0">
+                <a:effectLst/>
+              </a:rPr>
+              <a:t> versus [labels][</a:t>
+            </a:r>
+            <a:endParaRPr lang="en-GB" smtClean="0"/>
+          </a:p>
+          <a:p>
+            <a:endParaRPr lang="en-GB"/>
+          </a:p>
+        </p:txBody>
+      </p:sp>
+      <p:sp>
+        <p:nvSpPr>
+          <p:cNvPr id="4" name="Slide Number Placeholder 3"/>
+          <p:cNvSpPr>
+            <a:spLocks noGrp="1"/>
+          </p:cNvSpPr>
+          <p:nvPr>
+            <p:ph type="sldNum" sz="quarter" idx="10"/>
+          </p:nvPr>
+        </p:nvSpPr>
+        <p:spPr/>
+        <p:txBody>
+          <a:bodyPr/>
+          <a:lstStyle/>
+          <a:p>
+            <a:fld id="{E8477D5E-6547-4F9C-A69F-DD5DA01D31CA}" type="slidenum">
+              <a:rPr lang="en-GB" smtClean="0"/>
+              <a:t>1</a:t>
+            </a:fld>
+            <a:endParaRPr lang="en-GB"/>
+          </a:p>
+        </p:txBody>
+      </p:sp>
+    </p:spTree>
+    <p:extLst>
+      <p:ext uri="{BB962C8B-B14F-4D97-AF65-F5344CB8AC3E}">
+        <p14:creationId xmlns:p14="http://schemas.microsoft.com/office/powerpoint/2010/main" val="3487300782"/>
+      </p:ext>
+    </p:extLst>
+  </p:cSld>
+  <p:clrMapOvr>
+    <a:masterClrMapping/>
+  </p:clrMapOvr>
+</p:notes>
 </file>
 
 <file path=ppt/slideLayouts/slideLayout1.xml><?xml version="1.0" encoding="utf-8"?>
@@ -129,7 +1206,7 @@
           <p:cNvPr id="2" name="Title 1">
             <a:extLst>
               <a:ext uri="{FF2B5EF4-FFF2-40B4-BE49-F238E27FC236}">
-                <a16:creationId xmlns:a16="http://schemas.microsoft.com/office/drawing/2014/main" id="{3B78CFE3-AEBA-42C9-880B-7F8B693A4D54}"/>
+                <a16:creationId xmlns="" xmlns:a16="http://schemas.microsoft.com/office/drawing/2014/main" id="{3B78CFE3-AEBA-42C9-880B-7F8B693A4D54}"/>
               </a:ext>
             </a:extLst>
           </p:cNvPr>
@@ -167,7 +1244,7 @@
           <p:cNvPr id="3" name="Subtitle 2">
             <a:extLst>
               <a:ext uri="{FF2B5EF4-FFF2-40B4-BE49-F238E27FC236}">
-                <a16:creationId xmlns:a16="http://schemas.microsoft.com/office/drawing/2014/main" id="{8E9A35BF-5581-4653-8C91-8739D1857BFA}"/>
+                <a16:creationId xmlns="" xmlns:a16="http://schemas.microsoft.com/office/drawing/2014/main" id="{8E9A35BF-5581-4653-8C91-8739D1857BFA}"/>
               </a:ext>
             </a:extLst>
           </p:cNvPr>
@@ -238,7 +1315,7 @@
           <p:cNvPr id="4" name="Date Placeholder 3">
             <a:extLst>
               <a:ext uri="{FF2B5EF4-FFF2-40B4-BE49-F238E27FC236}">
-                <a16:creationId xmlns:a16="http://schemas.microsoft.com/office/drawing/2014/main" id="{BED4DFA6-DE6E-4AAD-8D95-305682F7B7DC}"/>
+                <a16:creationId xmlns="" xmlns:a16="http://schemas.microsoft.com/office/drawing/2014/main" id="{BED4DFA6-DE6E-4AAD-8D95-305682F7B7DC}"/>
               </a:ext>
             </a:extLst>
           </p:cNvPr>
@@ -256,7 +1333,7 @@
           <a:p>
             <a:fld id="{8213B8F1-4FA8-4032-AA8A-75E99188CEDC}" type="datetimeFigureOut">
               <a:rPr lang="en-GB" smtClean="0"/>
-              <a:t>21/08/2019</a:t>
+              <a:t>23/09/2019</a:t>
             </a:fld>
             <a:endParaRPr lang="en-GB"/>
           </a:p>
@@ -267,7 +1344,7 @@
           <p:cNvPr id="5" name="Footer Placeholder 4">
             <a:extLst>
               <a:ext uri="{FF2B5EF4-FFF2-40B4-BE49-F238E27FC236}">
-                <a16:creationId xmlns:a16="http://schemas.microsoft.com/office/drawing/2014/main" id="{0250E318-298C-47B9-8DB5-5AC90F722F68}"/>
+                <a16:creationId xmlns="" xmlns:a16="http://schemas.microsoft.com/office/drawing/2014/main" id="{0250E318-298C-47B9-8DB5-5AC90F722F68}"/>
               </a:ext>
             </a:extLst>
           </p:cNvPr>
@@ -292,7 +1369,7 @@
           <p:cNvPr id="6" name="Slide Number Placeholder 5">
             <a:extLst>
               <a:ext uri="{FF2B5EF4-FFF2-40B4-BE49-F238E27FC236}">
-                <a16:creationId xmlns:a16="http://schemas.microsoft.com/office/drawing/2014/main" id="{954DC707-44CA-4885-A7B6-4C9E150F9CE8}"/>
+                <a16:creationId xmlns="" xmlns:a16="http://schemas.microsoft.com/office/drawing/2014/main" id="{954DC707-44CA-4885-A7B6-4C9E150F9CE8}"/>
               </a:ext>
             </a:extLst>
           </p:cNvPr>
@@ -351,7 +1428,7 @@
           <p:cNvPr id="2" name="Title 1">
             <a:extLst>
               <a:ext uri="{FF2B5EF4-FFF2-40B4-BE49-F238E27FC236}">
-                <a16:creationId xmlns:a16="http://schemas.microsoft.com/office/drawing/2014/main" id="{5C324CBD-47F1-4794-B0A7-31338B5360A2}"/>
+                <a16:creationId xmlns="" xmlns:a16="http://schemas.microsoft.com/office/drawing/2014/main" id="{5C324CBD-47F1-4794-B0A7-31338B5360A2}"/>
               </a:ext>
             </a:extLst>
           </p:cNvPr>
@@ -380,7 +1457,7 @@
           <p:cNvPr id="3" name="Vertical Text Placeholder 2">
             <a:extLst>
               <a:ext uri="{FF2B5EF4-FFF2-40B4-BE49-F238E27FC236}">
-                <a16:creationId xmlns:a16="http://schemas.microsoft.com/office/drawing/2014/main" id="{1CBCFD0E-7468-4445-9276-45B53FD5E03C}"/>
+                <a16:creationId xmlns="" xmlns:a16="http://schemas.microsoft.com/office/drawing/2014/main" id="{1CBCFD0E-7468-4445-9276-45B53FD5E03C}"/>
               </a:ext>
             </a:extLst>
           </p:cNvPr>
@@ -438,7 +1515,7 @@
           <p:cNvPr id="4" name="Date Placeholder 3">
             <a:extLst>
               <a:ext uri="{FF2B5EF4-FFF2-40B4-BE49-F238E27FC236}">
-                <a16:creationId xmlns:a16="http://schemas.microsoft.com/office/drawing/2014/main" id="{8A96B140-2FE0-4802-8A4F-E8149F557A09}"/>
+                <a16:creationId xmlns="" xmlns:a16="http://schemas.microsoft.com/office/drawing/2014/main" id="{8A96B140-2FE0-4802-8A4F-E8149F557A09}"/>
               </a:ext>
             </a:extLst>
           </p:cNvPr>
@@ -456,7 +1533,7 @@
           <a:p>
             <a:fld id="{8213B8F1-4FA8-4032-AA8A-75E99188CEDC}" type="datetimeFigureOut">
               <a:rPr lang="en-GB" smtClean="0"/>
-              <a:t>21/08/2019</a:t>
+              <a:t>23/09/2019</a:t>
             </a:fld>
             <a:endParaRPr lang="en-GB"/>
           </a:p>
@@ -467,7 +1544,7 @@
           <p:cNvPr id="5" name="Footer Placeholder 4">
             <a:extLst>
               <a:ext uri="{FF2B5EF4-FFF2-40B4-BE49-F238E27FC236}">
-                <a16:creationId xmlns:a16="http://schemas.microsoft.com/office/drawing/2014/main" id="{8979A76B-353E-4132-96BE-34262A442D22}"/>
+                <a16:creationId xmlns="" xmlns:a16="http://schemas.microsoft.com/office/drawing/2014/main" id="{8979A76B-353E-4132-96BE-34262A442D22}"/>
               </a:ext>
             </a:extLst>
           </p:cNvPr>
@@ -492,7 +1569,7 @@
           <p:cNvPr id="6" name="Slide Number Placeholder 5">
             <a:extLst>
               <a:ext uri="{FF2B5EF4-FFF2-40B4-BE49-F238E27FC236}">
-                <a16:creationId xmlns:a16="http://schemas.microsoft.com/office/drawing/2014/main" id="{065275D8-D675-4E90-AC46-762B577BF611}"/>
+                <a16:creationId xmlns="" xmlns:a16="http://schemas.microsoft.com/office/drawing/2014/main" id="{065275D8-D675-4E90-AC46-762B577BF611}"/>
               </a:ext>
             </a:extLst>
           </p:cNvPr>
@@ -551,7 +1628,7 @@
           <p:cNvPr id="2" name="Vertical Title 1">
             <a:extLst>
               <a:ext uri="{FF2B5EF4-FFF2-40B4-BE49-F238E27FC236}">
-                <a16:creationId xmlns:a16="http://schemas.microsoft.com/office/drawing/2014/main" id="{38F43B08-65E9-4AD3-ADA6-FCD55AC7B77D}"/>
+                <a16:creationId xmlns="" xmlns:a16="http://schemas.microsoft.com/office/drawing/2014/main" id="{38F43B08-65E9-4AD3-ADA6-FCD55AC7B77D}"/>
               </a:ext>
             </a:extLst>
           </p:cNvPr>
@@ -585,7 +1662,7 @@
           <p:cNvPr id="3" name="Vertical Text Placeholder 2">
             <a:extLst>
               <a:ext uri="{FF2B5EF4-FFF2-40B4-BE49-F238E27FC236}">
-                <a16:creationId xmlns:a16="http://schemas.microsoft.com/office/drawing/2014/main" id="{9B0C30F1-5E1C-4257-AB69-EEE385F1EA6B}"/>
+                <a16:creationId xmlns="" xmlns:a16="http://schemas.microsoft.com/office/drawing/2014/main" id="{9B0C30F1-5E1C-4257-AB69-EEE385F1EA6B}"/>
               </a:ext>
             </a:extLst>
           </p:cNvPr>
@@ -648,7 +1725,7 @@
           <p:cNvPr id="4" name="Date Placeholder 3">
             <a:extLst>
               <a:ext uri="{FF2B5EF4-FFF2-40B4-BE49-F238E27FC236}">
-                <a16:creationId xmlns:a16="http://schemas.microsoft.com/office/drawing/2014/main" id="{3AE37463-C584-415A-88F6-37B014074EF4}"/>
+                <a16:creationId xmlns="" xmlns:a16="http://schemas.microsoft.com/office/drawing/2014/main" id="{3AE37463-C584-415A-88F6-37B014074EF4}"/>
               </a:ext>
             </a:extLst>
           </p:cNvPr>
@@ -666,7 +1743,7 @@
           <a:p>
             <a:fld id="{8213B8F1-4FA8-4032-AA8A-75E99188CEDC}" type="datetimeFigureOut">
               <a:rPr lang="en-GB" smtClean="0"/>
-              <a:t>21/08/2019</a:t>
+              <a:t>23/09/2019</a:t>
             </a:fld>
             <a:endParaRPr lang="en-GB"/>
           </a:p>
@@ -677,7 +1754,7 @@
           <p:cNvPr id="5" name="Footer Placeholder 4">
             <a:extLst>
               <a:ext uri="{FF2B5EF4-FFF2-40B4-BE49-F238E27FC236}">
-                <a16:creationId xmlns:a16="http://schemas.microsoft.com/office/drawing/2014/main" id="{A2012936-86E4-40D8-BE8E-631147953AA9}"/>
+                <a16:creationId xmlns="" xmlns:a16="http://schemas.microsoft.com/office/drawing/2014/main" id="{A2012936-86E4-40D8-BE8E-631147953AA9}"/>
               </a:ext>
             </a:extLst>
           </p:cNvPr>
@@ -702,7 +1779,7 @@
           <p:cNvPr id="6" name="Slide Number Placeholder 5">
             <a:extLst>
               <a:ext uri="{FF2B5EF4-FFF2-40B4-BE49-F238E27FC236}">
-                <a16:creationId xmlns:a16="http://schemas.microsoft.com/office/drawing/2014/main" id="{12D9E898-3F2D-4024-A557-8FAA736C9FC5}"/>
+                <a16:creationId xmlns="" xmlns:a16="http://schemas.microsoft.com/office/drawing/2014/main" id="{12D9E898-3F2D-4024-A557-8FAA736C9FC5}"/>
               </a:ext>
             </a:extLst>
           </p:cNvPr>
@@ -761,7 +1838,7 @@
           <p:cNvPr id="2" name="Title 1">
             <a:extLst>
               <a:ext uri="{FF2B5EF4-FFF2-40B4-BE49-F238E27FC236}">
-                <a16:creationId xmlns:a16="http://schemas.microsoft.com/office/drawing/2014/main" id="{486AD373-D952-43FA-BE50-09530CB07D7A}"/>
+                <a16:creationId xmlns="" xmlns:a16="http://schemas.microsoft.com/office/drawing/2014/main" id="{486AD373-D952-43FA-BE50-09530CB07D7A}"/>
               </a:ext>
             </a:extLst>
           </p:cNvPr>
@@ -790,7 +1867,7 @@
           <p:cNvPr id="3" name="Content Placeholder 2">
             <a:extLst>
               <a:ext uri="{FF2B5EF4-FFF2-40B4-BE49-F238E27FC236}">
-                <a16:creationId xmlns:a16="http://schemas.microsoft.com/office/drawing/2014/main" id="{CD2F6BF4-4328-4512-8333-E178E907D547}"/>
+                <a16:creationId xmlns="" xmlns:a16="http://schemas.microsoft.com/office/drawing/2014/main" id="{CD2F6BF4-4328-4512-8333-E178E907D547}"/>
               </a:ext>
             </a:extLst>
           </p:cNvPr>
@@ -848,7 +1925,7 @@
           <p:cNvPr id="4" name="Date Placeholder 3">
             <a:extLst>
               <a:ext uri="{FF2B5EF4-FFF2-40B4-BE49-F238E27FC236}">
-                <a16:creationId xmlns:a16="http://schemas.microsoft.com/office/drawing/2014/main" id="{A1A8EED9-C1AB-46B0-8913-08764B639270}"/>
+                <a16:creationId xmlns="" xmlns:a16="http://schemas.microsoft.com/office/drawing/2014/main" id="{A1A8EED9-C1AB-46B0-8913-08764B639270}"/>
               </a:ext>
             </a:extLst>
           </p:cNvPr>
@@ -866,7 +1943,7 @@
           <a:p>
             <a:fld id="{8213B8F1-4FA8-4032-AA8A-75E99188CEDC}" type="datetimeFigureOut">
               <a:rPr lang="en-GB" smtClean="0"/>
-              <a:t>21/08/2019</a:t>
+              <a:t>23/09/2019</a:t>
             </a:fld>
             <a:endParaRPr lang="en-GB"/>
           </a:p>
@@ -877,7 +1954,7 @@
           <p:cNvPr id="5" name="Footer Placeholder 4">
             <a:extLst>
               <a:ext uri="{FF2B5EF4-FFF2-40B4-BE49-F238E27FC236}">
-                <a16:creationId xmlns:a16="http://schemas.microsoft.com/office/drawing/2014/main" id="{5BAB97B3-CB03-4D20-A8C1-A6CCC5B0055F}"/>
+                <a16:creationId xmlns="" xmlns:a16="http://schemas.microsoft.com/office/drawing/2014/main" id="{5BAB97B3-CB03-4D20-A8C1-A6CCC5B0055F}"/>
               </a:ext>
             </a:extLst>
           </p:cNvPr>
@@ -902,7 +1979,7 @@
           <p:cNvPr id="6" name="Slide Number Placeholder 5">
             <a:extLst>
               <a:ext uri="{FF2B5EF4-FFF2-40B4-BE49-F238E27FC236}">
-                <a16:creationId xmlns:a16="http://schemas.microsoft.com/office/drawing/2014/main" id="{B211D78D-8924-41A4-8DFC-CCBAD603F60A}"/>
+                <a16:creationId xmlns="" xmlns:a16="http://schemas.microsoft.com/office/drawing/2014/main" id="{B211D78D-8924-41A4-8DFC-CCBAD603F60A}"/>
               </a:ext>
             </a:extLst>
           </p:cNvPr>
@@ -961,7 +2038,7 @@
           <p:cNvPr id="2" name="Title 1">
             <a:extLst>
               <a:ext uri="{FF2B5EF4-FFF2-40B4-BE49-F238E27FC236}">
-                <a16:creationId xmlns:a16="http://schemas.microsoft.com/office/drawing/2014/main" id="{E3BB7673-8771-4347-AB9C-5B2AC3E70E58}"/>
+                <a16:creationId xmlns="" xmlns:a16="http://schemas.microsoft.com/office/drawing/2014/main" id="{E3BB7673-8771-4347-AB9C-5B2AC3E70E58}"/>
               </a:ext>
             </a:extLst>
           </p:cNvPr>
@@ -999,7 +2076,7 @@
           <p:cNvPr id="3" name="Text Placeholder 2">
             <a:extLst>
               <a:ext uri="{FF2B5EF4-FFF2-40B4-BE49-F238E27FC236}">
-                <a16:creationId xmlns:a16="http://schemas.microsoft.com/office/drawing/2014/main" id="{9F0B9040-A71F-4FF3-89EA-D70F908B5235}"/>
+                <a16:creationId xmlns="" xmlns:a16="http://schemas.microsoft.com/office/drawing/2014/main" id="{9F0B9040-A71F-4FF3-89EA-D70F908B5235}"/>
               </a:ext>
             </a:extLst>
           </p:cNvPr>
@@ -1124,7 +2201,7 @@
           <p:cNvPr id="4" name="Date Placeholder 3">
             <a:extLst>
               <a:ext uri="{FF2B5EF4-FFF2-40B4-BE49-F238E27FC236}">
-                <a16:creationId xmlns:a16="http://schemas.microsoft.com/office/drawing/2014/main" id="{4E0B58EA-D0AA-42C2-B1BE-04B84FF6B77F}"/>
+                <a16:creationId xmlns="" xmlns:a16="http://schemas.microsoft.com/office/drawing/2014/main" id="{4E0B58EA-D0AA-42C2-B1BE-04B84FF6B77F}"/>
               </a:ext>
             </a:extLst>
           </p:cNvPr>
@@ -1142,7 +2219,7 @@
           <a:p>
             <a:fld id="{8213B8F1-4FA8-4032-AA8A-75E99188CEDC}" type="datetimeFigureOut">
               <a:rPr lang="en-GB" smtClean="0"/>
-              <a:t>21/08/2019</a:t>
+              <a:t>23/09/2019</a:t>
             </a:fld>
             <a:endParaRPr lang="en-GB"/>
           </a:p>
@@ -1153,7 +2230,7 @@
           <p:cNvPr id="5" name="Footer Placeholder 4">
             <a:extLst>
               <a:ext uri="{FF2B5EF4-FFF2-40B4-BE49-F238E27FC236}">
-                <a16:creationId xmlns:a16="http://schemas.microsoft.com/office/drawing/2014/main" id="{6A27F45B-6307-4262-9DB1-73D13669B85F}"/>
+                <a16:creationId xmlns="" xmlns:a16="http://schemas.microsoft.com/office/drawing/2014/main" id="{6A27F45B-6307-4262-9DB1-73D13669B85F}"/>
               </a:ext>
             </a:extLst>
           </p:cNvPr>
@@ -1178,7 +2255,7 @@
           <p:cNvPr id="6" name="Slide Number Placeholder 5">
             <a:extLst>
               <a:ext uri="{FF2B5EF4-FFF2-40B4-BE49-F238E27FC236}">
-                <a16:creationId xmlns:a16="http://schemas.microsoft.com/office/drawing/2014/main" id="{FD59CB62-ED80-41E5-8977-6563EB797F5F}"/>
+                <a16:creationId xmlns="" xmlns:a16="http://schemas.microsoft.com/office/drawing/2014/main" id="{FD59CB62-ED80-41E5-8977-6563EB797F5F}"/>
               </a:ext>
             </a:extLst>
           </p:cNvPr>
@@ -1237,7 +2314,7 @@
           <p:cNvPr id="2" name="Title 1">
             <a:extLst>
               <a:ext uri="{FF2B5EF4-FFF2-40B4-BE49-F238E27FC236}">
-                <a16:creationId xmlns:a16="http://schemas.microsoft.com/office/drawing/2014/main" id="{34451ED7-1A03-4504-823A-B4EC63DBD9C6}"/>
+                <a16:creationId xmlns="" xmlns:a16="http://schemas.microsoft.com/office/drawing/2014/main" id="{34451ED7-1A03-4504-823A-B4EC63DBD9C6}"/>
               </a:ext>
             </a:extLst>
           </p:cNvPr>
@@ -1266,7 +2343,7 @@
           <p:cNvPr id="3" name="Content Placeholder 2">
             <a:extLst>
               <a:ext uri="{FF2B5EF4-FFF2-40B4-BE49-F238E27FC236}">
-                <a16:creationId xmlns:a16="http://schemas.microsoft.com/office/drawing/2014/main" id="{045CBEA4-6B74-4971-9705-A0C6BCCFA0CA}"/>
+                <a16:creationId xmlns="" xmlns:a16="http://schemas.microsoft.com/office/drawing/2014/main" id="{045CBEA4-6B74-4971-9705-A0C6BCCFA0CA}"/>
               </a:ext>
             </a:extLst>
           </p:cNvPr>
@@ -1329,7 +2406,7 @@
           <p:cNvPr id="4" name="Content Placeholder 3">
             <a:extLst>
               <a:ext uri="{FF2B5EF4-FFF2-40B4-BE49-F238E27FC236}">
-                <a16:creationId xmlns:a16="http://schemas.microsoft.com/office/drawing/2014/main" id="{6FC9779A-20EC-47C8-82F7-9CA508053117}"/>
+                <a16:creationId xmlns="" xmlns:a16="http://schemas.microsoft.com/office/drawing/2014/main" id="{6FC9779A-20EC-47C8-82F7-9CA508053117}"/>
               </a:ext>
             </a:extLst>
           </p:cNvPr>
@@ -1392,7 +2469,7 @@
           <p:cNvPr id="5" name="Date Placeholder 4">
             <a:extLst>
               <a:ext uri="{FF2B5EF4-FFF2-40B4-BE49-F238E27FC236}">
-                <a16:creationId xmlns:a16="http://schemas.microsoft.com/office/drawing/2014/main" id="{A5648987-78A5-4AC0-A3EC-8BC2AF931488}"/>
+                <a16:creationId xmlns="" xmlns:a16="http://schemas.microsoft.com/office/drawing/2014/main" id="{A5648987-78A5-4AC0-A3EC-8BC2AF931488}"/>
               </a:ext>
             </a:extLst>
           </p:cNvPr>
@@ -1410,7 +2487,7 @@
           <a:p>
             <a:fld id="{8213B8F1-4FA8-4032-AA8A-75E99188CEDC}" type="datetimeFigureOut">
               <a:rPr lang="en-GB" smtClean="0"/>
-              <a:t>21/08/2019</a:t>
+              <a:t>23/09/2019</a:t>
             </a:fld>
             <a:endParaRPr lang="en-GB"/>
           </a:p>
@@ -1421,7 +2498,7 @@
           <p:cNvPr id="6" name="Footer Placeholder 5">
             <a:extLst>
               <a:ext uri="{FF2B5EF4-FFF2-40B4-BE49-F238E27FC236}">
-                <a16:creationId xmlns:a16="http://schemas.microsoft.com/office/drawing/2014/main" id="{898795B0-BDD5-488E-81F0-5C211FA8FB8D}"/>
+                <a16:creationId xmlns="" xmlns:a16="http://schemas.microsoft.com/office/drawing/2014/main" id="{898795B0-BDD5-488E-81F0-5C211FA8FB8D}"/>
               </a:ext>
             </a:extLst>
           </p:cNvPr>
@@ -1446,7 +2523,7 @@
           <p:cNvPr id="7" name="Slide Number Placeholder 6">
             <a:extLst>
               <a:ext uri="{FF2B5EF4-FFF2-40B4-BE49-F238E27FC236}">
-                <a16:creationId xmlns:a16="http://schemas.microsoft.com/office/drawing/2014/main" id="{9E2819FA-E569-424C-A25C-80EFED539927}"/>
+                <a16:creationId xmlns="" xmlns:a16="http://schemas.microsoft.com/office/drawing/2014/main" id="{9E2819FA-E569-424C-A25C-80EFED539927}"/>
               </a:ext>
             </a:extLst>
           </p:cNvPr>
@@ -1505,7 +2582,7 @@
           <p:cNvPr id="2" name="Title 1">
             <a:extLst>
               <a:ext uri="{FF2B5EF4-FFF2-40B4-BE49-F238E27FC236}">
-                <a16:creationId xmlns:a16="http://schemas.microsoft.com/office/drawing/2014/main" id="{658F431B-B505-46DA-BC30-54323F1CFD8D}"/>
+                <a16:creationId xmlns="" xmlns:a16="http://schemas.microsoft.com/office/drawing/2014/main" id="{658F431B-B505-46DA-BC30-54323F1CFD8D}"/>
               </a:ext>
             </a:extLst>
           </p:cNvPr>
@@ -1539,7 +2616,7 @@
           <p:cNvPr id="3" name="Text Placeholder 2">
             <a:extLst>
               <a:ext uri="{FF2B5EF4-FFF2-40B4-BE49-F238E27FC236}">
-                <a16:creationId xmlns:a16="http://schemas.microsoft.com/office/drawing/2014/main" id="{57E98D5E-BC17-423C-A4FD-1C0808B6A52B}"/>
+                <a16:creationId xmlns="" xmlns:a16="http://schemas.microsoft.com/office/drawing/2014/main" id="{57E98D5E-BC17-423C-A4FD-1C0808B6A52B}"/>
               </a:ext>
             </a:extLst>
           </p:cNvPr>
@@ -1610,7 +2687,7 @@
           <p:cNvPr id="4" name="Content Placeholder 3">
             <a:extLst>
               <a:ext uri="{FF2B5EF4-FFF2-40B4-BE49-F238E27FC236}">
-                <a16:creationId xmlns:a16="http://schemas.microsoft.com/office/drawing/2014/main" id="{DC10028E-D307-403A-BFAE-CE0B0E897794}"/>
+                <a16:creationId xmlns="" xmlns:a16="http://schemas.microsoft.com/office/drawing/2014/main" id="{DC10028E-D307-403A-BFAE-CE0B0E897794}"/>
               </a:ext>
             </a:extLst>
           </p:cNvPr>
@@ -1673,7 +2750,7 @@
           <p:cNvPr id="5" name="Text Placeholder 4">
             <a:extLst>
               <a:ext uri="{FF2B5EF4-FFF2-40B4-BE49-F238E27FC236}">
-                <a16:creationId xmlns:a16="http://schemas.microsoft.com/office/drawing/2014/main" id="{F8787F25-ED59-4018-81D1-3EEBD21ACBA3}"/>
+                <a16:creationId xmlns="" xmlns:a16="http://schemas.microsoft.com/office/drawing/2014/main" id="{F8787F25-ED59-4018-81D1-3EEBD21ACBA3}"/>
               </a:ext>
             </a:extLst>
           </p:cNvPr>
@@ -1744,7 +2821,7 @@
           <p:cNvPr id="6" name="Content Placeholder 5">
             <a:extLst>
               <a:ext uri="{FF2B5EF4-FFF2-40B4-BE49-F238E27FC236}">
-                <a16:creationId xmlns:a16="http://schemas.microsoft.com/office/drawing/2014/main" id="{80801B13-FE1C-4039-ADF9-49DEF1C86BA8}"/>
+                <a16:creationId xmlns="" xmlns:a16="http://schemas.microsoft.com/office/drawing/2014/main" id="{80801B13-FE1C-4039-ADF9-49DEF1C86BA8}"/>
               </a:ext>
             </a:extLst>
           </p:cNvPr>
@@ -1807,7 +2884,7 @@
           <p:cNvPr id="7" name="Date Placeholder 6">
             <a:extLst>
               <a:ext uri="{FF2B5EF4-FFF2-40B4-BE49-F238E27FC236}">
-                <a16:creationId xmlns:a16="http://schemas.microsoft.com/office/drawing/2014/main" id="{AD389E22-C4EE-43D5-913E-5E15DC60EA0F}"/>
+                <a16:creationId xmlns="" xmlns:a16="http://schemas.microsoft.com/office/drawing/2014/main" id="{AD389E22-C4EE-43D5-913E-5E15DC60EA0F}"/>
               </a:ext>
             </a:extLst>
           </p:cNvPr>
@@ -1825,7 +2902,7 @@
           <a:p>
             <a:fld id="{8213B8F1-4FA8-4032-AA8A-75E99188CEDC}" type="datetimeFigureOut">
               <a:rPr lang="en-GB" smtClean="0"/>
-              <a:t>21/08/2019</a:t>
+              <a:t>23/09/2019</a:t>
             </a:fld>
             <a:endParaRPr lang="en-GB"/>
           </a:p>
@@ -1836,7 +2913,7 @@
           <p:cNvPr id="8" name="Footer Placeholder 7">
             <a:extLst>
               <a:ext uri="{FF2B5EF4-FFF2-40B4-BE49-F238E27FC236}">
-                <a16:creationId xmlns:a16="http://schemas.microsoft.com/office/drawing/2014/main" id="{F88DC2AA-A730-4AA6-A9D3-C273CAC60445}"/>
+                <a16:creationId xmlns="" xmlns:a16="http://schemas.microsoft.com/office/drawing/2014/main" id="{F88DC2AA-A730-4AA6-A9D3-C273CAC60445}"/>
               </a:ext>
             </a:extLst>
           </p:cNvPr>
@@ -1861,7 +2938,7 @@
           <p:cNvPr id="9" name="Slide Number Placeholder 8">
             <a:extLst>
               <a:ext uri="{FF2B5EF4-FFF2-40B4-BE49-F238E27FC236}">
-                <a16:creationId xmlns:a16="http://schemas.microsoft.com/office/drawing/2014/main" id="{6884A296-2A46-40A1-8B6E-224387C1E48B}"/>
+                <a16:creationId xmlns="" xmlns:a16="http://schemas.microsoft.com/office/drawing/2014/main" id="{6884A296-2A46-40A1-8B6E-224387C1E48B}"/>
               </a:ext>
             </a:extLst>
           </p:cNvPr>
@@ -1920,7 +2997,7 @@
           <p:cNvPr id="2" name="Title 1">
             <a:extLst>
               <a:ext uri="{FF2B5EF4-FFF2-40B4-BE49-F238E27FC236}">
-                <a16:creationId xmlns:a16="http://schemas.microsoft.com/office/drawing/2014/main" id="{151BE2FA-4BDC-4548-AF54-FC284ADADBAA}"/>
+                <a16:creationId xmlns="" xmlns:a16="http://schemas.microsoft.com/office/drawing/2014/main" id="{151BE2FA-4BDC-4548-AF54-FC284ADADBAA}"/>
               </a:ext>
             </a:extLst>
           </p:cNvPr>
@@ -1949,7 +3026,7 @@
           <p:cNvPr id="3" name="Date Placeholder 2">
             <a:extLst>
               <a:ext uri="{FF2B5EF4-FFF2-40B4-BE49-F238E27FC236}">
-                <a16:creationId xmlns:a16="http://schemas.microsoft.com/office/drawing/2014/main" id="{9CE11472-1B9B-485B-A9F2-4B4C341381EB}"/>
+                <a16:creationId xmlns="" xmlns:a16="http://schemas.microsoft.com/office/drawing/2014/main" id="{9CE11472-1B9B-485B-A9F2-4B4C341381EB}"/>
               </a:ext>
             </a:extLst>
           </p:cNvPr>
@@ -1967,7 +3044,7 @@
           <a:p>
             <a:fld id="{8213B8F1-4FA8-4032-AA8A-75E99188CEDC}" type="datetimeFigureOut">
               <a:rPr lang="en-GB" smtClean="0"/>
-              <a:t>21/08/2019</a:t>
+              <a:t>23/09/2019</a:t>
             </a:fld>
             <a:endParaRPr lang="en-GB"/>
           </a:p>
@@ -1978,7 +3055,7 @@
           <p:cNvPr id="4" name="Footer Placeholder 3">
             <a:extLst>
               <a:ext uri="{FF2B5EF4-FFF2-40B4-BE49-F238E27FC236}">
-                <a16:creationId xmlns:a16="http://schemas.microsoft.com/office/drawing/2014/main" id="{225A4296-4AA7-4EE2-8E5C-F3A5E8E8F7C0}"/>
+                <a16:creationId xmlns="" xmlns:a16="http://schemas.microsoft.com/office/drawing/2014/main" id="{225A4296-4AA7-4EE2-8E5C-F3A5E8E8F7C0}"/>
               </a:ext>
             </a:extLst>
           </p:cNvPr>
@@ -2003,7 +3080,7 @@
           <p:cNvPr id="5" name="Slide Number Placeholder 4">
             <a:extLst>
               <a:ext uri="{FF2B5EF4-FFF2-40B4-BE49-F238E27FC236}">
-                <a16:creationId xmlns:a16="http://schemas.microsoft.com/office/drawing/2014/main" id="{BFACE21C-FDA1-4E38-9915-1A9992228784}"/>
+                <a16:creationId xmlns="" xmlns:a16="http://schemas.microsoft.com/office/drawing/2014/main" id="{BFACE21C-FDA1-4E38-9915-1A9992228784}"/>
               </a:ext>
             </a:extLst>
           </p:cNvPr>
@@ -2062,7 +3139,7 @@
           <p:cNvPr id="2" name="Date Placeholder 1">
             <a:extLst>
               <a:ext uri="{FF2B5EF4-FFF2-40B4-BE49-F238E27FC236}">
-                <a16:creationId xmlns:a16="http://schemas.microsoft.com/office/drawing/2014/main" id="{5DB6FE37-88E5-4B47-9ADD-1ED945C770EE}"/>
+                <a16:creationId xmlns="" xmlns:a16="http://schemas.microsoft.com/office/drawing/2014/main" id="{5DB6FE37-88E5-4B47-9ADD-1ED945C770EE}"/>
               </a:ext>
             </a:extLst>
           </p:cNvPr>
@@ -2080,7 +3157,7 @@
           <a:p>
             <a:fld id="{8213B8F1-4FA8-4032-AA8A-75E99188CEDC}" type="datetimeFigureOut">
               <a:rPr lang="en-GB" smtClean="0"/>
-              <a:t>21/08/2019</a:t>
+              <a:t>23/09/2019</a:t>
             </a:fld>
             <a:endParaRPr lang="en-GB"/>
           </a:p>
@@ -2091,7 +3168,7 @@
           <p:cNvPr id="3" name="Footer Placeholder 2">
             <a:extLst>
               <a:ext uri="{FF2B5EF4-FFF2-40B4-BE49-F238E27FC236}">
-                <a16:creationId xmlns:a16="http://schemas.microsoft.com/office/drawing/2014/main" id="{403ECF62-4B40-486D-933D-8C7150E3D5E6}"/>
+                <a16:creationId xmlns="" xmlns:a16="http://schemas.microsoft.com/office/drawing/2014/main" id="{403ECF62-4B40-486D-933D-8C7150E3D5E6}"/>
               </a:ext>
             </a:extLst>
           </p:cNvPr>
@@ -2116,7 +3193,7 @@
           <p:cNvPr id="4" name="Slide Number Placeholder 3">
             <a:extLst>
               <a:ext uri="{FF2B5EF4-FFF2-40B4-BE49-F238E27FC236}">
-                <a16:creationId xmlns:a16="http://schemas.microsoft.com/office/drawing/2014/main" id="{70753508-4527-4668-9E1E-B293F0CDC7E0}"/>
+                <a16:creationId xmlns="" xmlns:a16="http://schemas.microsoft.com/office/drawing/2014/main" id="{70753508-4527-4668-9E1E-B293F0CDC7E0}"/>
               </a:ext>
             </a:extLst>
           </p:cNvPr>
@@ -2175,7 +3252,7 @@
           <p:cNvPr id="2" name="Title 1">
             <a:extLst>
               <a:ext uri="{FF2B5EF4-FFF2-40B4-BE49-F238E27FC236}">
-                <a16:creationId xmlns:a16="http://schemas.microsoft.com/office/drawing/2014/main" id="{DC4C9377-0281-4C76-BE19-A8C4C8C3FC22}"/>
+                <a16:creationId xmlns="" xmlns:a16="http://schemas.microsoft.com/office/drawing/2014/main" id="{DC4C9377-0281-4C76-BE19-A8C4C8C3FC22}"/>
               </a:ext>
             </a:extLst>
           </p:cNvPr>
@@ -2213,7 +3290,7 @@
           <p:cNvPr id="3" name="Content Placeholder 2">
             <a:extLst>
               <a:ext uri="{FF2B5EF4-FFF2-40B4-BE49-F238E27FC236}">
-                <a16:creationId xmlns:a16="http://schemas.microsoft.com/office/drawing/2014/main" id="{A07F3FA1-1FBB-48D6-9891-B0597D953729}"/>
+                <a16:creationId xmlns="" xmlns:a16="http://schemas.microsoft.com/office/drawing/2014/main" id="{A07F3FA1-1FBB-48D6-9891-B0597D953729}"/>
               </a:ext>
             </a:extLst>
           </p:cNvPr>
@@ -2304,7 +3381,7 @@
           <p:cNvPr id="4" name="Text Placeholder 3">
             <a:extLst>
               <a:ext uri="{FF2B5EF4-FFF2-40B4-BE49-F238E27FC236}">
-                <a16:creationId xmlns:a16="http://schemas.microsoft.com/office/drawing/2014/main" id="{231115EA-5FCB-4A15-8B0E-36A3CD0FF1C4}"/>
+                <a16:creationId xmlns="" xmlns:a16="http://schemas.microsoft.com/office/drawing/2014/main" id="{231115EA-5FCB-4A15-8B0E-36A3CD0FF1C4}"/>
               </a:ext>
             </a:extLst>
           </p:cNvPr>
@@ -2375,7 +3452,7 @@
           <p:cNvPr id="5" name="Date Placeholder 4">
             <a:extLst>
               <a:ext uri="{FF2B5EF4-FFF2-40B4-BE49-F238E27FC236}">
-                <a16:creationId xmlns:a16="http://schemas.microsoft.com/office/drawing/2014/main" id="{48395D86-3296-4EBF-B150-1CD8C5780387}"/>
+                <a16:creationId xmlns="" xmlns:a16="http://schemas.microsoft.com/office/drawing/2014/main" id="{48395D86-3296-4EBF-B150-1CD8C5780387}"/>
               </a:ext>
             </a:extLst>
           </p:cNvPr>
@@ -2393,7 +3470,7 @@
           <a:p>
             <a:fld id="{8213B8F1-4FA8-4032-AA8A-75E99188CEDC}" type="datetimeFigureOut">
               <a:rPr lang="en-GB" smtClean="0"/>
-              <a:t>21/08/2019</a:t>
+              <a:t>23/09/2019</a:t>
             </a:fld>
             <a:endParaRPr lang="en-GB"/>
           </a:p>
@@ -2404,7 +3481,7 @@
           <p:cNvPr id="6" name="Footer Placeholder 5">
             <a:extLst>
               <a:ext uri="{FF2B5EF4-FFF2-40B4-BE49-F238E27FC236}">
-                <a16:creationId xmlns:a16="http://schemas.microsoft.com/office/drawing/2014/main" id="{C511DB44-D2CE-44CD-A77B-033062A5B0D9}"/>
+                <a16:creationId xmlns="" xmlns:a16="http://schemas.microsoft.com/office/drawing/2014/main" id="{C511DB44-D2CE-44CD-A77B-033062A5B0D9}"/>
               </a:ext>
             </a:extLst>
           </p:cNvPr>
@@ -2429,7 +3506,7 @@
           <p:cNvPr id="7" name="Slide Number Placeholder 6">
             <a:extLst>
               <a:ext uri="{FF2B5EF4-FFF2-40B4-BE49-F238E27FC236}">
-                <a16:creationId xmlns:a16="http://schemas.microsoft.com/office/drawing/2014/main" id="{1EDF7FDE-2F2D-4158-A9B8-2F45231FBEA1}"/>
+                <a16:creationId xmlns="" xmlns:a16="http://schemas.microsoft.com/office/drawing/2014/main" id="{1EDF7FDE-2F2D-4158-A9B8-2F45231FBEA1}"/>
               </a:ext>
             </a:extLst>
           </p:cNvPr>
@@ -2488,7 +3565,7 @@
           <p:cNvPr id="2" name="Title 1">
             <a:extLst>
               <a:ext uri="{FF2B5EF4-FFF2-40B4-BE49-F238E27FC236}">
-                <a16:creationId xmlns:a16="http://schemas.microsoft.com/office/drawing/2014/main" id="{75FF1457-A9A0-450F-896C-6EEAA634D3B1}"/>
+                <a16:creationId xmlns="" xmlns:a16="http://schemas.microsoft.com/office/drawing/2014/main" id="{75FF1457-A9A0-450F-896C-6EEAA634D3B1}"/>
               </a:ext>
             </a:extLst>
           </p:cNvPr>
@@ -2526,7 +3603,7 @@
           <p:cNvPr id="3" name="Picture Placeholder 2">
             <a:extLst>
               <a:ext uri="{FF2B5EF4-FFF2-40B4-BE49-F238E27FC236}">
-                <a16:creationId xmlns:a16="http://schemas.microsoft.com/office/drawing/2014/main" id="{6164A345-6822-4F47-89F6-7BC05355345A}"/>
+                <a16:creationId xmlns="" xmlns:a16="http://schemas.microsoft.com/office/drawing/2014/main" id="{6164A345-6822-4F47-89F6-7BC05355345A}"/>
               </a:ext>
             </a:extLst>
           </p:cNvPr>
@@ -2593,7 +3670,7 @@
           <p:cNvPr id="4" name="Text Placeholder 3">
             <a:extLst>
               <a:ext uri="{FF2B5EF4-FFF2-40B4-BE49-F238E27FC236}">
-                <a16:creationId xmlns:a16="http://schemas.microsoft.com/office/drawing/2014/main" id="{ABCE6FDB-C326-4723-9D4D-23AC6DBB1682}"/>
+                <a16:creationId xmlns="" xmlns:a16="http://schemas.microsoft.com/office/drawing/2014/main" id="{ABCE6FDB-C326-4723-9D4D-23AC6DBB1682}"/>
               </a:ext>
             </a:extLst>
           </p:cNvPr>
@@ -2664,7 +3741,7 @@
           <p:cNvPr id="5" name="Date Placeholder 4">
             <a:extLst>
               <a:ext uri="{FF2B5EF4-FFF2-40B4-BE49-F238E27FC236}">
-                <a16:creationId xmlns:a16="http://schemas.microsoft.com/office/drawing/2014/main" id="{C4CDD1DD-4547-4AE5-9171-9CCEA0D78477}"/>
+                <a16:creationId xmlns="" xmlns:a16="http://schemas.microsoft.com/office/drawing/2014/main" id="{C4CDD1DD-4547-4AE5-9171-9CCEA0D78477}"/>
               </a:ext>
             </a:extLst>
           </p:cNvPr>
@@ -2682,7 +3759,7 @@
           <a:p>
             <a:fld id="{8213B8F1-4FA8-4032-AA8A-75E99188CEDC}" type="datetimeFigureOut">
               <a:rPr lang="en-GB" smtClean="0"/>
-              <a:t>21/08/2019</a:t>
+              <a:t>23/09/2019</a:t>
             </a:fld>
             <a:endParaRPr lang="en-GB"/>
           </a:p>
@@ -2693,7 +3770,7 @@
           <p:cNvPr id="6" name="Footer Placeholder 5">
             <a:extLst>
               <a:ext uri="{FF2B5EF4-FFF2-40B4-BE49-F238E27FC236}">
-                <a16:creationId xmlns:a16="http://schemas.microsoft.com/office/drawing/2014/main" id="{7565A681-C324-487B-8F18-1C939E669988}"/>
+                <a16:creationId xmlns="" xmlns:a16="http://schemas.microsoft.com/office/drawing/2014/main" id="{7565A681-C324-487B-8F18-1C939E669988}"/>
               </a:ext>
             </a:extLst>
           </p:cNvPr>
@@ -2718,7 +3795,7 @@
           <p:cNvPr id="7" name="Slide Number Placeholder 6">
             <a:extLst>
               <a:ext uri="{FF2B5EF4-FFF2-40B4-BE49-F238E27FC236}">
-                <a16:creationId xmlns:a16="http://schemas.microsoft.com/office/drawing/2014/main" id="{404D1DDA-1BD5-4E14-92E7-0E0F1313A3E1}"/>
+                <a16:creationId xmlns="" xmlns:a16="http://schemas.microsoft.com/office/drawing/2014/main" id="{404D1DDA-1BD5-4E14-92E7-0E0F1313A3E1}"/>
               </a:ext>
             </a:extLst>
           </p:cNvPr>
@@ -2782,7 +3859,7 @@
           <p:cNvPr id="2" name="Title Placeholder 1">
             <a:extLst>
               <a:ext uri="{FF2B5EF4-FFF2-40B4-BE49-F238E27FC236}">
-                <a16:creationId xmlns:a16="http://schemas.microsoft.com/office/drawing/2014/main" id="{C818B69C-8AEC-4CA3-8FBD-33FD461A10B2}"/>
+                <a16:creationId xmlns="" xmlns:a16="http://schemas.microsoft.com/office/drawing/2014/main" id="{C818B69C-8AEC-4CA3-8FBD-33FD461A10B2}"/>
               </a:ext>
             </a:extLst>
           </p:cNvPr>
@@ -2821,7 +3898,7 @@
           <p:cNvPr id="3" name="Text Placeholder 2">
             <a:extLst>
               <a:ext uri="{FF2B5EF4-FFF2-40B4-BE49-F238E27FC236}">
-                <a16:creationId xmlns:a16="http://schemas.microsoft.com/office/drawing/2014/main" id="{CACE0EA0-4115-444B-9A7B-6A79EF96CA39}"/>
+                <a16:creationId xmlns="" xmlns:a16="http://schemas.microsoft.com/office/drawing/2014/main" id="{CACE0EA0-4115-444B-9A7B-6A79EF96CA39}"/>
               </a:ext>
             </a:extLst>
           </p:cNvPr>
@@ -2889,7 +3966,7 @@
           <p:cNvPr id="4" name="Date Placeholder 3">
             <a:extLst>
               <a:ext uri="{FF2B5EF4-FFF2-40B4-BE49-F238E27FC236}">
-                <a16:creationId xmlns:a16="http://schemas.microsoft.com/office/drawing/2014/main" id="{E09A6724-D2BE-48EB-A284-17505879D6C1}"/>
+                <a16:creationId xmlns="" xmlns:a16="http://schemas.microsoft.com/office/drawing/2014/main" id="{E09A6724-D2BE-48EB-A284-17505879D6C1}"/>
               </a:ext>
             </a:extLst>
           </p:cNvPr>
@@ -2925,7 +4002,7 @@
           <a:p>
             <a:fld id="{8213B8F1-4FA8-4032-AA8A-75E99188CEDC}" type="datetimeFigureOut">
               <a:rPr lang="en-GB" smtClean="0"/>
-              <a:t>21/08/2019</a:t>
+              <a:t>23/09/2019</a:t>
             </a:fld>
             <a:endParaRPr lang="en-GB"/>
           </a:p>
@@ -2936,7 +4013,7 @@
           <p:cNvPr id="5" name="Footer Placeholder 4">
             <a:extLst>
               <a:ext uri="{FF2B5EF4-FFF2-40B4-BE49-F238E27FC236}">
-                <a16:creationId xmlns:a16="http://schemas.microsoft.com/office/drawing/2014/main" id="{C591376B-2C18-4AF7-B380-97663C632EFD}"/>
+                <a16:creationId xmlns="" xmlns:a16="http://schemas.microsoft.com/office/drawing/2014/main" id="{C591376B-2C18-4AF7-B380-97663C632EFD}"/>
               </a:ext>
             </a:extLst>
           </p:cNvPr>
@@ -2979,7 +4056,7 @@
           <p:cNvPr id="6" name="Slide Number Placeholder 5">
             <a:extLst>
               <a:ext uri="{FF2B5EF4-FFF2-40B4-BE49-F238E27FC236}">
-                <a16:creationId xmlns:a16="http://schemas.microsoft.com/office/drawing/2014/main" id="{72FFCF1F-BC9C-4E6D-BB0B-8744C16DEAE4}"/>
+                <a16:creationId xmlns="" xmlns:a16="http://schemas.microsoft.com/office/drawing/2014/main" id="{72FFCF1F-BC9C-4E6D-BB0B-8744C16DEAE4}"/>
               </a:ext>
             </a:extLst>
           </p:cNvPr>
@@ -3347,7 +4424,7 @@
           <p:cNvPr id="2" name="Title 1">
             <a:extLst>
               <a:ext uri="{FF2B5EF4-FFF2-40B4-BE49-F238E27FC236}">
-                <a16:creationId xmlns:a16="http://schemas.microsoft.com/office/drawing/2014/main" id="{351E99D9-5BBC-49D3-8755-D102E4EF7FDB}"/>
+                <a16:creationId xmlns="" xmlns:a16="http://schemas.microsoft.com/office/drawing/2014/main" id="{351E99D9-5BBC-49D3-8755-D102E4EF7FDB}"/>
               </a:ext>
             </a:extLst>
           </p:cNvPr>
@@ -3358,21 +4435,26 @@
             <p:ph type="title"/>
           </p:nvPr>
         </p:nvSpPr>
-        <p:spPr/>
+        <p:spPr>
+          <a:xfrm>
+            <a:off x="47344" y="-46617"/>
+            <a:ext cx="10515600" cy="1325563"/>
+          </a:xfrm>
+        </p:spPr>
         <p:txBody>
           <a:bodyPr/>
           <a:lstStyle/>
           <a:p>
             <a:r>
-              <a:rPr lang="en-GB" dirty="0"/>
+              <a:rPr lang="en-GB" sz="3600" dirty="0"/>
               <a:t>RT-</a:t>
             </a:r>
             <a:r>
-              <a:rPr lang="en-GB" dirty="0" err="1"/>
+              <a:rPr lang="en-GB" sz="3600" dirty="0" err="1"/>
               <a:t>QuIC</a:t>
             </a:r>
             <a:r>
-              <a:rPr lang="en-GB" dirty="0"/>
+              <a:rPr lang="en-GB" sz="3600" dirty="0"/>
               <a:t> Data Analysis Paper</a:t>
             </a:r>
           </a:p>
@@ -3383,7 +4465,7 @@
           <p:cNvPr id="6" name="Flowchart: Alternate Process 5">
             <a:extLst>
               <a:ext uri="{FF2B5EF4-FFF2-40B4-BE49-F238E27FC236}">
-                <a16:creationId xmlns:a16="http://schemas.microsoft.com/office/drawing/2014/main" id="{E50ED68C-86EC-4071-BFF4-2618BA705745}"/>
+                <a16:creationId xmlns="" xmlns:a16="http://schemas.microsoft.com/office/drawing/2014/main" id="{E50ED68C-86EC-4071-BFF4-2618BA705745}"/>
               </a:ext>
             </a:extLst>
           </p:cNvPr>
@@ -3392,7 +4474,56 @@
         </p:nvSpPr>
         <p:spPr>
           <a:xfrm>
-            <a:off x="964276" y="1441980"/>
+            <a:off x="156968" y="1378745"/>
+            <a:ext cx="1577756" cy="499042"/>
+          </a:xfrm>
+          <a:prstGeom prst="flowChartAlternateProcess">
+            <a:avLst/>
+          </a:prstGeom>
+        </p:spPr>
+        <p:style>
+          <a:lnRef idx="2">
+            <a:schemeClr val="accent1">
+              <a:shade val="50000"/>
+            </a:schemeClr>
+          </a:lnRef>
+          <a:fillRef idx="1">
+            <a:schemeClr val="accent1"/>
+          </a:fillRef>
+          <a:effectRef idx="0">
+            <a:schemeClr val="accent1"/>
+          </a:effectRef>
+          <a:fontRef idx="minor">
+            <a:schemeClr val="lt1"/>
+          </a:fontRef>
+        </p:style>
+        <p:txBody>
+          <a:bodyPr rtlCol="0" anchor="ctr"/>
+          <a:lstStyle/>
+          <a:p>
+            <a:pPr algn="ctr"/>
+            <a:r>
+              <a:rPr lang="en-GB" sz="1400" dirty="0"/>
+              <a:t>Extract Data from excel sheet</a:t>
+            </a:r>
+          </a:p>
+        </p:txBody>
+      </p:sp>
+      <p:sp>
+        <p:nvSpPr>
+          <p:cNvPr id="7" name="Flowchart: Alternate Process 6">
+            <a:extLst>
+              <a:ext uri="{FF2B5EF4-FFF2-40B4-BE49-F238E27FC236}">
+                <a16:creationId xmlns="" xmlns:a16="http://schemas.microsoft.com/office/drawing/2014/main" id="{DA9A838E-A9F0-47AA-96AE-D742D1BBE926}"/>
+              </a:ext>
+            </a:extLst>
+          </p:cNvPr>
+          <p:cNvSpPr/>
+          <p:nvPr/>
+        </p:nvSpPr>
+        <p:spPr>
+          <a:xfrm>
+            <a:off x="2853714" y="3828383"/>
             <a:ext cx="1577756" cy="962891"/>
           </a:xfrm>
           <a:prstGeom prst="flowChartAlternateProcess">
@@ -3421,18 +4552,18 @@
           <a:p>
             <a:pPr algn="ctr"/>
             <a:r>
-              <a:rPr lang="en-GB" dirty="0"/>
-              <a:t>Extract Data from excel sheet</a:t>
-            </a:r>
-          </a:p>
-        </p:txBody>
-      </p:sp>
-      <p:sp>
-        <p:nvSpPr>
-          <p:cNvPr id="7" name="Flowchart: Alternate Process 6">
-            <a:extLst>
-              <a:ext uri="{FF2B5EF4-FFF2-40B4-BE49-F238E27FC236}">
-                <a16:creationId xmlns:a16="http://schemas.microsoft.com/office/drawing/2014/main" id="{DA9A838E-A9F0-47AA-96AE-D742D1BBE926}"/>
+              <a:rPr lang="en-GB" sz="1400" dirty="0"/>
+              <a:t>Extract Data from multiple excel sheets</a:t>
+            </a:r>
+          </a:p>
+        </p:txBody>
+      </p:sp>
+      <p:sp>
+        <p:nvSpPr>
+          <p:cNvPr id="12" name="Flowchart: Alternate Process 11">
+            <a:extLst>
+              <a:ext uri="{FF2B5EF4-FFF2-40B4-BE49-F238E27FC236}">
+                <a16:creationId xmlns="" xmlns:a16="http://schemas.microsoft.com/office/drawing/2014/main" id="{B7E2B5BD-31AB-4FEB-843A-CF8511E26A1A}"/>
               </a:ext>
             </a:extLst>
           </p:cNvPr>
@@ -3441,102 +4572,8 @@
         </p:nvSpPr>
         <p:spPr>
           <a:xfrm>
-            <a:off x="4408517" y="3185753"/>
-            <a:ext cx="1577756" cy="962891"/>
-          </a:xfrm>
-          <a:prstGeom prst="flowChartAlternateProcess">
-            <a:avLst/>
-          </a:prstGeom>
-        </p:spPr>
-        <p:style>
-          <a:lnRef idx="2">
-            <a:schemeClr val="accent1">
-              <a:shade val="50000"/>
-            </a:schemeClr>
-          </a:lnRef>
-          <a:fillRef idx="1">
-            <a:schemeClr val="accent1"/>
-          </a:fillRef>
-          <a:effectRef idx="0">
-            <a:schemeClr val="accent1"/>
-          </a:effectRef>
-          <a:fontRef idx="minor">
-            <a:schemeClr val="lt1"/>
-          </a:fontRef>
-        </p:style>
-        <p:txBody>
-          <a:bodyPr rtlCol="0" anchor="ctr"/>
-          <a:lstStyle/>
-          <a:p>
-            <a:pPr algn="ctr"/>
-            <a:r>
-              <a:rPr lang="en-GB" dirty="0"/>
-              <a:t>Extract Data from multiple excel sheets</a:t>
-            </a:r>
-          </a:p>
-        </p:txBody>
-      </p:sp>
-      <p:cxnSp>
-        <p:nvCxnSpPr>
-          <p:cNvPr id="9" name="Connector: Elbow 8">
-            <a:extLst>
-              <a:ext uri="{FF2B5EF4-FFF2-40B4-BE49-F238E27FC236}">
-                <a16:creationId xmlns:a16="http://schemas.microsoft.com/office/drawing/2014/main" id="{9C26517B-933A-494E-9138-A2CDB0AD50EB}"/>
-              </a:ext>
-            </a:extLst>
-          </p:cNvPr>
-          <p:cNvCxnSpPr>
-            <a:cxnSpLocks/>
-            <a:stCxn id="6" idx="2"/>
-            <a:endCxn id="13" idx="0"/>
-          </p:cNvCxnSpPr>
-          <p:nvPr/>
-        </p:nvCxnSpPr>
-        <p:spPr>
-          <a:xfrm rot="16200000" flipH="1">
-            <a:off x="2214362" y="1943663"/>
-            <a:ext cx="361347" cy="1283762"/>
-          </a:xfrm>
-          <a:prstGeom prst="bentConnector3">
-            <a:avLst>
-              <a:gd name="adj1" fmla="val 50000"/>
-            </a:avLst>
-          </a:prstGeom>
-          <a:ln>
-            <a:tailEnd type="triangle"/>
-          </a:ln>
-        </p:spPr>
-        <p:style>
-          <a:lnRef idx="1">
-            <a:schemeClr val="accent1"/>
-          </a:lnRef>
-          <a:fillRef idx="0">
-            <a:schemeClr val="accent1"/>
-          </a:fillRef>
-          <a:effectRef idx="0">
-            <a:schemeClr val="accent1"/>
-          </a:effectRef>
-          <a:fontRef idx="minor">
-            <a:schemeClr val="tx1"/>
-          </a:fontRef>
-        </p:style>
-      </p:cxnSp>
-      <p:sp>
-        <p:nvSpPr>
-          <p:cNvPr id="12" name="Flowchart: Alternate Process 11">
-            <a:extLst>
-              <a:ext uri="{FF2B5EF4-FFF2-40B4-BE49-F238E27FC236}">
-                <a16:creationId xmlns:a16="http://schemas.microsoft.com/office/drawing/2014/main" id="{B7E2B5BD-31AB-4FEB-843A-CF8511E26A1A}"/>
-              </a:ext>
-            </a:extLst>
-          </p:cNvPr>
-          <p:cNvSpPr/>
-          <p:nvPr/>
-        </p:nvSpPr>
-        <p:spPr>
-          <a:xfrm>
-            <a:off x="8138160" y="5179541"/>
-            <a:ext cx="3212592" cy="1609979"/>
+            <a:off x="8948058" y="5836694"/>
+            <a:ext cx="3096550" cy="952826"/>
           </a:xfrm>
           <a:prstGeom prst="flowChartAlternateProcess">
             <a:avLst/>
@@ -3569,17 +4606,30 @@
           <a:p>
             <a:pPr algn="ctr"/>
             <a:r>
-              <a:rPr lang="en-GB" dirty="0"/>
-              <a:t>Paper describing how RT-</a:t>
-            </a:r>
-            <a:r>
-              <a:rPr lang="en-GB" dirty="0" err="1"/>
+              <a:rPr lang="en-GB" sz="1400" dirty="0"/>
+              <a:t>Paper describing how </a:t>
+            </a:r>
+            <a:r>
+              <a:rPr lang="en-GB" sz="1400" dirty="0" smtClean="0"/>
+              <a:t>subtypes </a:t>
+            </a:r>
+            <a:r>
+              <a:rPr lang="en-GB" sz="1400" dirty="0"/>
+              <a:t>can be distinguished using computational analysis of RT-</a:t>
+            </a:r>
+            <a:r>
+              <a:rPr lang="en-GB" sz="1400" dirty="0" err="1"/>
               <a:t>QuIC</a:t>
             </a:r>
             <a:r>
-              <a:rPr lang="en-GB" dirty="0"/>
-              <a:t> subtypes can be distinguished using computational analysis</a:t>
-            </a:r>
+              <a:rPr lang="en-GB" sz="1400" dirty="0"/>
+              <a:t> </a:t>
+            </a:r>
+            <a:r>
+              <a:rPr lang="en-GB" sz="1400" dirty="0" smtClean="0"/>
+              <a:t>data</a:t>
+            </a:r>
+            <a:endParaRPr lang="en-GB" sz="1400" dirty="0"/>
           </a:p>
         </p:txBody>
       </p:sp>
@@ -3588,7 +4638,7 @@
           <p:cNvPr id="13" name="Flowchart: Alternate Process 12">
             <a:extLst>
               <a:ext uri="{FF2B5EF4-FFF2-40B4-BE49-F238E27FC236}">
-                <a16:creationId xmlns:a16="http://schemas.microsoft.com/office/drawing/2014/main" id="{FE5BE73E-48CF-451A-A787-D80042DAA6BF}"/>
+                <a16:creationId xmlns="" xmlns:a16="http://schemas.microsoft.com/office/drawing/2014/main" id="{FE5BE73E-48CF-451A-A787-D80042DAA6BF}"/>
               </a:ext>
             </a:extLst>
           </p:cNvPr>
@@ -3597,8 +4647,8 @@
         </p:nvSpPr>
         <p:spPr>
           <a:xfrm>
-            <a:off x="2080398" y="2766218"/>
-            <a:ext cx="1913036" cy="1325563"/>
+            <a:off x="940678" y="1950847"/>
+            <a:ext cx="1913036" cy="755350"/>
           </a:xfrm>
           <a:prstGeom prst="flowChartAlternateProcess">
             <a:avLst/>
@@ -3626,14 +4676,14 @@
           <a:p>
             <a:pPr algn="ctr"/>
             <a:r>
-              <a:rPr lang="en-GB" dirty="0"/>
+              <a:rPr lang="en-GB" sz="1400" dirty="0"/>
               <a:t>Analyse data to extract features e.g. lag time, max </a:t>
             </a:r>
             <a:r>
-              <a:rPr lang="en-GB" dirty="0" err="1"/>
+              <a:rPr lang="en-GB" sz="1400" dirty="0" err="1"/>
               <a:t>val</a:t>
             </a:r>
-            <a:endParaRPr lang="en-GB" dirty="0"/>
+            <a:endParaRPr lang="en-GB" sz="1400" dirty="0"/>
           </a:p>
         </p:txBody>
       </p:sp>
@@ -3642,7 +4692,7 @@
           <p:cNvPr id="14" name="Flowchart: Alternate Process 13">
             <a:extLst>
               <a:ext uri="{FF2B5EF4-FFF2-40B4-BE49-F238E27FC236}">
-                <a16:creationId xmlns:a16="http://schemas.microsoft.com/office/drawing/2014/main" id="{65F07737-22D7-4BCD-8967-2CF9EABD27C2}"/>
+                <a16:creationId xmlns="" xmlns:a16="http://schemas.microsoft.com/office/drawing/2014/main" id="{65F07737-22D7-4BCD-8967-2CF9EABD27C2}"/>
               </a:ext>
             </a:extLst>
           </p:cNvPr>
@@ -3651,8 +4701,8 @@
         </p:nvSpPr>
         <p:spPr>
           <a:xfrm>
-            <a:off x="9396984" y="3428999"/>
-            <a:ext cx="1913036" cy="1325563"/>
+            <a:off x="7035022" y="2078418"/>
+            <a:ext cx="1913036" cy="639762"/>
           </a:xfrm>
           <a:prstGeom prst="flowChartAlternateProcess">
             <a:avLst/>
@@ -3680,7 +4730,7 @@
           <a:p>
             <a:pPr algn="ctr"/>
             <a:r>
-              <a:rPr lang="en-GB" dirty="0"/>
+              <a:rPr lang="en-GB" sz="1400" dirty="0"/>
               <a:t>Perform cluster analysis on data</a:t>
             </a:r>
           </a:p>
@@ -3691,7 +4741,7 @@
           <p:cNvPr id="15" name="Flowchart: Alternate Process 14">
             <a:extLst>
               <a:ext uri="{FF2B5EF4-FFF2-40B4-BE49-F238E27FC236}">
-                <a16:creationId xmlns:a16="http://schemas.microsoft.com/office/drawing/2014/main" id="{84B9D0E4-53E1-49A9-9D13-1760C6A7E042}"/>
+                <a16:creationId xmlns="" xmlns:a16="http://schemas.microsoft.com/office/drawing/2014/main" id="{84B9D0E4-53E1-49A9-9D13-1760C6A7E042}"/>
               </a:ext>
             </a:extLst>
           </p:cNvPr>
@@ -3700,8 +4750,8 @@
         </p:nvSpPr>
         <p:spPr>
           <a:xfrm>
-            <a:off x="5254752" y="4350011"/>
-            <a:ext cx="1913036" cy="1506899"/>
+            <a:off x="3184561" y="999820"/>
+            <a:ext cx="1913036" cy="824498"/>
           </a:xfrm>
           <a:prstGeom prst="flowChartAlternateProcess">
             <a:avLst/>
@@ -3729,208 +4779,28 @@
           <a:p>
             <a:pPr algn="ctr"/>
             <a:r>
-              <a:rPr lang="en-GB" dirty="0"/>
+              <a:rPr lang="en-GB" sz="1400" dirty="0"/>
               <a:t>Sort data into categories by label and plot</a:t>
             </a:r>
           </a:p>
         </p:txBody>
       </p:sp>
-      <p:cxnSp>
-        <p:nvCxnSpPr>
-          <p:cNvPr id="19" name="Connector: Elbow 18">
-            <a:extLst>
-              <a:ext uri="{FF2B5EF4-FFF2-40B4-BE49-F238E27FC236}">
-                <a16:creationId xmlns:a16="http://schemas.microsoft.com/office/drawing/2014/main" id="{50BDC0CE-2164-4B46-9962-D6D00AA7D9CA}"/>
-              </a:ext>
-            </a:extLst>
-          </p:cNvPr>
-          <p:cNvCxnSpPr>
-            <a:cxnSpLocks/>
-            <a:stCxn id="13" idx="3"/>
-            <a:endCxn id="7" idx="0"/>
-          </p:cNvCxnSpPr>
+      <p:sp>
+        <p:nvSpPr>
+          <p:cNvPr id="44" name="Arrow: Up 43">
+            <a:extLst>
+              <a:ext uri="{FF2B5EF4-FFF2-40B4-BE49-F238E27FC236}">
+                <a16:creationId xmlns="" xmlns:a16="http://schemas.microsoft.com/office/drawing/2014/main" id="{2E50A4B3-FB18-413B-88D4-D22CC847654E}"/>
+              </a:ext>
+            </a:extLst>
+          </p:cNvPr>
+          <p:cNvSpPr/>
           <p:nvPr/>
-        </p:nvCxnSpPr>
-        <p:spPr>
-          <a:xfrm flipV="1">
-            <a:off x="3993434" y="3185753"/>
-            <a:ext cx="1203961" cy="243247"/>
-          </a:xfrm>
-          <a:prstGeom prst="bentConnector4">
-            <a:avLst>
-              <a:gd name="adj1" fmla="val 17238"/>
-              <a:gd name="adj2" fmla="val 366451"/>
-            </a:avLst>
-          </a:prstGeom>
-          <a:ln>
-            <a:tailEnd type="triangle"/>
-          </a:ln>
-        </p:spPr>
-        <p:style>
-          <a:lnRef idx="1">
-            <a:schemeClr val="accent1"/>
-          </a:lnRef>
-          <a:fillRef idx="0">
-            <a:schemeClr val="accent1"/>
-          </a:fillRef>
-          <a:effectRef idx="0">
-            <a:schemeClr val="accent1"/>
-          </a:effectRef>
-          <a:fontRef idx="minor">
-            <a:schemeClr val="tx1"/>
-          </a:fontRef>
-        </p:style>
-      </p:cxnSp>
-      <p:cxnSp>
-        <p:nvCxnSpPr>
-          <p:cNvPr id="22" name="Connector: Elbow 21">
-            <a:extLst>
-              <a:ext uri="{FF2B5EF4-FFF2-40B4-BE49-F238E27FC236}">
-                <a16:creationId xmlns:a16="http://schemas.microsoft.com/office/drawing/2014/main" id="{AF83A3E9-0AA3-47BD-B558-F130A64F0D4C}"/>
-              </a:ext>
-            </a:extLst>
-          </p:cNvPr>
-          <p:cNvCxnSpPr>
-            <a:cxnSpLocks/>
-            <a:stCxn id="7" idx="3"/>
-            <a:endCxn id="15" idx="0"/>
-          </p:cNvCxnSpPr>
-          <p:nvPr/>
-        </p:nvCxnSpPr>
+        </p:nvSpPr>
         <p:spPr>
           <a:xfrm>
-            <a:off x="5986273" y="3667199"/>
-            <a:ext cx="224997" cy="682812"/>
-          </a:xfrm>
-          <a:prstGeom prst="bentConnector2">
-            <a:avLst/>
-          </a:prstGeom>
-          <a:ln>
-            <a:tailEnd type="triangle"/>
-          </a:ln>
-        </p:spPr>
-        <p:style>
-          <a:lnRef idx="1">
-            <a:schemeClr val="accent1"/>
-          </a:lnRef>
-          <a:fillRef idx="0">
-            <a:schemeClr val="accent1"/>
-          </a:fillRef>
-          <a:effectRef idx="0">
-            <a:schemeClr val="accent1"/>
-          </a:effectRef>
-          <a:fontRef idx="minor">
-            <a:schemeClr val="tx1"/>
-          </a:fontRef>
-        </p:style>
-      </p:cxnSp>
-      <p:cxnSp>
-        <p:nvCxnSpPr>
-          <p:cNvPr id="25" name="Connector: Elbow 24">
-            <a:extLst>
-              <a:ext uri="{FF2B5EF4-FFF2-40B4-BE49-F238E27FC236}">
-                <a16:creationId xmlns:a16="http://schemas.microsoft.com/office/drawing/2014/main" id="{CCC72B9E-946F-4BC6-8E42-A93683931AEA}"/>
-              </a:ext>
-            </a:extLst>
-          </p:cNvPr>
-          <p:cNvCxnSpPr>
-            <a:cxnSpLocks/>
-            <a:stCxn id="15" idx="3"/>
-            <a:endCxn id="14" idx="0"/>
-          </p:cNvCxnSpPr>
-          <p:nvPr/>
-        </p:nvCxnSpPr>
-        <p:spPr>
-          <a:xfrm flipV="1">
-            <a:off x="7167788" y="3428999"/>
-            <a:ext cx="3185714" cy="1674462"/>
-          </a:xfrm>
-          <a:prstGeom prst="bentConnector4">
-            <a:avLst>
-              <a:gd name="adj1" fmla="val 13747"/>
-              <a:gd name="adj2" fmla="val 113652"/>
-            </a:avLst>
-          </a:prstGeom>
-          <a:ln>
-            <a:tailEnd type="triangle"/>
-          </a:ln>
-        </p:spPr>
-        <p:style>
-          <a:lnRef idx="1">
-            <a:schemeClr val="accent1"/>
-          </a:lnRef>
-          <a:fillRef idx="0">
-            <a:schemeClr val="accent1"/>
-          </a:fillRef>
-          <a:effectRef idx="0">
-            <a:schemeClr val="accent1"/>
-          </a:effectRef>
-          <a:fontRef idx="minor">
-            <a:schemeClr val="tx1"/>
-          </a:fontRef>
-        </p:style>
-      </p:cxnSp>
-      <p:cxnSp>
-        <p:nvCxnSpPr>
-          <p:cNvPr id="40" name="Connector: Elbow 39">
-            <a:extLst>
-              <a:ext uri="{FF2B5EF4-FFF2-40B4-BE49-F238E27FC236}">
-                <a16:creationId xmlns:a16="http://schemas.microsoft.com/office/drawing/2014/main" id="{B3C5EF02-95ED-4C5F-8386-B654C15790CC}"/>
-              </a:ext>
-            </a:extLst>
-          </p:cNvPr>
-          <p:cNvCxnSpPr>
-            <a:cxnSpLocks/>
-            <a:stCxn id="14" idx="2"/>
-            <a:endCxn id="12" idx="0"/>
-          </p:cNvCxnSpPr>
-          <p:nvPr/>
-        </p:nvCxnSpPr>
-        <p:spPr>
-          <a:xfrm rot="5400000">
-            <a:off x="9836490" y="4662528"/>
-            <a:ext cx="424979" cy="609046"/>
-          </a:xfrm>
-          <a:prstGeom prst="bentConnector3">
-            <a:avLst>
-              <a:gd name="adj1" fmla="val 50000"/>
-            </a:avLst>
-          </a:prstGeom>
-          <a:ln>
-            <a:tailEnd type="triangle"/>
-          </a:ln>
-        </p:spPr>
-        <p:style>
-          <a:lnRef idx="1">
-            <a:schemeClr val="accent1"/>
-          </a:lnRef>
-          <a:fillRef idx="0">
-            <a:schemeClr val="accent1"/>
-          </a:fillRef>
-          <a:effectRef idx="0">
-            <a:schemeClr val="accent1"/>
-          </a:effectRef>
-          <a:fontRef idx="minor">
-            <a:schemeClr val="tx1"/>
-          </a:fontRef>
-        </p:style>
-      </p:cxnSp>
-      <p:sp>
-        <p:nvSpPr>
-          <p:cNvPr id="44" name="Arrow: Up 43">
-            <a:extLst>
-              <a:ext uri="{FF2B5EF4-FFF2-40B4-BE49-F238E27FC236}">
-                <a16:creationId xmlns:a16="http://schemas.microsoft.com/office/drawing/2014/main" id="{2E50A4B3-FB18-413B-88D4-D22CC847654E}"/>
-              </a:ext>
-            </a:extLst>
-          </p:cNvPr>
-          <p:cNvSpPr/>
-          <p:nvPr/>
-        </p:nvSpPr>
-        <p:spPr>
-          <a:xfrm>
-            <a:off x="2552284" y="4243051"/>
-            <a:ext cx="484632" cy="978408"/>
+            <a:off x="1284789" y="2883298"/>
+            <a:ext cx="302613" cy="393089"/>
           </a:xfrm>
           <a:prstGeom prst="upArrow">
             <a:avLst/>
@@ -3965,7 +4835,193 @@
           <a:lstStyle/>
           <a:p>
             <a:pPr algn="ctr"/>
-            <a:endParaRPr lang="en-GB"/>
+            <a:endParaRPr lang="en-GB" sz="1400"/>
+          </a:p>
+        </p:txBody>
+      </p:sp>
+      <p:sp>
+        <p:nvSpPr>
+          <p:cNvPr id="16" name="Flowchart: Alternate Process 15">
+            <a:extLst>
+              <a:ext uri="{FF2B5EF4-FFF2-40B4-BE49-F238E27FC236}">
+                <a16:creationId xmlns="" xmlns:a16="http://schemas.microsoft.com/office/drawing/2014/main" id="{FE5BE73E-48CF-451A-A787-D80042DAA6BF}"/>
+              </a:ext>
+            </a:extLst>
+          </p:cNvPr>
+          <p:cNvSpPr/>
+          <p:nvPr/>
+        </p:nvSpPr>
+        <p:spPr>
+          <a:xfrm>
+            <a:off x="1897196" y="2788726"/>
+            <a:ext cx="1913036" cy="957128"/>
+          </a:xfrm>
+          <a:prstGeom prst="flowChartAlternateProcess">
+            <a:avLst/>
+          </a:prstGeom>
+        </p:spPr>
+        <p:style>
+          <a:lnRef idx="2">
+            <a:schemeClr val="accent1">
+              <a:shade val="50000"/>
+            </a:schemeClr>
+          </a:lnRef>
+          <a:fillRef idx="1">
+            <a:schemeClr val="accent1"/>
+          </a:fillRef>
+          <a:effectRef idx="0">
+            <a:schemeClr val="accent1"/>
+          </a:effectRef>
+          <a:fontRef idx="minor">
+            <a:schemeClr val="lt1"/>
+          </a:fontRef>
+        </p:style>
+        <p:txBody>
+          <a:bodyPr rtlCol="0" anchor="ctr"/>
+          <a:lstStyle/>
+          <a:p>
+            <a:r>
+              <a:rPr lang="en-GB" sz="1400" dirty="0" smtClean="0"/>
+              <a:t>Design </a:t>
+            </a:r>
+            <a:r>
+              <a:rPr lang="en-GB" sz="1400" dirty="0"/>
+              <a:t>method for regression to </a:t>
+            </a:r>
+            <a:r>
+              <a:rPr lang="en-GB" sz="1400" dirty="0" smtClean="0"/>
+              <a:t>obtain features </a:t>
+            </a:r>
+            <a:r>
+              <a:rPr lang="en-GB" sz="1400" dirty="0"/>
+              <a:t>a, b, c, d for </a:t>
+            </a:r>
+            <a:r>
+              <a:rPr lang="en-GB" sz="1400" dirty="0">
+                <a:hlinkClick r:id="rId3"/>
+              </a:rPr>
+              <a:t>sigmoidal curve</a:t>
+            </a:r>
+            <a:r>
+              <a:rPr lang="en-GB" sz="1400" dirty="0"/>
+              <a:t>-</a:t>
+            </a:r>
+            <a:endParaRPr lang="en-GB" sz="1400" dirty="0">
+              <a:effectLst/>
+            </a:endParaRPr>
+          </a:p>
+        </p:txBody>
+      </p:sp>
+      <p:sp>
+        <p:nvSpPr>
+          <p:cNvPr id="42" name="Flowchart: Alternate Process 41">
+            <a:extLst>
+              <a:ext uri="{FF2B5EF4-FFF2-40B4-BE49-F238E27FC236}">
+                <a16:creationId xmlns="" xmlns:a16="http://schemas.microsoft.com/office/drawing/2014/main" id="{DA9A838E-A9F0-47AA-96AE-D742D1BBE926}"/>
+              </a:ext>
+            </a:extLst>
+          </p:cNvPr>
+          <p:cNvSpPr/>
+          <p:nvPr/>
+        </p:nvSpPr>
+        <p:spPr>
+          <a:xfrm>
+            <a:off x="3810232" y="4873803"/>
+            <a:ext cx="1577756" cy="962891"/>
+          </a:xfrm>
+          <a:prstGeom prst="flowChartAlternateProcess">
+            <a:avLst/>
+          </a:prstGeom>
+          <a:solidFill>
+            <a:schemeClr val="accent2">
+              <a:lumMod val="75000"/>
+            </a:schemeClr>
+          </a:solidFill>
+        </p:spPr>
+        <p:style>
+          <a:lnRef idx="2">
+            <a:schemeClr val="accent1">
+              <a:shade val="50000"/>
+            </a:schemeClr>
+          </a:lnRef>
+          <a:fillRef idx="1">
+            <a:schemeClr val="accent1"/>
+          </a:fillRef>
+          <a:effectRef idx="0">
+            <a:schemeClr val="accent1"/>
+          </a:effectRef>
+          <a:fontRef idx="minor">
+            <a:schemeClr val="lt1"/>
+          </a:fontRef>
+        </p:style>
+        <p:txBody>
+          <a:bodyPr rtlCol="0" anchor="ctr"/>
+          <a:lstStyle/>
+          <a:p>
+            <a:pPr algn="ctr"/>
+            <a:r>
+              <a:rPr lang="en-GB" sz="1400" dirty="0" smtClean="0"/>
+              <a:t>Upload as module onto </a:t>
+            </a:r>
+            <a:r>
+              <a:rPr lang="en-GB" sz="1400" dirty="0" err="1" smtClean="0"/>
+              <a:t>PyPI</a:t>
+            </a:r>
+            <a:endParaRPr lang="en-GB" sz="1400" dirty="0"/>
+          </a:p>
+        </p:txBody>
+      </p:sp>
+      <p:sp>
+        <p:nvSpPr>
+          <p:cNvPr id="17" name="Flowchart: Alternate Process 16">
+            <a:extLst>
+              <a:ext uri="{FF2B5EF4-FFF2-40B4-BE49-F238E27FC236}">
+                <a16:creationId xmlns="" xmlns:a16="http://schemas.microsoft.com/office/drawing/2014/main" id="{84B9D0E4-53E1-49A9-9D13-1760C6A7E042}"/>
+              </a:ext>
+            </a:extLst>
+          </p:cNvPr>
+          <p:cNvSpPr/>
+          <p:nvPr/>
+        </p:nvSpPr>
+        <p:spPr>
+          <a:xfrm>
+            <a:off x="4141079" y="1869136"/>
+            <a:ext cx="1913036" cy="824498"/>
+          </a:xfrm>
+          <a:prstGeom prst="flowChartAlternateProcess">
+            <a:avLst/>
+          </a:prstGeom>
+        </p:spPr>
+        <p:style>
+          <a:lnRef idx="2">
+            <a:schemeClr val="accent1">
+              <a:shade val="50000"/>
+            </a:schemeClr>
+          </a:lnRef>
+          <a:fillRef idx="1">
+            <a:schemeClr val="accent1"/>
+          </a:fillRef>
+          <a:effectRef idx="0">
+            <a:schemeClr val="accent1"/>
+          </a:effectRef>
+          <a:fontRef idx="minor">
+            <a:schemeClr val="lt1"/>
+          </a:fontRef>
+        </p:style>
+        <p:txBody>
+          <a:bodyPr rtlCol="0" anchor="ctr"/>
+          <a:lstStyle/>
+          <a:p>
+            <a:pPr algn="ctr"/>
+            <a:r>
+              <a:rPr lang="en-GB" sz="1400" dirty="0" smtClean="0"/>
+              <a:t>Use data that I have previously obtained for sCJD vs </a:t>
+            </a:r>
+            <a:r>
+              <a:rPr lang="en-GB" sz="1400" dirty="0" err="1" smtClean="0"/>
+              <a:t>iCJD</a:t>
+            </a:r>
+            <a:endParaRPr lang="en-GB" sz="1400" dirty="0"/>
           </a:p>
         </p:txBody>
       </p:sp>
@@ -3973,6 +5029,93 @@
     <p:extLst>
       <p:ext uri="{BB962C8B-B14F-4D97-AF65-F5344CB8AC3E}">
         <p14:creationId xmlns:p14="http://schemas.microsoft.com/office/powerpoint/2010/main" val="2073330090"/>
+      </p:ext>
+    </p:extLst>
+  </p:cSld>
+  <p:clrMapOvr>
+    <a:masterClrMapping/>
+  </p:clrMapOvr>
+  <p:timing>
+    <p:tnLst>
+      <p:par>
+        <p:cTn id="1" dur="indefinite" restart="never" nodeType="tmRoot"/>
+      </p:par>
+    </p:tnLst>
+  </p:timing>
+</p:sld>
+</file>
+
+<file path=ppt/slides/slide2.xml><?xml version="1.0" encoding="utf-8"?>
+<p:sld xmlns:a="http://schemas.openxmlformats.org/drawingml/2006/main" xmlns:r="http://schemas.openxmlformats.org/officeDocument/2006/relationships" xmlns:p="http://schemas.openxmlformats.org/presentationml/2006/main">
+  <p:cSld>
+    <p:spTree>
+      <p:nvGrpSpPr>
+        <p:cNvPr id="1" name=""/>
+        <p:cNvGrpSpPr/>
+        <p:nvPr/>
+      </p:nvGrpSpPr>
+      <p:grpSpPr>
+        <a:xfrm>
+          <a:off x="0" y="0"/>
+          <a:ext cx="0" cy="0"/>
+          <a:chOff x="0" y="0"/>
+          <a:chExt cx="0" cy="0"/>
+        </a:xfrm>
+      </p:grpSpPr>
+      <p:sp>
+        <p:nvSpPr>
+          <p:cNvPr id="2" name="Title 1"/>
+          <p:cNvSpPr>
+            <a:spLocks noGrp="1"/>
+          </p:cNvSpPr>
+          <p:nvPr>
+            <p:ph type="title"/>
+          </p:nvPr>
+        </p:nvSpPr>
+        <p:spPr/>
+        <p:txBody>
+          <a:bodyPr/>
+          <a:lstStyle/>
+          <a:p>
+            <a:r>
+              <a:rPr lang="en-GB" dirty="0" smtClean="0"/>
+              <a:t>Assessing RT-</a:t>
+            </a:r>
+            <a:r>
+              <a:rPr lang="en-GB" dirty="0" err="1" smtClean="0"/>
+              <a:t>QuIC</a:t>
+            </a:r>
+            <a:r>
+              <a:rPr lang="en-GB" dirty="0" smtClean="0"/>
+              <a:t> w</a:t>
+            </a:r>
+            <a:endParaRPr lang="en-GB" dirty="0"/>
+          </a:p>
+        </p:txBody>
+      </p:sp>
+      <p:sp>
+        <p:nvSpPr>
+          <p:cNvPr id="3" name="Content Placeholder 2"/>
+          <p:cNvSpPr>
+            <a:spLocks noGrp="1"/>
+          </p:cNvSpPr>
+          <p:nvPr>
+            <p:ph idx="1"/>
+          </p:nvPr>
+        </p:nvSpPr>
+        <p:spPr/>
+        <p:txBody>
+          <a:bodyPr/>
+          <a:lstStyle/>
+          <a:p>
+            <a:endParaRPr lang="en-GB"/>
+          </a:p>
+        </p:txBody>
+      </p:sp>
+    </p:spTree>
+    <p:extLst>
+      <p:ext uri="{BB962C8B-B14F-4D97-AF65-F5344CB8AC3E}">
+        <p14:creationId xmlns:p14="http://schemas.microsoft.com/office/powerpoint/2010/main" val="2403394238"/>
       </p:ext>
     </p:extLst>
   </p:cSld>
@@ -4127,6 +5270,267 @@
         <a:font script="Tale" typeface="Microsoft Tai Le"/>
         <a:font script="Talu" typeface="Microsoft New Tai Lue"/>
         <a:font script="Tfng" typeface="Ebrima"/>
+      </a:minorFont>
+    </a:fontScheme>
+    <a:fmtScheme name="Office">
+      <a:fillStyleLst>
+        <a:solidFill>
+          <a:schemeClr val="phClr"/>
+        </a:solidFill>
+        <a:gradFill rotWithShape="1">
+          <a:gsLst>
+            <a:gs pos="0">
+              <a:schemeClr val="phClr">
+                <a:lumMod val="110000"/>
+                <a:satMod val="105000"/>
+                <a:tint val="67000"/>
+              </a:schemeClr>
+            </a:gs>
+            <a:gs pos="50000">
+              <a:schemeClr val="phClr">
+                <a:lumMod val="105000"/>
+                <a:satMod val="103000"/>
+                <a:tint val="73000"/>
+              </a:schemeClr>
+            </a:gs>
+            <a:gs pos="100000">
+              <a:schemeClr val="phClr">
+                <a:lumMod val="105000"/>
+                <a:satMod val="109000"/>
+                <a:tint val="81000"/>
+              </a:schemeClr>
+            </a:gs>
+          </a:gsLst>
+          <a:lin ang="5400000" scaled="0"/>
+        </a:gradFill>
+        <a:gradFill rotWithShape="1">
+          <a:gsLst>
+            <a:gs pos="0">
+              <a:schemeClr val="phClr">
+                <a:satMod val="103000"/>
+                <a:lumMod val="102000"/>
+                <a:tint val="94000"/>
+              </a:schemeClr>
+            </a:gs>
+            <a:gs pos="50000">
+              <a:schemeClr val="phClr">
+                <a:satMod val="110000"/>
+                <a:lumMod val="100000"/>
+                <a:shade val="100000"/>
+              </a:schemeClr>
+            </a:gs>
+            <a:gs pos="100000">
+              <a:schemeClr val="phClr">
+                <a:lumMod val="99000"/>
+                <a:satMod val="120000"/>
+                <a:shade val="78000"/>
+              </a:schemeClr>
+            </a:gs>
+          </a:gsLst>
+          <a:lin ang="5400000" scaled="0"/>
+        </a:gradFill>
+      </a:fillStyleLst>
+      <a:lnStyleLst>
+        <a:ln w="6350" cap="flat" cmpd="sng" algn="ctr">
+          <a:solidFill>
+            <a:schemeClr val="phClr"/>
+          </a:solidFill>
+          <a:prstDash val="solid"/>
+          <a:miter lim="800000"/>
+        </a:ln>
+        <a:ln w="12700" cap="flat" cmpd="sng" algn="ctr">
+          <a:solidFill>
+            <a:schemeClr val="phClr"/>
+          </a:solidFill>
+          <a:prstDash val="solid"/>
+          <a:miter lim="800000"/>
+        </a:ln>
+        <a:ln w="19050" cap="flat" cmpd="sng" algn="ctr">
+          <a:solidFill>
+            <a:schemeClr val="phClr"/>
+          </a:solidFill>
+          <a:prstDash val="solid"/>
+          <a:miter lim="800000"/>
+        </a:ln>
+      </a:lnStyleLst>
+      <a:effectStyleLst>
+        <a:effectStyle>
+          <a:effectLst/>
+        </a:effectStyle>
+        <a:effectStyle>
+          <a:effectLst/>
+        </a:effectStyle>
+        <a:effectStyle>
+          <a:effectLst>
+            <a:outerShdw blurRad="57150" dist="19050" dir="5400000" algn="ctr" rotWithShape="0">
+              <a:srgbClr val="000000">
+                <a:alpha val="63000"/>
+              </a:srgbClr>
+            </a:outerShdw>
+          </a:effectLst>
+        </a:effectStyle>
+      </a:effectStyleLst>
+      <a:bgFillStyleLst>
+        <a:solidFill>
+          <a:schemeClr val="phClr"/>
+        </a:solidFill>
+        <a:solidFill>
+          <a:schemeClr val="phClr">
+            <a:tint val="95000"/>
+            <a:satMod val="170000"/>
+          </a:schemeClr>
+        </a:solidFill>
+        <a:gradFill rotWithShape="1">
+          <a:gsLst>
+            <a:gs pos="0">
+              <a:schemeClr val="phClr">
+                <a:tint val="93000"/>
+                <a:satMod val="150000"/>
+                <a:shade val="98000"/>
+                <a:lumMod val="102000"/>
+              </a:schemeClr>
+            </a:gs>
+            <a:gs pos="50000">
+              <a:schemeClr val="phClr">
+                <a:tint val="98000"/>
+                <a:satMod val="130000"/>
+                <a:shade val="90000"/>
+                <a:lumMod val="103000"/>
+              </a:schemeClr>
+            </a:gs>
+            <a:gs pos="100000">
+              <a:schemeClr val="phClr">
+                <a:shade val="63000"/>
+                <a:satMod val="120000"/>
+              </a:schemeClr>
+            </a:gs>
+          </a:gsLst>
+          <a:lin ang="5400000" scaled="0"/>
+        </a:gradFill>
+      </a:bgFillStyleLst>
+    </a:fmtScheme>
+  </a:themeElements>
+  <a:objectDefaults/>
+  <a:extraClrSchemeLst/>
+  <a:extLst>
+    <a:ext uri="{05A4C25C-085E-4340-85A3-A5531E510DB2}">
+      <thm15:themeFamily xmlns:thm15="http://schemas.microsoft.com/office/thememl/2012/main" name="Office Theme" id="{62F939B6-93AF-4DB8-9C6B-D6C7DFDC589F}" vid="{4A3C46E8-61CC-4603-A589-7422A47A8E4A}"/>
+    </a:ext>
+  </a:extLst>
+</a:theme>
+</file>
+
+<file path=ppt/theme/theme2.xml><?xml version="1.0" encoding="utf-8"?>
+<a:theme xmlns:a="http://schemas.openxmlformats.org/drawingml/2006/main" name="Office Theme">
+  <a:themeElements>
+    <a:clrScheme name="Office">
+      <a:dk1>
+        <a:sysClr val="windowText" lastClr="000000"/>
+      </a:dk1>
+      <a:lt1>
+        <a:sysClr val="window" lastClr="FFFFFF"/>
+      </a:lt1>
+      <a:dk2>
+        <a:srgbClr val="44546A"/>
+      </a:dk2>
+      <a:lt2>
+        <a:srgbClr val="E7E6E6"/>
+      </a:lt2>
+      <a:accent1>
+        <a:srgbClr val="5B9BD5"/>
+      </a:accent1>
+      <a:accent2>
+        <a:srgbClr val="ED7D31"/>
+      </a:accent2>
+      <a:accent3>
+        <a:srgbClr val="A5A5A5"/>
+      </a:accent3>
+      <a:accent4>
+        <a:srgbClr val="FFC000"/>
+      </a:accent4>
+      <a:accent5>
+        <a:srgbClr val="4472C4"/>
+      </a:accent5>
+      <a:accent6>
+        <a:srgbClr val="70AD47"/>
+      </a:accent6>
+      <a:hlink>
+        <a:srgbClr val="0563C1"/>
+      </a:hlink>
+      <a:folHlink>
+        <a:srgbClr val="954F72"/>
+      </a:folHlink>
+    </a:clrScheme>
+    <a:fontScheme name="Office">
+      <a:majorFont>
+        <a:latin typeface="Calibri Light" panose="020F0302020204030204"/>
+        <a:ea typeface=""/>
+        <a:cs typeface=""/>
+        <a:font script="Jpan" typeface="ＭＳ Ｐゴシック"/>
+        <a:font script="Hang" typeface="맑은 고딕"/>
+        <a:font script="Hans" typeface="宋体"/>
+        <a:font script="Hant" typeface="新細明體"/>
+        <a:font script="Arab" typeface="Times New Roman"/>
+        <a:font script="Hebr" typeface="Times New Roman"/>
+        <a:font script="Thai" typeface="Angsana New"/>
+        <a:font script="Ethi" typeface="Nyala"/>
+        <a:font script="Beng" typeface="Vrinda"/>
+        <a:font script="Gujr" typeface="Shruti"/>
+        <a:font script="Khmr" typeface="MoolBoran"/>
+        <a:font script="Knda" typeface="Tunga"/>
+        <a:font script="Guru" typeface="Raavi"/>
+        <a:font script="Cans" typeface="Euphemia"/>
+        <a:font script="Cher" typeface="Plantagenet Cherokee"/>
+        <a:font script="Yiii" typeface="Microsoft Yi Baiti"/>
+        <a:font script="Tibt" typeface="Microsoft Himalaya"/>
+        <a:font script="Thaa" typeface="MV Boli"/>
+        <a:font script="Deva" typeface="Mangal"/>
+        <a:font script="Telu" typeface="Gautami"/>
+        <a:font script="Taml" typeface="Latha"/>
+        <a:font script="Syrc" typeface="Estrangelo Edessa"/>
+        <a:font script="Orya" typeface="Kalinga"/>
+        <a:font script="Mlym" typeface="Kartika"/>
+        <a:font script="Laoo" typeface="DokChampa"/>
+        <a:font script="Sinh" typeface="Iskoola Pota"/>
+        <a:font script="Mong" typeface="Mongolian Baiti"/>
+        <a:font script="Viet" typeface="Times New Roman"/>
+        <a:font script="Uigh" typeface="Microsoft Uighur"/>
+        <a:font script="Geor" typeface="Sylfaen"/>
+      </a:majorFont>
+      <a:minorFont>
+        <a:latin typeface="Calibri" panose="020F0502020204030204"/>
+        <a:ea typeface=""/>
+        <a:cs typeface=""/>
+        <a:font script="Jpan" typeface="ＭＳ Ｐゴシック"/>
+        <a:font script="Hang" typeface="맑은 고딕"/>
+        <a:font script="Hans" typeface="宋体"/>
+        <a:font script="Hant" typeface="新細明體"/>
+        <a:font script="Arab" typeface="Arial"/>
+        <a:font script="Hebr" typeface="Arial"/>
+        <a:font script="Thai" typeface="Cordia New"/>
+        <a:font script="Ethi" typeface="Nyala"/>
+        <a:font script="Beng" typeface="Vrinda"/>
+        <a:font script="Gujr" typeface="Shruti"/>
+        <a:font script="Khmr" typeface="DaunPenh"/>
+        <a:font script="Knda" typeface="Tunga"/>
+        <a:font script="Guru" typeface="Raavi"/>
+        <a:font script="Cans" typeface="Euphemia"/>
+        <a:font script="Cher" typeface="Plantagenet Cherokee"/>
+        <a:font script="Yiii" typeface="Microsoft Yi Baiti"/>
+        <a:font script="Tibt" typeface="Microsoft Himalaya"/>
+        <a:font script="Thaa" typeface="MV Boli"/>
+        <a:font script="Deva" typeface="Mangal"/>
+        <a:font script="Telu" typeface="Gautami"/>
+        <a:font script="Taml" typeface="Latha"/>
+        <a:font script="Syrc" typeface="Estrangelo Edessa"/>
+        <a:font script="Orya" typeface="Kalinga"/>
+        <a:font script="Mlym" typeface="Kartika"/>
+        <a:font script="Laoo" typeface="DokChampa"/>
+        <a:font script="Sinh" typeface="Iskoola Pota"/>
+        <a:font script="Mong" typeface="Mongolian Baiti"/>
+        <a:font script="Viet" typeface="Arial"/>
+        <a:font script="Uigh" typeface="Microsoft Uighur"/>
+        <a:font script="Geor" typeface="Sylfaen"/>
       </a:minorFont>
     </a:fontScheme>
     <a:fmtScheme name="Office">
@@ -4531,15 +5935,15 @@
 <file path=customXml/itemProps3.xml><?xml version="1.0" encoding="utf-8"?>
 <ds:datastoreItem xmlns:ds="http://schemas.openxmlformats.org/officeDocument/2006/customXml" ds:itemID="{653D6C7D-661B-4C18-8F7A-272231617E86}">
   <ds:schemaRefs>
+    <ds:schemaRef ds:uri="http://schemas.microsoft.com/office/2006/metadata/properties"/>
+    <ds:schemaRef ds:uri="http://purl.org/dc/terms/"/>
     <ds:schemaRef ds:uri="99209309-3759-4f51-932e-9315a7d88f37"/>
-    <ds:schemaRef ds:uri="http://purl.org/dc/terms/"/>
+    <ds:schemaRef ds:uri="http://purl.org/dc/dcmitype/"/>
     <ds:schemaRef ds:uri="http://schemas.openxmlformats.org/package/2006/metadata/core-properties"/>
     <ds:schemaRef ds:uri="97b682e7-e3ed-4854-817b-0fce634c2d8e"/>
-    <ds:schemaRef ds:uri="http://purl.org/dc/dcmitype/"/>
+    <ds:schemaRef ds:uri="http://schemas.microsoft.com/office/2006/documentManagement/types"/>
+    <ds:schemaRef ds:uri="http://purl.org/dc/elements/1.1/"/>
     <ds:schemaRef ds:uri="http://schemas.microsoft.com/office/infopath/2007/PartnerControls"/>
-    <ds:schemaRef ds:uri="http://purl.org/dc/elements/1.1/"/>
-    <ds:schemaRef ds:uri="http://schemas.microsoft.com/office/2006/metadata/properties"/>
-    <ds:schemaRef ds:uri="http://schemas.microsoft.com/office/2006/documentManagement/types"/>
     <ds:schemaRef ds:uri="http://www.w3.org/XML/1998/namespace"/>
   </ds:schemaRefs>
 </ds:datastoreItem>

</xml_diff>

<commit_message>
better integration of modules
</commit_message>
<xml_diff>
--- a/rtquicProjectFlow.pptx
+++ b/rtquicProjectFlow.pptx
@@ -198,7 +198,7 @@
           <a:p>
             <a:fld id="{6ACC95B4-A8D6-484E-BAB1-BF699BEA950E}" type="datetimeFigureOut">
               <a:rPr lang="en-GB" smtClean="0"/>
-              <a:t>23/09/2019</a:t>
+              <a:t>25/09/2019</a:t>
             </a:fld>
             <a:endParaRPr lang="en-GB"/>
           </a:p>
@@ -262,35 +262,35 @@
           <a:p>
             <a:pPr lvl="0"/>
             <a:r>
-              <a:rPr lang="en-US" smtClean="0"/>
+              <a:rPr lang="en-US"/>
               <a:t>Click to edit Master text styles</a:t>
             </a:r>
           </a:p>
           <a:p>
             <a:pPr lvl="1"/>
             <a:r>
-              <a:rPr lang="en-US" smtClean="0"/>
+              <a:rPr lang="en-US"/>
               <a:t>Second level</a:t>
             </a:r>
           </a:p>
           <a:p>
             <a:pPr lvl="2"/>
             <a:r>
-              <a:rPr lang="en-US" smtClean="0"/>
+              <a:rPr lang="en-US"/>
               <a:t>Third level</a:t>
             </a:r>
           </a:p>
           <a:p>
             <a:pPr lvl="3"/>
             <a:r>
-              <a:rPr lang="en-US" smtClean="0"/>
+              <a:rPr lang="en-US"/>
               <a:t>Fourth level</a:t>
             </a:r>
           </a:p>
           <a:p>
             <a:pPr lvl="4"/>
             <a:r>
-              <a:rPr lang="en-US" smtClean="0"/>
+              <a:rPr lang="en-US"/>
               <a:t>Fifth level</a:t>
             </a:r>
             <a:endParaRPr lang="en-GB"/>
@@ -511,637 +511,593 @@
           <a:lstStyle/>
           <a:p>
             <a:r>
-              <a:rPr lang="en-GB" dirty="0" smtClean="0">
+              <a:rPr lang="en-GB" dirty="0">
                 <a:effectLst/>
               </a:rPr>
               <a:t>GET THIS ON POWERPOINT</a:t>
             </a:r>
           </a:p>
           <a:p>
-            <a:r>
-              <a:rPr lang="en-GB" dirty="0" smtClean="0"/>
-              <a:t/>
-            </a:r>
             <a:br>
-              <a:rPr lang="en-GB" dirty="0" smtClean="0"/>
+              <a:rPr lang="en-GB" dirty="0"/>
             </a:br>
-            <a:endParaRPr lang="en-GB" dirty="0" smtClean="0"/>
-          </a:p>
-          <a:p>
-            <a:r>
-              <a:rPr lang="en-GB" dirty="0" smtClean="0"/>
+            <a:endParaRPr lang="en-GB" dirty="0"/>
+          </a:p>
+          <a:p>
+            <a:r>
+              <a:rPr lang="en-GB" dirty="0"/>
               <a:t>Path:</a:t>
             </a:r>
           </a:p>
           <a:p>
             <a:r>
-              <a:rPr lang="en-GB" dirty="0" smtClean="0"/>
+              <a:rPr lang="en-GB" dirty="0"/>
               <a:t>write programme that analyses </a:t>
             </a:r>
             <a:r>
-              <a:rPr lang="en-GB" dirty="0" err="1" smtClean="0"/>
+              <a:rPr lang="en-GB" dirty="0" err="1"/>
               <a:t>rtquic</a:t>
             </a:r>
             <a:r>
-              <a:rPr lang="en-GB" dirty="0" smtClean="0"/>
+              <a:rPr lang="en-GB" dirty="0"/>
               <a:t> data -&gt; </a:t>
             </a:r>
           </a:p>
           <a:p>
             <a:r>
-              <a:rPr lang="en-GB" dirty="0" smtClean="0"/>
+              <a:rPr lang="en-GB" dirty="0"/>
               <a:t>(method for cleaning data</a:t>
             </a:r>
             <a:r>
-              <a:rPr lang="en-GB" dirty="0" smtClean="0">
+              <a:rPr lang="en-GB" dirty="0">
                 <a:effectLst/>
               </a:rPr>
               <a:t> -&gt;)</a:t>
             </a:r>
-            <a:endParaRPr lang="en-GB" dirty="0" smtClean="0"/>
-          </a:p>
-          <a:p>
-            <a:r>
-              <a:rPr lang="en-GB" dirty="0" smtClean="0">
+            <a:endParaRPr lang="en-GB" dirty="0"/>
+          </a:p>
+          <a:p>
+            <a:r>
+              <a:rPr lang="en-GB" dirty="0">
                 <a:effectLst/>
               </a:rPr>
               <a:t>(method for extracting SD numbers from word) </a:t>
             </a:r>
             <a:r>
-              <a:rPr lang="en-GB" dirty="0" smtClean="0"/>
+              <a:rPr lang="en-GB" dirty="0"/>
               <a:t> </a:t>
             </a:r>
             <a:r>
-              <a:rPr lang="en-GB" dirty="0" smtClean="0">
+              <a:rPr lang="en-GB" dirty="0">
                 <a:effectLst/>
               </a:rPr>
               <a:t>-&gt; </a:t>
             </a:r>
-            <a:endParaRPr lang="en-GB" dirty="0" smtClean="0"/>
-          </a:p>
-          <a:p>
-            <a:r>
-              <a:rPr lang="en-GB" dirty="0" smtClean="0"/>
+            <a:endParaRPr lang="en-GB" dirty="0"/>
+          </a:p>
+          <a:p>
+            <a:r>
+              <a:rPr lang="en-GB" dirty="0"/>
               <a:t>display full data for lag time...DONE, gradient DONE area under curve DONE, max </a:t>
             </a:r>
             <a:r>
-              <a:rPr lang="en-GB" dirty="0" err="1" smtClean="0"/>
+              <a:rPr lang="en-GB" dirty="0" err="1"/>
               <a:t>val</a:t>
             </a:r>
             <a:r>
-              <a:rPr lang="en-GB" dirty="0" smtClean="0"/>
+              <a:rPr lang="en-GB" dirty="0"/>
               <a:t> DONE, time to max DONE -&gt;</a:t>
             </a:r>
           </a:p>
           <a:p>
             <a:r>
-              <a:rPr lang="en-GB" dirty="0" smtClean="0"/>
+              <a:rPr lang="en-GB" dirty="0"/>
               <a:t>also procure/design method for regression to obtain a, b, c, d for </a:t>
             </a:r>
             <a:r>
-              <a:rPr lang="en-GB" dirty="0" smtClean="0">
+              <a:rPr lang="en-GB" dirty="0">
                 <a:hlinkClick r:id="rId3"/>
               </a:rPr>
               <a:t>sigmoidal curve</a:t>
             </a:r>
             <a:r>
-              <a:rPr lang="en-GB" dirty="0" smtClean="0"/>
+              <a:rPr lang="en-GB" dirty="0"/>
               <a:t>-&gt;</a:t>
             </a:r>
           </a:p>
           <a:p>
             <a:r>
-              <a:rPr lang="en-GB" dirty="0" smtClean="0">
+              <a:rPr lang="en-GB" dirty="0">
                 <a:effectLst/>
               </a:rPr>
               <a:t>ensure programme can analyse multiple excel files-&gt;</a:t>
             </a:r>
-            <a:endParaRPr lang="en-GB" dirty="0" smtClean="0"/>
-          </a:p>
-          <a:p>
-            <a:r>
-              <a:rPr lang="en-GB" dirty="0" smtClean="0">
+            <a:endParaRPr lang="en-GB" dirty="0"/>
+          </a:p>
+          <a:p>
+            <a:r>
+              <a:rPr lang="en-GB" dirty="0">
                 <a:effectLst/>
               </a:rPr>
               <a:t>ensure programme could filter by name or another condition-&gt;</a:t>
             </a:r>
-            <a:endParaRPr lang="en-GB" dirty="0" smtClean="0"/>
-          </a:p>
-          <a:p>
-            <a:r>
-              <a:rPr lang="en-GB" dirty="0" smtClean="0"/>
+            <a:endParaRPr lang="en-GB" dirty="0"/>
+          </a:p>
+          <a:p>
+            <a:r>
+              <a:rPr lang="en-GB" dirty="0"/>
               <a:t>upload as python library after documenting </a:t>
             </a:r>
             <a:r>
-              <a:rPr lang="en-GB" dirty="0" smtClean="0">
+              <a:rPr lang="en-GB" dirty="0">
                 <a:effectLst/>
               </a:rPr>
               <a:t> </a:t>
             </a:r>
             <a:r>
-              <a:rPr lang="en-GB" dirty="0" smtClean="0">
+              <a:rPr lang="en-GB" dirty="0">
                 <a:effectLst/>
                 <a:hlinkClick r:id="rId4"/>
               </a:rPr>
               <a:t>https://www.python.org/dev/peps/pep-0257/</a:t>
             </a:r>
             <a:r>
-              <a:rPr lang="en-GB" dirty="0" smtClean="0">
+              <a:rPr lang="en-GB" dirty="0">
                 <a:effectLst/>
               </a:rPr>
               <a:t> </a:t>
             </a:r>
             <a:r>
-              <a:rPr lang="en-GB" dirty="0" smtClean="0"/>
+              <a:rPr lang="en-GB" dirty="0"/>
               <a:t>-&gt;</a:t>
             </a:r>
           </a:p>
           <a:p>
             <a:r>
-              <a:rPr lang="en-GB" dirty="0" smtClean="0"/>
+              <a:rPr lang="en-GB" dirty="0"/>
               <a:t>chose features for vector to be used in cluster analysis -&gt;</a:t>
             </a:r>
           </a:p>
           <a:p>
             <a:r>
-              <a:rPr lang="en-GB" dirty="0" smtClean="0">
+              <a:rPr lang="en-GB" dirty="0">
                 <a:effectLst/>
               </a:rPr>
               <a:t>select k for k means clustering -&gt;</a:t>
             </a:r>
-            <a:endParaRPr lang="en-GB" dirty="0" smtClean="0"/>
-          </a:p>
-          <a:p>
-            <a:r>
-              <a:rPr lang="en-GB" dirty="0" smtClean="0">
+            <a:endParaRPr lang="en-GB" dirty="0"/>
+          </a:p>
+          <a:p>
+            <a:r>
+              <a:rPr lang="en-GB" dirty="0">
                 <a:effectLst/>
               </a:rPr>
               <a:t>select metric for k means clustering -&gt;</a:t>
             </a:r>
-            <a:endParaRPr lang="en-GB" dirty="0" smtClean="0"/>
-          </a:p>
-          <a:p>
-            <a:r>
-              <a:rPr lang="en-GB" dirty="0" smtClean="0">
+            <a:endParaRPr lang="en-GB" dirty="0"/>
+          </a:p>
+          <a:p>
+            <a:r>
+              <a:rPr lang="en-GB" dirty="0">
                 <a:effectLst/>
               </a:rPr>
               <a:t>select metric for k means clustering -&gt;</a:t>
             </a:r>
             <a:r>
-              <a:rPr lang="en-GB" dirty="0" smtClean="0"/>
+              <a:rPr lang="en-GB" dirty="0"/>
               <a:t> </a:t>
             </a:r>
           </a:p>
           <a:p>
-            <a:r>
-              <a:rPr lang="en-GB" dirty="0" smtClean="0"/>
-              <a:t/>
-            </a:r>
             <a:br>
-              <a:rPr lang="en-GB" dirty="0" smtClean="0"/>
+              <a:rPr lang="en-GB" dirty="0"/>
             </a:br>
-            <a:endParaRPr lang="en-GB" dirty="0" smtClean="0"/>
-          </a:p>
-          <a:p>
-            <a:r>
-              <a:rPr lang="en-GB" dirty="0" smtClean="0"/>
+            <a:endParaRPr lang="en-GB" dirty="0"/>
+          </a:p>
+          <a:p>
+            <a:r>
+              <a:rPr lang="en-GB" dirty="0"/>
               <a:t>what kind of paper could </a:t>
             </a:r>
             <a:r>
-              <a:rPr lang="en-GB" dirty="0" err="1" smtClean="0"/>
+              <a:rPr lang="en-GB" dirty="0" err="1"/>
               <a:t>i</a:t>
             </a:r>
             <a:r>
-              <a:rPr lang="en-GB" dirty="0" smtClean="0"/>
+              <a:rPr lang="en-GB" dirty="0"/>
               <a:t> publish? -&gt;</a:t>
             </a:r>
           </a:p>
           <a:p>
             <a:r>
-              <a:rPr lang="en-GB" dirty="0" smtClean="0">
+              <a:rPr lang="en-GB" dirty="0">
                 <a:effectLst/>
               </a:rPr>
               <a:t>Could it be describing a python package</a:t>
             </a:r>
-            <a:endParaRPr lang="en-GB" dirty="0" smtClean="0"/>
-          </a:p>
-          <a:p>
-            <a:r>
-              <a:rPr lang="en-GB" dirty="0" smtClean="0">
+            <a:endParaRPr lang="en-GB" dirty="0"/>
+          </a:p>
+          <a:p>
+            <a:r>
+              <a:rPr lang="en-GB" dirty="0">
                 <a:effectLst/>
               </a:rPr>
               <a:t>How should I go about uploading a python package?</a:t>
             </a:r>
-            <a:endParaRPr lang="en-GB" dirty="0" smtClean="0"/>
-          </a:p>
-          <a:p>
-            <a:r>
-              <a:rPr lang="en-GB" dirty="0" smtClean="0">
+            <a:endParaRPr lang="en-GB" dirty="0"/>
+          </a:p>
+          <a:p>
+            <a:r>
+              <a:rPr lang="en-GB" dirty="0">
                 <a:effectLst/>
               </a:rPr>
               <a:t>decide what features</a:t>
             </a:r>
-            <a:endParaRPr lang="en-GB" dirty="0" smtClean="0"/>
-          </a:p>
-          <a:p>
-            <a:r>
-              <a:rPr lang="en-GB" dirty="0" smtClean="0">
-                <a:effectLst/>
-              </a:rPr>
-              <a:t/>
-            </a:r>
+            <a:endParaRPr lang="en-GB" dirty="0"/>
+          </a:p>
+          <a:p>
             <a:br>
-              <a:rPr lang="en-GB" dirty="0" smtClean="0">
+              <a:rPr lang="en-GB" dirty="0">
                 <a:effectLst/>
               </a:rPr>
             </a:br>
-            <a:endParaRPr lang="en-GB" dirty="0" smtClean="0"/>
-          </a:p>
-          <a:p>
-            <a:r>
-              <a:rPr lang="en-GB" dirty="0" smtClean="0"/>
+            <a:endParaRPr lang="en-GB" dirty="0"/>
+          </a:p>
+          <a:p>
+            <a:r>
+              <a:rPr lang="en-GB" dirty="0"/>
               <a:t>file i/o</a:t>
             </a:r>
           </a:p>
           <a:p>
             <a:r>
-              <a:rPr lang="en-GB" dirty="0" smtClean="0">
+              <a:rPr lang="en-GB" dirty="0">
                 <a:effectLst/>
               </a:rPr>
               <a:t>read exported excel files</a:t>
             </a:r>
             <a:r>
-              <a:rPr lang="en-GB" dirty="0" smtClean="0"/>
+              <a:rPr lang="en-GB" dirty="0"/>
               <a:t> </a:t>
             </a:r>
             <a:r>
-              <a:rPr lang="en-GB" dirty="0" smtClean="0">
+              <a:rPr lang="en-GB" dirty="0">
                 <a:effectLst/>
               </a:rPr>
               <a:t>   </a:t>
             </a:r>
-            <a:endParaRPr lang="en-GB" dirty="0" smtClean="0"/>
-          </a:p>
-          <a:p>
-            <a:r>
-              <a:rPr lang="en-GB" dirty="0" smtClean="0">
-                <a:effectLst/>
-              </a:rPr>
-              <a:t/>
-            </a:r>
+            <a:endParaRPr lang="en-GB" dirty="0"/>
+          </a:p>
+          <a:p>
             <a:br>
-              <a:rPr lang="en-GB" dirty="0" smtClean="0">
+              <a:rPr lang="en-GB" dirty="0">
                 <a:effectLst/>
               </a:rPr>
             </a:br>
-            <a:endParaRPr lang="en-GB" dirty="0" smtClean="0"/>
-          </a:p>
-          <a:p>
-            <a:r>
-              <a:rPr lang="en-GB" dirty="0" smtClean="0">
+            <a:endParaRPr lang="en-GB" dirty="0"/>
+          </a:p>
+          <a:p>
+            <a:r>
+              <a:rPr lang="en-GB" dirty="0">
                 <a:effectLst/>
               </a:rPr>
               <a:t>analysis</a:t>
             </a:r>
-            <a:endParaRPr lang="en-GB" dirty="0" smtClean="0"/>
-          </a:p>
-          <a:p>
-            <a:r>
-              <a:rPr lang="en-GB" dirty="0" smtClean="0">
+            <a:endParaRPr lang="en-GB" dirty="0"/>
+          </a:p>
+          <a:p>
+            <a:r>
+              <a:rPr lang="en-GB" dirty="0">
                 <a:effectLst/>
               </a:rPr>
               <a:t>use </a:t>
             </a:r>
             <a:r>
-              <a:rPr lang="en-GB" dirty="0" err="1" smtClean="0">
+              <a:rPr lang="en-GB" dirty="0" err="1">
                 <a:effectLst/>
               </a:rPr>
               <a:t>sci</a:t>
             </a:r>
             <a:r>
-              <a:rPr lang="en-GB" dirty="0" smtClean="0">
+              <a:rPr lang="en-GB" dirty="0">
                 <a:effectLst/>
               </a:rPr>
               <a:t> kit for k means cluster analysis</a:t>
             </a:r>
             <a:r>
-              <a:rPr lang="en-GB" dirty="0" smtClean="0"/>
+              <a:rPr lang="en-GB" dirty="0"/>
               <a:t> </a:t>
             </a:r>
           </a:p>
           <a:p>
-            <a:r>
-              <a:rPr lang="en-GB" dirty="0" smtClean="0">
-                <a:effectLst/>
-              </a:rPr>
-              <a:t/>
-            </a:r>
             <a:br>
-              <a:rPr lang="en-GB" dirty="0" smtClean="0">
+              <a:rPr lang="en-GB" dirty="0">
                 <a:effectLst/>
               </a:rPr>
             </a:br>
-            <a:endParaRPr lang="en-GB" dirty="0" smtClean="0"/>
-          </a:p>
-          <a:p>
-            <a:r>
-              <a:rPr lang="en-GB" dirty="0" smtClean="0">
+            <a:endParaRPr lang="en-GB" dirty="0"/>
+          </a:p>
+          <a:p>
+            <a:r>
+              <a:rPr lang="en-GB" dirty="0">
                 <a:effectLst/>
               </a:rPr>
               <a:t>print cluster groups</a:t>
             </a:r>
-            <a:endParaRPr lang="en-GB" dirty="0" smtClean="0"/>
-          </a:p>
-          <a:p>
-            <a:r>
-              <a:rPr lang="en-GB" dirty="0" smtClean="0">
+            <a:endParaRPr lang="en-GB" dirty="0"/>
+          </a:p>
+          <a:p>
+            <a:r>
+              <a:rPr lang="en-GB" dirty="0">
                 <a:effectLst/>
               </a:rPr>
               <a:t>plot parameter data for cluster groups</a:t>
             </a:r>
-            <a:endParaRPr lang="en-GB" dirty="0" smtClean="0"/>
-          </a:p>
-          <a:p>
-            <a:r>
-              <a:rPr lang="en-GB" dirty="0" smtClean="0">
-                <a:effectLst/>
-              </a:rPr>
-              <a:t/>
-            </a:r>
+            <a:endParaRPr lang="en-GB" dirty="0"/>
+          </a:p>
+          <a:p>
             <a:br>
-              <a:rPr lang="en-GB" dirty="0" smtClean="0">
+              <a:rPr lang="en-GB" dirty="0">
                 <a:effectLst/>
               </a:rPr>
             </a:br>
-            <a:endParaRPr lang="en-GB" dirty="0" smtClean="0"/>
-          </a:p>
-          <a:p>
-            <a:r>
-              <a:rPr lang="en-GB" dirty="0" smtClean="0">
+            <a:endParaRPr lang="en-GB" dirty="0"/>
+          </a:p>
+          <a:p>
+            <a:r>
+              <a:rPr lang="en-GB" dirty="0">
                 <a:effectLst/>
               </a:rPr>
               <a:t>plot</a:t>
             </a:r>
-            <a:endParaRPr lang="en-GB" dirty="0" smtClean="0"/>
-          </a:p>
-          <a:p>
-            <a:r>
-              <a:rPr lang="en-GB" dirty="0" smtClean="0">
+            <a:endParaRPr lang="en-GB" dirty="0"/>
+          </a:p>
+          <a:p>
+            <a:r>
+              <a:rPr lang="en-GB" dirty="0">
                 <a:effectLst/>
               </a:rPr>
               <a:t>plot actual curves</a:t>
             </a:r>
-            <a:endParaRPr lang="en-GB" dirty="0" smtClean="0"/>
-          </a:p>
-          <a:p>
-            <a:r>
-              <a:rPr lang="en-GB" dirty="0" smtClean="0">
+            <a:endParaRPr lang="en-GB" dirty="0"/>
+          </a:p>
+          <a:p>
+            <a:r>
+              <a:rPr lang="en-GB" dirty="0">
                 <a:effectLst/>
               </a:rPr>
               <a:t>plot parameters as box plots or </a:t>
             </a:r>
             <a:r>
-              <a:rPr lang="en-GB" dirty="0" err="1" smtClean="0">
+              <a:rPr lang="en-GB" dirty="0" err="1">
                 <a:effectLst/>
               </a:rPr>
               <a:t>scattergrams</a:t>
             </a:r>
-            <a:endParaRPr lang="en-GB" dirty="0" smtClean="0"/>
-          </a:p>
-          <a:p>
-            <a:r>
-              <a:rPr lang="en-GB" dirty="0" smtClean="0">
-                <a:effectLst/>
-              </a:rPr>
-              <a:t/>
-            </a:r>
+            <a:endParaRPr lang="en-GB" dirty="0"/>
+          </a:p>
+          <a:p>
             <a:br>
-              <a:rPr lang="en-GB" dirty="0" smtClean="0">
+              <a:rPr lang="en-GB" dirty="0">
                 <a:effectLst/>
               </a:rPr>
             </a:br>
-            <a:endParaRPr lang="en-GB" dirty="0" smtClean="0"/>
-          </a:p>
-          <a:p>
-            <a:r>
-              <a:rPr lang="en-GB" dirty="0" smtClean="0">
+            <a:endParaRPr lang="en-GB" dirty="0"/>
+          </a:p>
+          <a:p>
+            <a:r>
+              <a:rPr lang="en-GB" dirty="0">
                 <a:effectLst/>
               </a:rPr>
               <a:t>deal with missing data</a:t>
             </a:r>
-            <a:endParaRPr lang="en-GB" dirty="0" smtClean="0"/>
-          </a:p>
-          <a:p>
-            <a:r>
-              <a:rPr lang="en-GB" dirty="0" smtClean="0">
+            <a:endParaRPr lang="en-GB" dirty="0"/>
+          </a:p>
+          <a:p>
+            <a:r>
+              <a:rPr lang="en-GB" dirty="0">
                 <a:effectLst/>
               </a:rPr>
               <a:t>return to a an excel file </a:t>
             </a:r>
-            <a:endParaRPr lang="en-GB" dirty="0" smtClean="0"/>
-          </a:p>
-          <a:p>
-            <a:r>
-              <a:rPr lang="en-GB" dirty="0" smtClean="0">
-                <a:effectLst/>
-              </a:rPr>
-              <a:t/>
-            </a:r>
+            <a:endParaRPr lang="en-GB" dirty="0"/>
+          </a:p>
+          <a:p>
             <a:br>
-              <a:rPr lang="en-GB" dirty="0" smtClean="0">
+              <a:rPr lang="en-GB" dirty="0">
                 <a:effectLst/>
               </a:rPr>
             </a:br>
-            <a:endParaRPr lang="en-GB" dirty="0" smtClean="0"/>
-          </a:p>
-          <a:p>
-            <a:r>
-              <a:rPr lang="en-GB" dirty="0" err="1" smtClean="0">
+            <a:endParaRPr lang="en-GB" dirty="0"/>
+          </a:p>
+          <a:p>
+            <a:r>
+              <a:rPr lang="en-GB" dirty="0" err="1">
                 <a:effectLst/>
               </a:rPr>
               <a:t>excelNegativeVsPositive</a:t>
             </a:r>
             <a:r>
-              <a:rPr lang="en-GB" dirty="0" smtClean="0">
+              <a:rPr lang="en-GB" dirty="0">
                 <a:effectLst/>
               </a:rPr>
               <a:t>: </a:t>
             </a:r>
-            <a:endParaRPr lang="en-GB" dirty="0" smtClean="0"/>
-          </a:p>
-          <a:p>
-            <a:r>
-              <a:rPr lang="en-GB" dirty="0" smtClean="0">
+            <a:endParaRPr lang="en-GB" dirty="0"/>
+          </a:p>
+          <a:p>
+            <a:r>
+              <a:rPr lang="en-GB" dirty="0">
                 <a:effectLst/>
               </a:rPr>
               <a:t>get </a:t>
             </a:r>
             <a:r>
-              <a:rPr lang="en-GB" dirty="0" err="1" smtClean="0">
+              <a:rPr lang="en-GB" dirty="0" err="1">
                 <a:effectLst/>
               </a:rPr>
               <a:t>excelRowMax</a:t>
             </a:r>
             <a:r>
-              <a:rPr lang="en-GB" dirty="0" smtClean="0">
+              <a:rPr lang="en-GB" dirty="0">
                 <a:effectLst/>
               </a:rPr>
               <a:t> programme to </a:t>
             </a:r>
-            <a:endParaRPr lang="en-GB" dirty="0" smtClean="0"/>
-          </a:p>
-          <a:p>
-            <a:r>
-              <a:rPr lang="en-GB" dirty="0" smtClean="0"/>
+            <a:endParaRPr lang="en-GB" dirty="0"/>
+          </a:p>
+          <a:p>
+            <a:r>
+              <a:rPr lang="en-GB" dirty="0"/>
               <a:t> </a:t>
             </a:r>
           </a:p>
           <a:p>
             <a:r>
-              <a:rPr lang="en-GB" dirty="0" smtClean="0">
+              <a:rPr lang="en-GB" dirty="0">
                 <a:effectLst/>
               </a:rPr>
               <a:t>further simplify code for </a:t>
             </a:r>
             <a:r>
-              <a:rPr lang="en-GB" dirty="0" err="1" smtClean="0">
+              <a:rPr lang="en-GB" dirty="0" err="1">
                 <a:effectLst/>
               </a:rPr>
               <a:t>RTquicsheet</a:t>
             </a:r>
             <a:r>
-              <a:rPr lang="en-GB" dirty="0" smtClean="0">
+              <a:rPr lang="en-GB" dirty="0">
                 <a:effectLst/>
               </a:rPr>
               <a:t> (extract the stuff to do with getting the sheet)</a:t>
             </a:r>
-            <a:endParaRPr lang="en-GB" dirty="0" smtClean="0"/>
-          </a:p>
-          <a:p>
-            <a:r>
-              <a:rPr lang="en-GB" dirty="0" smtClean="0">
+            <a:endParaRPr lang="en-GB" dirty="0"/>
+          </a:p>
+          <a:p>
+            <a:r>
+              <a:rPr lang="en-GB" dirty="0">
                 <a:effectLst/>
               </a:rPr>
               <a:t>plot demo figure illustrating baseline </a:t>
             </a:r>
             <a:r>
-              <a:rPr lang="en-GB" dirty="0" err="1" smtClean="0">
+              <a:rPr lang="en-GB" dirty="0" err="1">
                 <a:effectLst/>
               </a:rPr>
               <a:t>threehold</a:t>
             </a:r>
             <a:r>
-              <a:rPr lang="en-GB" dirty="0" smtClean="0">
+              <a:rPr lang="en-GB" dirty="0">
                 <a:effectLst/>
               </a:rPr>
               <a:t>, lag time, gradient, time to max, max </a:t>
             </a:r>
             <a:r>
-              <a:rPr lang="en-GB" dirty="0" err="1" smtClean="0">
+              <a:rPr lang="en-GB" dirty="0" err="1">
                 <a:effectLst/>
               </a:rPr>
               <a:t>val</a:t>
             </a:r>
-            <a:endParaRPr lang="en-GB" dirty="0" smtClean="0"/>
-          </a:p>
-          <a:p>
-            <a:r>
-              <a:rPr lang="en-GB" dirty="0" smtClean="0">
+            <a:endParaRPr lang="en-GB" dirty="0"/>
+          </a:p>
+          <a:p>
+            <a:r>
+              <a:rPr lang="en-GB" dirty="0">
                 <a:effectLst/>
               </a:rPr>
               <a:t>get parameter generator sorted</a:t>
             </a:r>
-            <a:endParaRPr lang="en-GB" dirty="0" smtClean="0"/>
-          </a:p>
-          <a:p>
-            <a:r>
-              <a:rPr lang="en-GB" dirty="0" smtClean="0"/>
+            <a:endParaRPr lang="en-GB" dirty="0"/>
+          </a:p>
+          <a:p>
+            <a:r>
+              <a:rPr lang="en-GB" dirty="0"/>
               <a:t> </a:t>
             </a:r>
           </a:p>
           <a:p>
             <a:r>
-              <a:rPr lang="en-GB" dirty="0" smtClean="0">
+              <a:rPr lang="en-GB" dirty="0">
                 <a:effectLst/>
               </a:rPr>
               <a:t>cluster analysis: on all samples showing conversion. </a:t>
             </a:r>
-            <a:endParaRPr lang="en-GB" dirty="0" smtClean="0"/>
-          </a:p>
-          <a:p>
-            <a:r>
-              <a:rPr lang="en-GB" dirty="0" smtClean="0">
+            <a:endParaRPr lang="en-GB" dirty="0"/>
+          </a:p>
+          <a:p>
+            <a:r>
+              <a:rPr lang="en-GB" dirty="0">
                 <a:effectLst/>
               </a:rPr>
               <a:t>two things</a:t>
             </a:r>
-            <a:endParaRPr lang="en-GB" dirty="0" smtClean="0"/>
-          </a:p>
-          <a:p>
-            <a:r>
-              <a:rPr lang="en-GB" dirty="0" smtClean="0">
+            <a:endParaRPr lang="en-GB" dirty="0"/>
+          </a:p>
+          <a:p>
+            <a:r>
+              <a:rPr lang="en-GB" dirty="0">
                 <a:effectLst/>
               </a:rPr>
               <a:t>single out column </a:t>
             </a:r>
-            <a:endParaRPr lang="en-GB" dirty="0" smtClean="0"/>
-          </a:p>
-          <a:p>
-            <a:r>
-              <a:rPr lang="en-GB" dirty="0" smtClean="0">
+            <a:endParaRPr lang="en-GB" dirty="0"/>
+          </a:p>
+          <a:p>
+            <a:r>
+              <a:rPr lang="en-GB" dirty="0">
                 <a:effectLst/>
               </a:rPr>
               <a:t>one line, one result</a:t>
             </a:r>
-            <a:endParaRPr lang="en-GB" dirty="0" smtClean="0"/>
-          </a:p>
-          <a:p>
-            <a:r>
-              <a:rPr lang="en-GB" dirty="0" smtClean="0">
+            <a:endParaRPr lang="en-GB" dirty="0"/>
+          </a:p>
+          <a:p>
+            <a:r>
+              <a:rPr lang="en-GB" dirty="0">
                 <a:effectLst/>
               </a:rPr>
               <a:t>classify line</a:t>
             </a:r>
-            <a:endParaRPr lang="en-GB" dirty="0" smtClean="0"/>
-          </a:p>
-          <a:p>
-            <a:r>
-              <a:rPr lang="en-GB" dirty="0" err="1" smtClean="0">
+            <a:endParaRPr lang="en-GB" dirty="0"/>
+          </a:p>
+          <a:p>
+            <a:r>
+              <a:rPr lang="en-GB" dirty="0" err="1">
                 <a:effectLst/>
               </a:rPr>
               <a:t>creat</a:t>
             </a:r>
             <a:r>
-              <a:rPr lang="en-GB" dirty="0" smtClean="0">
+              <a:rPr lang="en-GB" dirty="0">
                 <a:effectLst/>
               </a:rPr>
               <a:t> </a:t>
             </a:r>
             <a:r>
-              <a:rPr lang="en-GB" dirty="0" err="1" smtClean="0">
+              <a:rPr lang="en-GB" dirty="0" err="1">
                 <a:effectLst/>
               </a:rPr>
               <a:t>dict</a:t>
             </a:r>
             <a:r>
-              <a:rPr lang="en-GB" dirty="0" smtClean="0">
+              <a:rPr lang="en-GB" dirty="0">
                 <a:effectLst/>
               </a:rPr>
               <a:t> of </a:t>
             </a:r>
             <a:r>
-              <a:rPr lang="en-GB" dirty="0" err="1" smtClean="0">
+              <a:rPr lang="en-GB" dirty="0" err="1">
                 <a:effectLst/>
               </a:rPr>
               <a:t>classifiications</a:t>
             </a:r>
             <a:r>
-              <a:rPr lang="en-GB" smtClean="0">
+              <a:rPr lang="en-GB">
                 <a:effectLst/>
               </a:rPr>
               <a:t> versus [labels][</a:t>
             </a:r>
-            <a:endParaRPr lang="en-GB" smtClean="0"/>
+            <a:endParaRPr lang="en-GB"/>
           </a:p>
           <a:p>
             <a:endParaRPr lang="en-GB"/>
@@ -1206,7 +1162,7 @@
           <p:cNvPr id="2" name="Title 1">
             <a:extLst>
               <a:ext uri="{FF2B5EF4-FFF2-40B4-BE49-F238E27FC236}">
-                <a16:creationId xmlns="" xmlns:a16="http://schemas.microsoft.com/office/drawing/2014/main" id="{3B78CFE3-AEBA-42C9-880B-7F8B693A4D54}"/>
+                <a16:creationId xmlns:a16="http://schemas.microsoft.com/office/drawing/2014/main" id="{3B78CFE3-AEBA-42C9-880B-7F8B693A4D54}"/>
               </a:ext>
             </a:extLst>
           </p:cNvPr>
@@ -1244,7 +1200,7 @@
           <p:cNvPr id="3" name="Subtitle 2">
             <a:extLst>
               <a:ext uri="{FF2B5EF4-FFF2-40B4-BE49-F238E27FC236}">
-                <a16:creationId xmlns="" xmlns:a16="http://schemas.microsoft.com/office/drawing/2014/main" id="{8E9A35BF-5581-4653-8C91-8739D1857BFA}"/>
+                <a16:creationId xmlns:a16="http://schemas.microsoft.com/office/drawing/2014/main" id="{8E9A35BF-5581-4653-8C91-8739D1857BFA}"/>
               </a:ext>
             </a:extLst>
           </p:cNvPr>
@@ -1315,7 +1271,7 @@
           <p:cNvPr id="4" name="Date Placeholder 3">
             <a:extLst>
               <a:ext uri="{FF2B5EF4-FFF2-40B4-BE49-F238E27FC236}">
-                <a16:creationId xmlns="" xmlns:a16="http://schemas.microsoft.com/office/drawing/2014/main" id="{BED4DFA6-DE6E-4AAD-8D95-305682F7B7DC}"/>
+                <a16:creationId xmlns:a16="http://schemas.microsoft.com/office/drawing/2014/main" id="{BED4DFA6-DE6E-4AAD-8D95-305682F7B7DC}"/>
               </a:ext>
             </a:extLst>
           </p:cNvPr>
@@ -1333,7 +1289,7 @@
           <a:p>
             <a:fld id="{8213B8F1-4FA8-4032-AA8A-75E99188CEDC}" type="datetimeFigureOut">
               <a:rPr lang="en-GB" smtClean="0"/>
-              <a:t>23/09/2019</a:t>
+              <a:t>25/09/2019</a:t>
             </a:fld>
             <a:endParaRPr lang="en-GB"/>
           </a:p>
@@ -1344,7 +1300,7 @@
           <p:cNvPr id="5" name="Footer Placeholder 4">
             <a:extLst>
               <a:ext uri="{FF2B5EF4-FFF2-40B4-BE49-F238E27FC236}">
-                <a16:creationId xmlns="" xmlns:a16="http://schemas.microsoft.com/office/drawing/2014/main" id="{0250E318-298C-47B9-8DB5-5AC90F722F68}"/>
+                <a16:creationId xmlns:a16="http://schemas.microsoft.com/office/drawing/2014/main" id="{0250E318-298C-47B9-8DB5-5AC90F722F68}"/>
               </a:ext>
             </a:extLst>
           </p:cNvPr>
@@ -1369,7 +1325,7 @@
           <p:cNvPr id="6" name="Slide Number Placeholder 5">
             <a:extLst>
               <a:ext uri="{FF2B5EF4-FFF2-40B4-BE49-F238E27FC236}">
-                <a16:creationId xmlns="" xmlns:a16="http://schemas.microsoft.com/office/drawing/2014/main" id="{954DC707-44CA-4885-A7B6-4C9E150F9CE8}"/>
+                <a16:creationId xmlns:a16="http://schemas.microsoft.com/office/drawing/2014/main" id="{954DC707-44CA-4885-A7B6-4C9E150F9CE8}"/>
               </a:ext>
             </a:extLst>
           </p:cNvPr>
@@ -1428,7 +1384,7 @@
           <p:cNvPr id="2" name="Title 1">
             <a:extLst>
               <a:ext uri="{FF2B5EF4-FFF2-40B4-BE49-F238E27FC236}">
-                <a16:creationId xmlns="" xmlns:a16="http://schemas.microsoft.com/office/drawing/2014/main" id="{5C324CBD-47F1-4794-B0A7-31338B5360A2}"/>
+                <a16:creationId xmlns:a16="http://schemas.microsoft.com/office/drawing/2014/main" id="{5C324CBD-47F1-4794-B0A7-31338B5360A2}"/>
               </a:ext>
             </a:extLst>
           </p:cNvPr>
@@ -1457,7 +1413,7 @@
           <p:cNvPr id="3" name="Vertical Text Placeholder 2">
             <a:extLst>
               <a:ext uri="{FF2B5EF4-FFF2-40B4-BE49-F238E27FC236}">
-                <a16:creationId xmlns="" xmlns:a16="http://schemas.microsoft.com/office/drawing/2014/main" id="{1CBCFD0E-7468-4445-9276-45B53FD5E03C}"/>
+                <a16:creationId xmlns:a16="http://schemas.microsoft.com/office/drawing/2014/main" id="{1CBCFD0E-7468-4445-9276-45B53FD5E03C}"/>
               </a:ext>
             </a:extLst>
           </p:cNvPr>
@@ -1515,7 +1471,7 @@
           <p:cNvPr id="4" name="Date Placeholder 3">
             <a:extLst>
               <a:ext uri="{FF2B5EF4-FFF2-40B4-BE49-F238E27FC236}">
-                <a16:creationId xmlns="" xmlns:a16="http://schemas.microsoft.com/office/drawing/2014/main" id="{8A96B140-2FE0-4802-8A4F-E8149F557A09}"/>
+                <a16:creationId xmlns:a16="http://schemas.microsoft.com/office/drawing/2014/main" id="{8A96B140-2FE0-4802-8A4F-E8149F557A09}"/>
               </a:ext>
             </a:extLst>
           </p:cNvPr>
@@ -1533,7 +1489,7 @@
           <a:p>
             <a:fld id="{8213B8F1-4FA8-4032-AA8A-75E99188CEDC}" type="datetimeFigureOut">
               <a:rPr lang="en-GB" smtClean="0"/>
-              <a:t>23/09/2019</a:t>
+              <a:t>25/09/2019</a:t>
             </a:fld>
             <a:endParaRPr lang="en-GB"/>
           </a:p>
@@ -1544,7 +1500,7 @@
           <p:cNvPr id="5" name="Footer Placeholder 4">
             <a:extLst>
               <a:ext uri="{FF2B5EF4-FFF2-40B4-BE49-F238E27FC236}">
-                <a16:creationId xmlns="" xmlns:a16="http://schemas.microsoft.com/office/drawing/2014/main" id="{8979A76B-353E-4132-96BE-34262A442D22}"/>
+                <a16:creationId xmlns:a16="http://schemas.microsoft.com/office/drawing/2014/main" id="{8979A76B-353E-4132-96BE-34262A442D22}"/>
               </a:ext>
             </a:extLst>
           </p:cNvPr>
@@ -1569,7 +1525,7 @@
           <p:cNvPr id="6" name="Slide Number Placeholder 5">
             <a:extLst>
               <a:ext uri="{FF2B5EF4-FFF2-40B4-BE49-F238E27FC236}">
-                <a16:creationId xmlns="" xmlns:a16="http://schemas.microsoft.com/office/drawing/2014/main" id="{065275D8-D675-4E90-AC46-762B577BF611}"/>
+                <a16:creationId xmlns:a16="http://schemas.microsoft.com/office/drawing/2014/main" id="{065275D8-D675-4E90-AC46-762B577BF611}"/>
               </a:ext>
             </a:extLst>
           </p:cNvPr>
@@ -1628,7 +1584,7 @@
           <p:cNvPr id="2" name="Vertical Title 1">
             <a:extLst>
               <a:ext uri="{FF2B5EF4-FFF2-40B4-BE49-F238E27FC236}">
-                <a16:creationId xmlns="" xmlns:a16="http://schemas.microsoft.com/office/drawing/2014/main" id="{38F43B08-65E9-4AD3-ADA6-FCD55AC7B77D}"/>
+                <a16:creationId xmlns:a16="http://schemas.microsoft.com/office/drawing/2014/main" id="{38F43B08-65E9-4AD3-ADA6-FCD55AC7B77D}"/>
               </a:ext>
             </a:extLst>
           </p:cNvPr>
@@ -1662,7 +1618,7 @@
           <p:cNvPr id="3" name="Vertical Text Placeholder 2">
             <a:extLst>
               <a:ext uri="{FF2B5EF4-FFF2-40B4-BE49-F238E27FC236}">
-                <a16:creationId xmlns="" xmlns:a16="http://schemas.microsoft.com/office/drawing/2014/main" id="{9B0C30F1-5E1C-4257-AB69-EEE385F1EA6B}"/>
+                <a16:creationId xmlns:a16="http://schemas.microsoft.com/office/drawing/2014/main" id="{9B0C30F1-5E1C-4257-AB69-EEE385F1EA6B}"/>
               </a:ext>
             </a:extLst>
           </p:cNvPr>
@@ -1725,7 +1681,7 @@
           <p:cNvPr id="4" name="Date Placeholder 3">
             <a:extLst>
               <a:ext uri="{FF2B5EF4-FFF2-40B4-BE49-F238E27FC236}">
-                <a16:creationId xmlns="" xmlns:a16="http://schemas.microsoft.com/office/drawing/2014/main" id="{3AE37463-C584-415A-88F6-37B014074EF4}"/>
+                <a16:creationId xmlns:a16="http://schemas.microsoft.com/office/drawing/2014/main" id="{3AE37463-C584-415A-88F6-37B014074EF4}"/>
               </a:ext>
             </a:extLst>
           </p:cNvPr>
@@ -1743,7 +1699,7 @@
           <a:p>
             <a:fld id="{8213B8F1-4FA8-4032-AA8A-75E99188CEDC}" type="datetimeFigureOut">
               <a:rPr lang="en-GB" smtClean="0"/>
-              <a:t>23/09/2019</a:t>
+              <a:t>25/09/2019</a:t>
             </a:fld>
             <a:endParaRPr lang="en-GB"/>
           </a:p>
@@ -1754,7 +1710,7 @@
           <p:cNvPr id="5" name="Footer Placeholder 4">
             <a:extLst>
               <a:ext uri="{FF2B5EF4-FFF2-40B4-BE49-F238E27FC236}">
-                <a16:creationId xmlns="" xmlns:a16="http://schemas.microsoft.com/office/drawing/2014/main" id="{A2012936-86E4-40D8-BE8E-631147953AA9}"/>
+                <a16:creationId xmlns:a16="http://schemas.microsoft.com/office/drawing/2014/main" id="{A2012936-86E4-40D8-BE8E-631147953AA9}"/>
               </a:ext>
             </a:extLst>
           </p:cNvPr>
@@ -1779,7 +1735,7 @@
           <p:cNvPr id="6" name="Slide Number Placeholder 5">
             <a:extLst>
               <a:ext uri="{FF2B5EF4-FFF2-40B4-BE49-F238E27FC236}">
-                <a16:creationId xmlns="" xmlns:a16="http://schemas.microsoft.com/office/drawing/2014/main" id="{12D9E898-3F2D-4024-A557-8FAA736C9FC5}"/>
+                <a16:creationId xmlns:a16="http://schemas.microsoft.com/office/drawing/2014/main" id="{12D9E898-3F2D-4024-A557-8FAA736C9FC5}"/>
               </a:ext>
             </a:extLst>
           </p:cNvPr>
@@ -1838,7 +1794,7 @@
           <p:cNvPr id="2" name="Title 1">
             <a:extLst>
               <a:ext uri="{FF2B5EF4-FFF2-40B4-BE49-F238E27FC236}">
-                <a16:creationId xmlns="" xmlns:a16="http://schemas.microsoft.com/office/drawing/2014/main" id="{486AD373-D952-43FA-BE50-09530CB07D7A}"/>
+                <a16:creationId xmlns:a16="http://schemas.microsoft.com/office/drawing/2014/main" id="{486AD373-D952-43FA-BE50-09530CB07D7A}"/>
               </a:ext>
             </a:extLst>
           </p:cNvPr>
@@ -1867,7 +1823,7 @@
           <p:cNvPr id="3" name="Content Placeholder 2">
             <a:extLst>
               <a:ext uri="{FF2B5EF4-FFF2-40B4-BE49-F238E27FC236}">
-                <a16:creationId xmlns="" xmlns:a16="http://schemas.microsoft.com/office/drawing/2014/main" id="{CD2F6BF4-4328-4512-8333-E178E907D547}"/>
+                <a16:creationId xmlns:a16="http://schemas.microsoft.com/office/drawing/2014/main" id="{CD2F6BF4-4328-4512-8333-E178E907D547}"/>
               </a:ext>
             </a:extLst>
           </p:cNvPr>
@@ -1925,7 +1881,7 @@
           <p:cNvPr id="4" name="Date Placeholder 3">
             <a:extLst>
               <a:ext uri="{FF2B5EF4-FFF2-40B4-BE49-F238E27FC236}">
-                <a16:creationId xmlns="" xmlns:a16="http://schemas.microsoft.com/office/drawing/2014/main" id="{A1A8EED9-C1AB-46B0-8913-08764B639270}"/>
+                <a16:creationId xmlns:a16="http://schemas.microsoft.com/office/drawing/2014/main" id="{A1A8EED9-C1AB-46B0-8913-08764B639270}"/>
               </a:ext>
             </a:extLst>
           </p:cNvPr>
@@ -1943,7 +1899,7 @@
           <a:p>
             <a:fld id="{8213B8F1-4FA8-4032-AA8A-75E99188CEDC}" type="datetimeFigureOut">
               <a:rPr lang="en-GB" smtClean="0"/>
-              <a:t>23/09/2019</a:t>
+              <a:t>25/09/2019</a:t>
             </a:fld>
             <a:endParaRPr lang="en-GB"/>
           </a:p>
@@ -1954,7 +1910,7 @@
           <p:cNvPr id="5" name="Footer Placeholder 4">
             <a:extLst>
               <a:ext uri="{FF2B5EF4-FFF2-40B4-BE49-F238E27FC236}">
-                <a16:creationId xmlns="" xmlns:a16="http://schemas.microsoft.com/office/drawing/2014/main" id="{5BAB97B3-CB03-4D20-A8C1-A6CCC5B0055F}"/>
+                <a16:creationId xmlns:a16="http://schemas.microsoft.com/office/drawing/2014/main" id="{5BAB97B3-CB03-4D20-A8C1-A6CCC5B0055F}"/>
               </a:ext>
             </a:extLst>
           </p:cNvPr>
@@ -1979,7 +1935,7 @@
           <p:cNvPr id="6" name="Slide Number Placeholder 5">
             <a:extLst>
               <a:ext uri="{FF2B5EF4-FFF2-40B4-BE49-F238E27FC236}">
-                <a16:creationId xmlns="" xmlns:a16="http://schemas.microsoft.com/office/drawing/2014/main" id="{B211D78D-8924-41A4-8DFC-CCBAD603F60A}"/>
+                <a16:creationId xmlns:a16="http://schemas.microsoft.com/office/drawing/2014/main" id="{B211D78D-8924-41A4-8DFC-CCBAD603F60A}"/>
               </a:ext>
             </a:extLst>
           </p:cNvPr>
@@ -2038,7 +1994,7 @@
           <p:cNvPr id="2" name="Title 1">
             <a:extLst>
               <a:ext uri="{FF2B5EF4-FFF2-40B4-BE49-F238E27FC236}">
-                <a16:creationId xmlns="" xmlns:a16="http://schemas.microsoft.com/office/drawing/2014/main" id="{E3BB7673-8771-4347-AB9C-5B2AC3E70E58}"/>
+                <a16:creationId xmlns:a16="http://schemas.microsoft.com/office/drawing/2014/main" id="{E3BB7673-8771-4347-AB9C-5B2AC3E70E58}"/>
               </a:ext>
             </a:extLst>
           </p:cNvPr>
@@ -2076,7 +2032,7 @@
           <p:cNvPr id="3" name="Text Placeholder 2">
             <a:extLst>
               <a:ext uri="{FF2B5EF4-FFF2-40B4-BE49-F238E27FC236}">
-                <a16:creationId xmlns="" xmlns:a16="http://schemas.microsoft.com/office/drawing/2014/main" id="{9F0B9040-A71F-4FF3-89EA-D70F908B5235}"/>
+                <a16:creationId xmlns:a16="http://schemas.microsoft.com/office/drawing/2014/main" id="{9F0B9040-A71F-4FF3-89EA-D70F908B5235}"/>
               </a:ext>
             </a:extLst>
           </p:cNvPr>
@@ -2201,7 +2157,7 @@
           <p:cNvPr id="4" name="Date Placeholder 3">
             <a:extLst>
               <a:ext uri="{FF2B5EF4-FFF2-40B4-BE49-F238E27FC236}">
-                <a16:creationId xmlns="" xmlns:a16="http://schemas.microsoft.com/office/drawing/2014/main" id="{4E0B58EA-D0AA-42C2-B1BE-04B84FF6B77F}"/>
+                <a16:creationId xmlns:a16="http://schemas.microsoft.com/office/drawing/2014/main" id="{4E0B58EA-D0AA-42C2-B1BE-04B84FF6B77F}"/>
               </a:ext>
             </a:extLst>
           </p:cNvPr>
@@ -2219,7 +2175,7 @@
           <a:p>
             <a:fld id="{8213B8F1-4FA8-4032-AA8A-75E99188CEDC}" type="datetimeFigureOut">
               <a:rPr lang="en-GB" smtClean="0"/>
-              <a:t>23/09/2019</a:t>
+              <a:t>25/09/2019</a:t>
             </a:fld>
             <a:endParaRPr lang="en-GB"/>
           </a:p>
@@ -2230,7 +2186,7 @@
           <p:cNvPr id="5" name="Footer Placeholder 4">
             <a:extLst>
               <a:ext uri="{FF2B5EF4-FFF2-40B4-BE49-F238E27FC236}">
-                <a16:creationId xmlns="" xmlns:a16="http://schemas.microsoft.com/office/drawing/2014/main" id="{6A27F45B-6307-4262-9DB1-73D13669B85F}"/>
+                <a16:creationId xmlns:a16="http://schemas.microsoft.com/office/drawing/2014/main" id="{6A27F45B-6307-4262-9DB1-73D13669B85F}"/>
               </a:ext>
             </a:extLst>
           </p:cNvPr>
@@ -2255,7 +2211,7 @@
           <p:cNvPr id="6" name="Slide Number Placeholder 5">
             <a:extLst>
               <a:ext uri="{FF2B5EF4-FFF2-40B4-BE49-F238E27FC236}">
-                <a16:creationId xmlns="" xmlns:a16="http://schemas.microsoft.com/office/drawing/2014/main" id="{FD59CB62-ED80-41E5-8977-6563EB797F5F}"/>
+                <a16:creationId xmlns:a16="http://schemas.microsoft.com/office/drawing/2014/main" id="{FD59CB62-ED80-41E5-8977-6563EB797F5F}"/>
               </a:ext>
             </a:extLst>
           </p:cNvPr>
@@ -2314,7 +2270,7 @@
           <p:cNvPr id="2" name="Title 1">
             <a:extLst>
               <a:ext uri="{FF2B5EF4-FFF2-40B4-BE49-F238E27FC236}">
-                <a16:creationId xmlns="" xmlns:a16="http://schemas.microsoft.com/office/drawing/2014/main" id="{34451ED7-1A03-4504-823A-B4EC63DBD9C6}"/>
+                <a16:creationId xmlns:a16="http://schemas.microsoft.com/office/drawing/2014/main" id="{34451ED7-1A03-4504-823A-B4EC63DBD9C6}"/>
               </a:ext>
             </a:extLst>
           </p:cNvPr>
@@ -2343,7 +2299,7 @@
           <p:cNvPr id="3" name="Content Placeholder 2">
             <a:extLst>
               <a:ext uri="{FF2B5EF4-FFF2-40B4-BE49-F238E27FC236}">
-                <a16:creationId xmlns="" xmlns:a16="http://schemas.microsoft.com/office/drawing/2014/main" id="{045CBEA4-6B74-4971-9705-A0C6BCCFA0CA}"/>
+                <a16:creationId xmlns:a16="http://schemas.microsoft.com/office/drawing/2014/main" id="{045CBEA4-6B74-4971-9705-A0C6BCCFA0CA}"/>
               </a:ext>
             </a:extLst>
           </p:cNvPr>
@@ -2406,7 +2362,7 @@
           <p:cNvPr id="4" name="Content Placeholder 3">
             <a:extLst>
               <a:ext uri="{FF2B5EF4-FFF2-40B4-BE49-F238E27FC236}">
-                <a16:creationId xmlns="" xmlns:a16="http://schemas.microsoft.com/office/drawing/2014/main" id="{6FC9779A-20EC-47C8-82F7-9CA508053117}"/>
+                <a16:creationId xmlns:a16="http://schemas.microsoft.com/office/drawing/2014/main" id="{6FC9779A-20EC-47C8-82F7-9CA508053117}"/>
               </a:ext>
             </a:extLst>
           </p:cNvPr>
@@ -2469,7 +2425,7 @@
           <p:cNvPr id="5" name="Date Placeholder 4">
             <a:extLst>
               <a:ext uri="{FF2B5EF4-FFF2-40B4-BE49-F238E27FC236}">
-                <a16:creationId xmlns="" xmlns:a16="http://schemas.microsoft.com/office/drawing/2014/main" id="{A5648987-78A5-4AC0-A3EC-8BC2AF931488}"/>
+                <a16:creationId xmlns:a16="http://schemas.microsoft.com/office/drawing/2014/main" id="{A5648987-78A5-4AC0-A3EC-8BC2AF931488}"/>
               </a:ext>
             </a:extLst>
           </p:cNvPr>
@@ -2487,7 +2443,7 @@
           <a:p>
             <a:fld id="{8213B8F1-4FA8-4032-AA8A-75E99188CEDC}" type="datetimeFigureOut">
               <a:rPr lang="en-GB" smtClean="0"/>
-              <a:t>23/09/2019</a:t>
+              <a:t>25/09/2019</a:t>
             </a:fld>
             <a:endParaRPr lang="en-GB"/>
           </a:p>
@@ -2498,7 +2454,7 @@
           <p:cNvPr id="6" name="Footer Placeholder 5">
             <a:extLst>
               <a:ext uri="{FF2B5EF4-FFF2-40B4-BE49-F238E27FC236}">
-                <a16:creationId xmlns="" xmlns:a16="http://schemas.microsoft.com/office/drawing/2014/main" id="{898795B0-BDD5-488E-81F0-5C211FA8FB8D}"/>
+                <a16:creationId xmlns:a16="http://schemas.microsoft.com/office/drawing/2014/main" id="{898795B0-BDD5-488E-81F0-5C211FA8FB8D}"/>
               </a:ext>
             </a:extLst>
           </p:cNvPr>
@@ -2523,7 +2479,7 @@
           <p:cNvPr id="7" name="Slide Number Placeholder 6">
             <a:extLst>
               <a:ext uri="{FF2B5EF4-FFF2-40B4-BE49-F238E27FC236}">
-                <a16:creationId xmlns="" xmlns:a16="http://schemas.microsoft.com/office/drawing/2014/main" id="{9E2819FA-E569-424C-A25C-80EFED539927}"/>
+                <a16:creationId xmlns:a16="http://schemas.microsoft.com/office/drawing/2014/main" id="{9E2819FA-E569-424C-A25C-80EFED539927}"/>
               </a:ext>
             </a:extLst>
           </p:cNvPr>
@@ -2582,7 +2538,7 @@
           <p:cNvPr id="2" name="Title 1">
             <a:extLst>
               <a:ext uri="{FF2B5EF4-FFF2-40B4-BE49-F238E27FC236}">
-                <a16:creationId xmlns="" xmlns:a16="http://schemas.microsoft.com/office/drawing/2014/main" id="{658F431B-B505-46DA-BC30-54323F1CFD8D}"/>
+                <a16:creationId xmlns:a16="http://schemas.microsoft.com/office/drawing/2014/main" id="{658F431B-B505-46DA-BC30-54323F1CFD8D}"/>
               </a:ext>
             </a:extLst>
           </p:cNvPr>
@@ -2616,7 +2572,7 @@
           <p:cNvPr id="3" name="Text Placeholder 2">
             <a:extLst>
               <a:ext uri="{FF2B5EF4-FFF2-40B4-BE49-F238E27FC236}">
-                <a16:creationId xmlns="" xmlns:a16="http://schemas.microsoft.com/office/drawing/2014/main" id="{57E98D5E-BC17-423C-A4FD-1C0808B6A52B}"/>
+                <a16:creationId xmlns:a16="http://schemas.microsoft.com/office/drawing/2014/main" id="{57E98D5E-BC17-423C-A4FD-1C0808B6A52B}"/>
               </a:ext>
             </a:extLst>
           </p:cNvPr>
@@ -2687,7 +2643,7 @@
           <p:cNvPr id="4" name="Content Placeholder 3">
             <a:extLst>
               <a:ext uri="{FF2B5EF4-FFF2-40B4-BE49-F238E27FC236}">
-                <a16:creationId xmlns="" xmlns:a16="http://schemas.microsoft.com/office/drawing/2014/main" id="{DC10028E-D307-403A-BFAE-CE0B0E897794}"/>
+                <a16:creationId xmlns:a16="http://schemas.microsoft.com/office/drawing/2014/main" id="{DC10028E-D307-403A-BFAE-CE0B0E897794}"/>
               </a:ext>
             </a:extLst>
           </p:cNvPr>
@@ -2750,7 +2706,7 @@
           <p:cNvPr id="5" name="Text Placeholder 4">
             <a:extLst>
               <a:ext uri="{FF2B5EF4-FFF2-40B4-BE49-F238E27FC236}">
-                <a16:creationId xmlns="" xmlns:a16="http://schemas.microsoft.com/office/drawing/2014/main" id="{F8787F25-ED59-4018-81D1-3EEBD21ACBA3}"/>
+                <a16:creationId xmlns:a16="http://schemas.microsoft.com/office/drawing/2014/main" id="{F8787F25-ED59-4018-81D1-3EEBD21ACBA3}"/>
               </a:ext>
             </a:extLst>
           </p:cNvPr>
@@ -2821,7 +2777,7 @@
           <p:cNvPr id="6" name="Content Placeholder 5">
             <a:extLst>
               <a:ext uri="{FF2B5EF4-FFF2-40B4-BE49-F238E27FC236}">
-                <a16:creationId xmlns="" xmlns:a16="http://schemas.microsoft.com/office/drawing/2014/main" id="{80801B13-FE1C-4039-ADF9-49DEF1C86BA8}"/>
+                <a16:creationId xmlns:a16="http://schemas.microsoft.com/office/drawing/2014/main" id="{80801B13-FE1C-4039-ADF9-49DEF1C86BA8}"/>
               </a:ext>
             </a:extLst>
           </p:cNvPr>
@@ -2884,7 +2840,7 @@
           <p:cNvPr id="7" name="Date Placeholder 6">
             <a:extLst>
               <a:ext uri="{FF2B5EF4-FFF2-40B4-BE49-F238E27FC236}">
-                <a16:creationId xmlns="" xmlns:a16="http://schemas.microsoft.com/office/drawing/2014/main" id="{AD389E22-C4EE-43D5-913E-5E15DC60EA0F}"/>
+                <a16:creationId xmlns:a16="http://schemas.microsoft.com/office/drawing/2014/main" id="{AD389E22-C4EE-43D5-913E-5E15DC60EA0F}"/>
               </a:ext>
             </a:extLst>
           </p:cNvPr>
@@ -2902,7 +2858,7 @@
           <a:p>
             <a:fld id="{8213B8F1-4FA8-4032-AA8A-75E99188CEDC}" type="datetimeFigureOut">
               <a:rPr lang="en-GB" smtClean="0"/>
-              <a:t>23/09/2019</a:t>
+              <a:t>25/09/2019</a:t>
             </a:fld>
             <a:endParaRPr lang="en-GB"/>
           </a:p>
@@ -2913,7 +2869,7 @@
           <p:cNvPr id="8" name="Footer Placeholder 7">
             <a:extLst>
               <a:ext uri="{FF2B5EF4-FFF2-40B4-BE49-F238E27FC236}">
-                <a16:creationId xmlns="" xmlns:a16="http://schemas.microsoft.com/office/drawing/2014/main" id="{F88DC2AA-A730-4AA6-A9D3-C273CAC60445}"/>
+                <a16:creationId xmlns:a16="http://schemas.microsoft.com/office/drawing/2014/main" id="{F88DC2AA-A730-4AA6-A9D3-C273CAC60445}"/>
               </a:ext>
             </a:extLst>
           </p:cNvPr>
@@ -2938,7 +2894,7 @@
           <p:cNvPr id="9" name="Slide Number Placeholder 8">
             <a:extLst>
               <a:ext uri="{FF2B5EF4-FFF2-40B4-BE49-F238E27FC236}">
-                <a16:creationId xmlns="" xmlns:a16="http://schemas.microsoft.com/office/drawing/2014/main" id="{6884A296-2A46-40A1-8B6E-224387C1E48B}"/>
+                <a16:creationId xmlns:a16="http://schemas.microsoft.com/office/drawing/2014/main" id="{6884A296-2A46-40A1-8B6E-224387C1E48B}"/>
               </a:ext>
             </a:extLst>
           </p:cNvPr>
@@ -2997,7 +2953,7 @@
           <p:cNvPr id="2" name="Title 1">
             <a:extLst>
               <a:ext uri="{FF2B5EF4-FFF2-40B4-BE49-F238E27FC236}">
-                <a16:creationId xmlns="" xmlns:a16="http://schemas.microsoft.com/office/drawing/2014/main" id="{151BE2FA-4BDC-4548-AF54-FC284ADADBAA}"/>
+                <a16:creationId xmlns:a16="http://schemas.microsoft.com/office/drawing/2014/main" id="{151BE2FA-4BDC-4548-AF54-FC284ADADBAA}"/>
               </a:ext>
             </a:extLst>
           </p:cNvPr>
@@ -3026,7 +2982,7 @@
           <p:cNvPr id="3" name="Date Placeholder 2">
             <a:extLst>
               <a:ext uri="{FF2B5EF4-FFF2-40B4-BE49-F238E27FC236}">
-                <a16:creationId xmlns="" xmlns:a16="http://schemas.microsoft.com/office/drawing/2014/main" id="{9CE11472-1B9B-485B-A9F2-4B4C341381EB}"/>
+                <a16:creationId xmlns:a16="http://schemas.microsoft.com/office/drawing/2014/main" id="{9CE11472-1B9B-485B-A9F2-4B4C341381EB}"/>
               </a:ext>
             </a:extLst>
           </p:cNvPr>
@@ -3044,7 +3000,7 @@
           <a:p>
             <a:fld id="{8213B8F1-4FA8-4032-AA8A-75E99188CEDC}" type="datetimeFigureOut">
               <a:rPr lang="en-GB" smtClean="0"/>
-              <a:t>23/09/2019</a:t>
+              <a:t>25/09/2019</a:t>
             </a:fld>
             <a:endParaRPr lang="en-GB"/>
           </a:p>
@@ -3055,7 +3011,7 @@
           <p:cNvPr id="4" name="Footer Placeholder 3">
             <a:extLst>
               <a:ext uri="{FF2B5EF4-FFF2-40B4-BE49-F238E27FC236}">
-                <a16:creationId xmlns="" xmlns:a16="http://schemas.microsoft.com/office/drawing/2014/main" id="{225A4296-4AA7-4EE2-8E5C-F3A5E8E8F7C0}"/>
+                <a16:creationId xmlns:a16="http://schemas.microsoft.com/office/drawing/2014/main" id="{225A4296-4AA7-4EE2-8E5C-F3A5E8E8F7C0}"/>
               </a:ext>
             </a:extLst>
           </p:cNvPr>
@@ -3080,7 +3036,7 @@
           <p:cNvPr id="5" name="Slide Number Placeholder 4">
             <a:extLst>
               <a:ext uri="{FF2B5EF4-FFF2-40B4-BE49-F238E27FC236}">
-                <a16:creationId xmlns="" xmlns:a16="http://schemas.microsoft.com/office/drawing/2014/main" id="{BFACE21C-FDA1-4E38-9915-1A9992228784}"/>
+                <a16:creationId xmlns:a16="http://schemas.microsoft.com/office/drawing/2014/main" id="{BFACE21C-FDA1-4E38-9915-1A9992228784}"/>
               </a:ext>
             </a:extLst>
           </p:cNvPr>
@@ -3139,7 +3095,7 @@
           <p:cNvPr id="2" name="Date Placeholder 1">
             <a:extLst>
               <a:ext uri="{FF2B5EF4-FFF2-40B4-BE49-F238E27FC236}">
-                <a16:creationId xmlns="" xmlns:a16="http://schemas.microsoft.com/office/drawing/2014/main" id="{5DB6FE37-88E5-4B47-9ADD-1ED945C770EE}"/>
+                <a16:creationId xmlns:a16="http://schemas.microsoft.com/office/drawing/2014/main" id="{5DB6FE37-88E5-4B47-9ADD-1ED945C770EE}"/>
               </a:ext>
             </a:extLst>
           </p:cNvPr>
@@ -3157,7 +3113,7 @@
           <a:p>
             <a:fld id="{8213B8F1-4FA8-4032-AA8A-75E99188CEDC}" type="datetimeFigureOut">
               <a:rPr lang="en-GB" smtClean="0"/>
-              <a:t>23/09/2019</a:t>
+              <a:t>25/09/2019</a:t>
             </a:fld>
             <a:endParaRPr lang="en-GB"/>
           </a:p>
@@ -3168,7 +3124,7 @@
           <p:cNvPr id="3" name="Footer Placeholder 2">
             <a:extLst>
               <a:ext uri="{FF2B5EF4-FFF2-40B4-BE49-F238E27FC236}">
-                <a16:creationId xmlns="" xmlns:a16="http://schemas.microsoft.com/office/drawing/2014/main" id="{403ECF62-4B40-486D-933D-8C7150E3D5E6}"/>
+                <a16:creationId xmlns:a16="http://schemas.microsoft.com/office/drawing/2014/main" id="{403ECF62-4B40-486D-933D-8C7150E3D5E6}"/>
               </a:ext>
             </a:extLst>
           </p:cNvPr>
@@ -3193,7 +3149,7 @@
           <p:cNvPr id="4" name="Slide Number Placeholder 3">
             <a:extLst>
               <a:ext uri="{FF2B5EF4-FFF2-40B4-BE49-F238E27FC236}">
-                <a16:creationId xmlns="" xmlns:a16="http://schemas.microsoft.com/office/drawing/2014/main" id="{70753508-4527-4668-9E1E-B293F0CDC7E0}"/>
+                <a16:creationId xmlns:a16="http://schemas.microsoft.com/office/drawing/2014/main" id="{70753508-4527-4668-9E1E-B293F0CDC7E0}"/>
               </a:ext>
             </a:extLst>
           </p:cNvPr>
@@ -3252,7 +3208,7 @@
           <p:cNvPr id="2" name="Title 1">
             <a:extLst>
               <a:ext uri="{FF2B5EF4-FFF2-40B4-BE49-F238E27FC236}">
-                <a16:creationId xmlns="" xmlns:a16="http://schemas.microsoft.com/office/drawing/2014/main" id="{DC4C9377-0281-4C76-BE19-A8C4C8C3FC22}"/>
+                <a16:creationId xmlns:a16="http://schemas.microsoft.com/office/drawing/2014/main" id="{DC4C9377-0281-4C76-BE19-A8C4C8C3FC22}"/>
               </a:ext>
             </a:extLst>
           </p:cNvPr>
@@ -3290,7 +3246,7 @@
           <p:cNvPr id="3" name="Content Placeholder 2">
             <a:extLst>
               <a:ext uri="{FF2B5EF4-FFF2-40B4-BE49-F238E27FC236}">
-                <a16:creationId xmlns="" xmlns:a16="http://schemas.microsoft.com/office/drawing/2014/main" id="{A07F3FA1-1FBB-48D6-9891-B0597D953729}"/>
+                <a16:creationId xmlns:a16="http://schemas.microsoft.com/office/drawing/2014/main" id="{A07F3FA1-1FBB-48D6-9891-B0597D953729}"/>
               </a:ext>
             </a:extLst>
           </p:cNvPr>
@@ -3381,7 +3337,7 @@
           <p:cNvPr id="4" name="Text Placeholder 3">
             <a:extLst>
               <a:ext uri="{FF2B5EF4-FFF2-40B4-BE49-F238E27FC236}">
-                <a16:creationId xmlns="" xmlns:a16="http://schemas.microsoft.com/office/drawing/2014/main" id="{231115EA-5FCB-4A15-8B0E-36A3CD0FF1C4}"/>
+                <a16:creationId xmlns:a16="http://schemas.microsoft.com/office/drawing/2014/main" id="{231115EA-5FCB-4A15-8B0E-36A3CD0FF1C4}"/>
               </a:ext>
             </a:extLst>
           </p:cNvPr>
@@ -3452,7 +3408,7 @@
           <p:cNvPr id="5" name="Date Placeholder 4">
             <a:extLst>
               <a:ext uri="{FF2B5EF4-FFF2-40B4-BE49-F238E27FC236}">
-                <a16:creationId xmlns="" xmlns:a16="http://schemas.microsoft.com/office/drawing/2014/main" id="{48395D86-3296-4EBF-B150-1CD8C5780387}"/>
+                <a16:creationId xmlns:a16="http://schemas.microsoft.com/office/drawing/2014/main" id="{48395D86-3296-4EBF-B150-1CD8C5780387}"/>
               </a:ext>
             </a:extLst>
           </p:cNvPr>
@@ -3470,7 +3426,7 @@
           <a:p>
             <a:fld id="{8213B8F1-4FA8-4032-AA8A-75E99188CEDC}" type="datetimeFigureOut">
               <a:rPr lang="en-GB" smtClean="0"/>
-              <a:t>23/09/2019</a:t>
+              <a:t>25/09/2019</a:t>
             </a:fld>
             <a:endParaRPr lang="en-GB"/>
           </a:p>
@@ -3481,7 +3437,7 @@
           <p:cNvPr id="6" name="Footer Placeholder 5">
             <a:extLst>
               <a:ext uri="{FF2B5EF4-FFF2-40B4-BE49-F238E27FC236}">
-                <a16:creationId xmlns="" xmlns:a16="http://schemas.microsoft.com/office/drawing/2014/main" id="{C511DB44-D2CE-44CD-A77B-033062A5B0D9}"/>
+                <a16:creationId xmlns:a16="http://schemas.microsoft.com/office/drawing/2014/main" id="{C511DB44-D2CE-44CD-A77B-033062A5B0D9}"/>
               </a:ext>
             </a:extLst>
           </p:cNvPr>
@@ -3506,7 +3462,7 @@
           <p:cNvPr id="7" name="Slide Number Placeholder 6">
             <a:extLst>
               <a:ext uri="{FF2B5EF4-FFF2-40B4-BE49-F238E27FC236}">
-                <a16:creationId xmlns="" xmlns:a16="http://schemas.microsoft.com/office/drawing/2014/main" id="{1EDF7FDE-2F2D-4158-A9B8-2F45231FBEA1}"/>
+                <a16:creationId xmlns:a16="http://schemas.microsoft.com/office/drawing/2014/main" id="{1EDF7FDE-2F2D-4158-A9B8-2F45231FBEA1}"/>
               </a:ext>
             </a:extLst>
           </p:cNvPr>
@@ -3565,7 +3521,7 @@
           <p:cNvPr id="2" name="Title 1">
             <a:extLst>
               <a:ext uri="{FF2B5EF4-FFF2-40B4-BE49-F238E27FC236}">
-                <a16:creationId xmlns="" xmlns:a16="http://schemas.microsoft.com/office/drawing/2014/main" id="{75FF1457-A9A0-450F-896C-6EEAA634D3B1}"/>
+                <a16:creationId xmlns:a16="http://schemas.microsoft.com/office/drawing/2014/main" id="{75FF1457-A9A0-450F-896C-6EEAA634D3B1}"/>
               </a:ext>
             </a:extLst>
           </p:cNvPr>
@@ -3603,7 +3559,7 @@
           <p:cNvPr id="3" name="Picture Placeholder 2">
             <a:extLst>
               <a:ext uri="{FF2B5EF4-FFF2-40B4-BE49-F238E27FC236}">
-                <a16:creationId xmlns="" xmlns:a16="http://schemas.microsoft.com/office/drawing/2014/main" id="{6164A345-6822-4F47-89F6-7BC05355345A}"/>
+                <a16:creationId xmlns:a16="http://schemas.microsoft.com/office/drawing/2014/main" id="{6164A345-6822-4F47-89F6-7BC05355345A}"/>
               </a:ext>
             </a:extLst>
           </p:cNvPr>
@@ -3670,7 +3626,7 @@
           <p:cNvPr id="4" name="Text Placeholder 3">
             <a:extLst>
               <a:ext uri="{FF2B5EF4-FFF2-40B4-BE49-F238E27FC236}">
-                <a16:creationId xmlns="" xmlns:a16="http://schemas.microsoft.com/office/drawing/2014/main" id="{ABCE6FDB-C326-4723-9D4D-23AC6DBB1682}"/>
+                <a16:creationId xmlns:a16="http://schemas.microsoft.com/office/drawing/2014/main" id="{ABCE6FDB-C326-4723-9D4D-23AC6DBB1682}"/>
               </a:ext>
             </a:extLst>
           </p:cNvPr>
@@ -3741,7 +3697,7 @@
           <p:cNvPr id="5" name="Date Placeholder 4">
             <a:extLst>
               <a:ext uri="{FF2B5EF4-FFF2-40B4-BE49-F238E27FC236}">
-                <a16:creationId xmlns="" xmlns:a16="http://schemas.microsoft.com/office/drawing/2014/main" id="{C4CDD1DD-4547-4AE5-9171-9CCEA0D78477}"/>
+                <a16:creationId xmlns:a16="http://schemas.microsoft.com/office/drawing/2014/main" id="{C4CDD1DD-4547-4AE5-9171-9CCEA0D78477}"/>
               </a:ext>
             </a:extLst>
           </p:cNvPr>
@@ -3759,7 +3715,7 @@
           <a:p>
             <a:fld id="{8213B8F1-4FA8-4032-AA8A-75E99188CEDC}" type="datetimeFigureOut">
               <a:rPr lang="en-GB" smtClean="0"/>
-              <a:t>23/09/2019</a:t>
+              <a:t>25/09/2019</a:t>
             </a:fld>
             <a:endParaRPr lang="en-GB"/>
           </a:p>
@@ -3770,7 +3726,7 @@
           <p:cNvPr id="6" name="Footer Placeholder 5">
             <a:extLst>
               <a:ext uri="{FF2B5EF4-FFF2-40B4-BE49-F238E27FC236}">
-                <a16:creationId xmlns="" xmlns:a16="http://schemas.microsoft.com/office/drawing/2014/main" id="{7565A681-C324-487B-8F18-1C939E669988}"/>
+                <a16:creationId xmlns:a16="http://schemas.microsoft.com/office/drawing/2014/main" id="{7565A681-C324-487B-8F18-1C939E669988}"/>
               </a:ext>
             </a:extLst>
           </p:cNvPr>
@@ -3795,7 +3751,7 @@
           <p:cNvPr id="7" name="Slide Number Placeholder 6">
             <a:extLst>
               <a:ext uri="{FF2B5EF4-FFF2-40B4-BE49-F238E27FC236}">
-                <a16:creationId xmlns="" xmlns:a16="http://schemas.microsoft.com/office/drawing/2014/main" id="{404D1DDA-1BD5-4E14-92E7-0E0F1313A3E1}"/>
+                <a16:creationId xmlns:a16="http://schemas.microsoft.com/office/drawing/2014/main" id="{404D1DDA-1BD5-4E14-92E7-0E0F1313A3E1}"/>
               </a:ext>
             </a:extLst>
           </p:cNvPr>
@@ -3859,7 +3815,7 @@
           <p:cNvPr id="2" name="Title Placeholder 1">
             <a:extLst>
               <a:ext uri="{FF2B5EF4-FFF2-40B4-BE49-F238E27FC236}">
-                <a16:creationId xmlns="" xmlns:a16="http://schemas.microsoft.com/office/drawing/2014/main" id="{C818B69C-8AEC-4CA3-8FBD-33FD461A10B2}"/>
+                <a16:creationId xmlns:a16="http://schemas.microsoft.com/office/drawing/2014/main" id="{C818B69C-8AEC-4CA3-8FBD-33FD461A10B2}"/>
               </a:ext>
             </a:extLst>
           </p:cNvPr>
@@ -3898,7 +3854,7 @@
           <p:cNvPr id="3" name="Text Placeholder 2">
             <a:extLst>
               <a:ext uri="{FF2B5EF4-FFF2-40B4-BE49-F238E27FC236}">
-                <a16:creationId xmlns="" xmlns:a16="http://schemas.microsoft.com/office/drawing/2014/main" id="{CACE0EA0-4115-444B-9A7B-6A79EF96CA39}"/>
+                <a16:creationId xmlns:a16="http://schemas.microsoft.com/office/drawing/2014/main" id="{CACE0EA0-4115-444B-9A7B-6A79EF96CA39}"/>
               </a:ext>
             </a:extLst>
           </p:cNvPr>
@@ -3966,7 +3922,7 @@
           <p:cNvPr id="4" name="Date Placeholder 3">
             <a:extLst>
               <a:ext uri="{FF2B5EF4-FFF2-40B4-BE49-F238E27FC236}">
-                <a16:creationId xmlns="" xmlns:a16="http://schemas.microsoft.com/office/drawing/2014/main" id="{E09A6724-D2BE-48EB-A284-17505879D6C1}"/>
+                <a16:creationId xmlns:a16="http://schemas.microsoft.com/office/drawing/2014/main" id="{E09A6724-D2BE-48EB-A284-17505879D6C1}"/>
               </a:ext>
             </a:extLst>
           </p:cNvPr>
@@ -4002,7 +3958,7 @@
           <a:p>
             <a:fld id="{8213B8F1-4FA8-4032-AA8A-75E99188CEDC}" type="datetimeFigureOut">
               <a:rPr lang="en-GB" smtClean="0"/>
-              <a:t>23/09/2019</a:t>
+              <a:t>25/09/2019</a:t>
             </a:fld>
             <a:endParaRPr lang="en-GB"/>
           </a:p>
@@ -4013,7 +3969,7 @@
           <p:cNvPr id="5" name="Footer Placeholder 4">
             <a:extLst>
               <a:ext uri="{FF2B5EF4-FFF2-40B4-BE49-F238E27FC236}">
-                <a16:creationId xmlns="" xmlns:a16="http://schemas.microsoft.com/office/drawing/2014/main" id="{C591376B-2C18-4AF7-B380-97663C632EFD}"/>
+                <a16:creationId xmlns:a16="http://schemas.microsoft.com/office/drawing/2014/main" id="{C591376B-2C18-4AF7-B380-97663C632EFD}"/>
               </a:ext>
             </a:extLst>
           </p:cNvPr>
@@ -4056,7 +4012,7 @@
           <p:cNvPr id="6" name="Slide Number Placeholder 5">
             <a:extLst>
               <a:ext uri="{FF2B5EF4-FFF2-40B4-BE49-F238E27FC236}">
-                <a16:creationId xmlns="" xmlns:a16="http://schemas.microsoft.com/office/drawing/2014/main" id="{72FFCF1F-BC9C-4E6D-BB0B-8744C16DEAE4}"/>
+                <a16:creationId xmlns:a16="http://schemas.microsoft.com/office/drawing/2014/main" id="{72FFCF1F-BC9C-4E6D-BB0B-8744C16DEAE4}"/>
               </a:ext>
             </a:extLst>
           </p:cNvPr>
@@ -4424,7 +4380,7 @@
           <p:cNvPr id="2" name="Title 1">
             <a:extLst>
               <a:ext uri="{FF2B5EF4-FFF2-40B4-BE49-F238E27FC236}">
-                <a16:creationId xmlns="" xmlns:a16="http://schemas.microsoft.com/office/drawing/2014/main" id="{351E99D9-5BBC-49D3-8755-D102E4EF7FDB}"/>
+                <a16:creationId xmlns:a16="http://schemas.microsoft.com/office/drawing/2014/main" id="{351E99D9-5BBC-49D3-8755-D102E4EF7FDB}"/>
               </a:ext>
             </a:extLst>
           </p:cNvPr>
@@ -4465,7 +4421,7 @@
           <p:cNvPr id="6" name="Flowchart: Alternate Process 5">
             <a:extLst>
               <a:ext uri="{FF2B5EF4-FFF2-40B4-BE49-F238E27FC236}">
-                <a16:creationId xmlns="" xmlns:a16="http://schemas.microsoft.com/office/drawing/2014/main" id="{E50ED68C-86EC-4071-BFF4-2618BA705745}"/>
+                <a16:creationId xmlns:a16="http://schemas.microsoft.com/office/drawing/2014/main" id="{E50ED68C-86EC-4071-BFF4-2618BA705745}"/>
               </a:ext>
             </a:extLst>
           </p:cNvPr>
@@ -4514,7 +4470,7 @@
           <p:cNvPr id="7" name="Flowchart: Alternate Process 6">
             <a:extLst>
               <a:ext uri="{FF2B5EF4-FFF2-40B4-BE49-F238E27FC236}">
-                <a16:creationId xmlns="" xmlns:a16="http://schemas.microsoft.com/office/drawing/2014/main" id="{DA9A838E-A9F0-47AA-96AE-D742D1BBE926}"/>
+                <a16:creationId xmlns:a16="http://schemas.microsoft.com/office/drawing/2014/main" id="{DA9A838E-A9F0-47AA-96AE-D742D1BBE926}"/>
               </a:ext>
             </a:extLst>
           </p:cNvPr>
@@ -4563,7 +4519,7 @@
           <p:cNvPr id="12" name="Flowchart: Alternate Process 11">
             <a:extLst>
               <a:ext uri="{FF2B5EF4-FFF2-40B4-BE49-F238E27FC236}">
-                <a16:creationId xmlns="" xmlns:a16="http://schemas.microsoft.com/office/drawing/2014/main" id="{B7E2B5BD-31AB-4FEB-843A-CF8511E26A1A}"/>
+                <a16:creationId xmlns:a16="http://schemas.microsoft.com/office/drawing/2014/main" id="{B7E2B5BD-31AB-4FEB-843A-CF8511E26A1A}"/>
               </a:ext>
             </a:extLst>
           </p:cNvPr>
@@ -4607,15 +4563,7 @@
             <a:pPr algn="ctr"/>
             <a:r>
               <a:rPr lang="en-GB" sz="1400" dirty="0"/>
-              <a:t>Paper describing how </a:t>
-            </a:r>
-            <a:r>
-              <a:rPr lang="en-GB" sz="1400" dirty="0" smtClean="0"/>
-              <a:t>subtypes </a:t>
-            </a:r>
-            <a:r>
-              <a:rPr lang="en-GB" sz="1400" dirty="0"/>
-              <a:t>can be distinguished using computational analysis of RT-</a:t>
+              <a:t>Paper describing how subtypes can be distinguished using computational analysis of RT-</a:t>
             </a:r>
             <a:r>
               <a:rPr lang="en-GB" sz="1400" dirty="0" err="1"/>
@@ -4623,13 +4571,8 @@
             </a:r>
             <a:r>
               <a:rPr lang="en-GB" sz="1400" dirty="0"/>
-              <a:t> </a:t>
-            </a:r>
-            <a:r>
-              <a:rPr lang="en-GB" sz="1400" dirty="0" smtClean="0"/>
-              <a:t>data</a:t>
-            </a:r>
-            <a:endParaRPr lang="en-GB" sz="1400" dirty="0"/>
+              <a:t> data</a:t>
+            </a:r>
           </a:p>
         </p:txBody>
       </p:sp>
@@ -4638,7 +4581,7 @@
           <p:cNvPr id="13" name="Flowchart: Alternate Process 12">
             <a:extLst>
               <a:ext uri="{FF2B5EF4-FFF2-40B4-BE49-F238E27FC236}">
-                <a16:creationId xmlns="" xmlns:a16="http://schemas.microsoft.com/office/drawing/2014/main" id="{FE5BE73E-48CF-451A-A787-D80042DAA6BF}"/>
+                <a16:creationId xmlns:a16="http://schemas.microsoft.com/office/drawing/2014/main" id="{FE5BE73E-48CF-451A-A787-D80042DAA6BF}"/>
               </a:ext>
             </a:extLst>
           </p:cNvPr>
@@ -4692,7 +4635,7 @@
           <p:cNvPr id="14" name="Flowchart: Alternate Process 13">
             <a:extLst>
               <a:ext uri="{FF2B5EF4-FFF2-40B4-BE49-F238E27FC236}">
-                <a16:creationId xmlns="" xmlns:a16="http://schemas.microsoft.com/office/drawing/2014/main" id="{65F07737-22D7-4BCD-8967-2CF9EABD27C2}"/>
+                <a16:creationId xmlns:a16="http://schemas.microsoft.com/office/drawing/2014/main" id="{65F07737-22D7-4BCD-8967-2CF9EABD27C2}"/>
               </a:ext>
             </a:extLst>
           </p:cNvPr>
@@ -4741,7 +4684,7 @@
           <p:cNvPr id="15" name="Flowchart: Alternate Process 14">
             <a:extLst>
               <a:ext uri="{FF2B5EF4-FFF2-40B4-BE49-F238E27FC236}">
-                <a16:creationId xmlns="" xmlns:a16="http://schemas.microsoft.com/office/drawing/2014/main" id="{84B9D0E4-53E1-49A9-9D13-1760C6A7E042}"/>
+                <a16:creationId xmlns:a16="http://schemas.microsoft.com/office/drawing/2014/main" id="{84B9D0E4-53E1-49A9-9D13-1760C6A7E042}"/>
               </a:ext>
             </a:extLst>
           </p:cNvPr>
@@ -4790,7 +4733,7 @@
           <p:cNvPr id="44" name="Arrow: Up 43">
             <a:extLst>
               <a:ext uri="{FF2B5EF4-FFF2-40B4-BE49-F238E27FC236}">
-                <a16:creationId xmlns="" xmlns:a16="http://schemas.microsoft.com/office/drawing/2014/main" id="{2E50A4B3-FB18-413B-88D4-D22CC847654E}"/>
+                <a16:creationId xmlns:a16="http://schemas.microsoft.com/office/drawing/2014/main" id="{2E50A4B3-FB18-413B-88D4-D22CC847654E}"/>
               </a:ext>
             </a:extLst>
           </p:cNvPr>
@@ -4844,7 +4787,7 @@
           <p:cNvPr id="16" name="Flowchart: Alternate Process 15">
             <a:extLst>
               <a:ext uri="{FF2B5EF4-FFF2-40B4-BE49-F238E27FC236}">
-                <a16:creationId xmlns="" xmlns:a16="http://schemas.microsoft.com/office/drawing/2014/main" id="{FE5BE73E-48CF-451A-A787-D80042DAA6BF}"/>
+                <a16:creationId xmlns:a16="http://schemas.microsoft.com/office/drawing/2014/main" id="{FE5BE73E-48CF-451A-A787-D80042DAA6BF}"/>
               </a:ext>
             </a:extLst>
           </p:cNvPr>
@@ -4881,20 +4824,8 @@
           <a:lstStyle/>
           <a:p>
             <a:r>
-              <a:rPr lang="en-GB" sz="1400" dirty="0" smtClean="0"/>
-              <a:t>Design </a:t>
-            </a:r>
-            <a:r>
               <a:rPr lang="en-GB" sz="1400" dirty="0"/>
-              <a:t>method for regression to </a:t>
-            </a:r>
-            <a:r>
-              <a:rPr lang="en-GB" sz="1400" dirty="0" smtClean="0"/>
-              <a:t>obtain features </a:t>
-            </a:r>
-            <a:r>
-              <a:rPr lang="en-GB" sz="1400" dirty="0"/>
-              <a:t>a, b, c, d for </a:t>
+              <a:t>Design method for regression to obtain features a, b, c, d for </a:t>
             </a:r>
             <a:r>
               <a:rPr lang="en-GB" sz="1400" dirty="0">
@@ -4917,7 +4848,7 @@
           <p:cNvPr id="42" name="Flowchart: Alternate Process 41">
             <a:extLst>
               <a:ext uri="{FF2B5EF4-FFF2-40B4-BE49-F238E27FC236}">
-                <a16:creationId xmlns="" xmlns:a16="http://schemas.microsoft.com/office/drawing/2014/main" id="{DA9A838E-A9F0-47AA-96AE-D742D1BBE926}"/>
+                <a16:creationId xmlns:a16="http://schemas.microsoft.com/office/drawing/2014/main" id="{DA9A838E-A9F0-47AA-96AE-D742D1BBE926}"/>
               </a:ext>
             </a:extLst>
           </p:cNvPr>
@@ -4960,11 +4891,11 @@
           <a:p>
             <a:pPr algn="ctr"/>
             <a:r>
-              <a:rPr lang="en-GB" sz="1400" dirty="0" smtClean="0"/>
+              <a:rPr lang="en-GB" sz="1400" dirty="0"/>
               <a:t>Upload as module onto </a:t>
             </a:r>
             <a:r>
-              <a:rPr lang="en-GB" sz="1400" dirty="0" err="1" smtClean="0"/>
+              <a:rPr lang="en-GB" sz="1400" dirty="0" err="1"/>
               <a:t>PyPI</a:t>
             </a:r>
             <a:endParaRPr lang="en-GB" sz="1400" dirty="0"/>
@@ -4976,7 +4907,7 @@
           <p:cNvPr id="17" name="Flowchart: Alternate Process 16">
             <a:extLst>
               <a:ext uri="{FF2B5EF4-FFF2-40B4-BE49-F238E27FC236}">
-                <a16:creationId xmlns="" xmlns:a16="http://schemas.microsoft.com/office/drawing/2014/main" id="{84B9D0E4-53E1-49A9-9D13-1760C6A7E042}"/>
+                <a16:creationId xmlns:a16="http://schemas.microsoft.com/office/drawing/2014/main" id="{84B9D0E4-53E1-49A9-9D13-1760C6A7E042}"/>
               </a:ext>
             </a:extLst>
           </p:cNvPr>
@@ -5014,11 +4945,11 @@
           <a:p>
             <a:pPr algn="ctr"/>
             <a:r>
-              <a:rPr lang="en-GB" sz="1400" dirty="0" smtClean="0"/>
+              <a:rPr lang="en-GB" sz="1400" dirty="0"/>
               <a:t>Use data that I have previously obtained for sCJD vs </a:t>
             </a:r>
             <a:r>
-              <a:rPr lang="en-GB" sz="1400" dirty="0" err="1" smtClean="0"/>
+              <a:rPr lang="en-GB" sz="1400" dirty="0" err="1"/>
               <a:t>iCJD</a:t>
             </a:r>
             <a:endParaRPr lang="en-GB" sz="1400" dirty="0"/>
@@ -5035,13 +4966,6 @@
   <p:clrMapOvr>
     <a:masterClrMapping/>
   </p:clrMapOvr>
-  <p:timing>
-    <p:tnLst>
-      <p:par>
-        <p:cTn id="1" dur="indefinite" restart="never" nodeType="tmRoot"/>
-      </p:par>
-    </p:tnLst>
-  </p:timing>
 </p:sld>
 </file>
 
@@ -5072,22 +4996,68 @@
             <p:ph type="title"/>
           </p:nvPr>
         </p:nvSpPr>
-        <p:spPr/>
+        <p:spPr>
+          <a:xfrm>
+            <a:off x="1127759" y="-190329"/>
+            <a:ext cx="16162147" cy="1455249"/>
+          </a:xfrm>
+        </p:spPr>
         <p:txBody>
           <a:bodyPr/>
           <a:lstStyle/>
           <a:p>
             <a:r>
-              <a:rPr lang="en-GB" dirty="0" smtClean="0"/>
-              <a:t>Assessing RT-</a:t>
-            </a:r>
-            <a:r>
-              <a:rPr lang="en-GB" dirty="0" err="1" smtClean="0"/>
-              <a:t>QuIC</a:t>
-            </a:r>
-            <a:r>
-              <a:rPr lang="en-GB" dirty="0" smtClean="0"/>
-              <a:t> w</a:t>
+              <a:rPr lang="en-GB" dirty="0"/>
+              <a:t>Architecture of the programme</a:t>
+            </a:r>
+          </a:p>
+        </p:txBody>
+      </p:sp>
+      <p:sp>
+        <p:nvSpPr>
+          <p:cNvPr id="4" name="Hexagon 3">
+            <a:extLst>
+              <a:ext uri="{FF2B5EF4-FFF2-40B4-BE49-F238E27FC236}">
+                <a16:creationId xmlns:a16="http://schemas.microsoft.com/office/drawing/2014/main" id="{ED516B17-5B2D-49C4-840A-CA724A2E653F}"/>
+              </a:ext>
+            </a:extLst>
+          </p:cNvPr>
+          <p:cNvSpPr/>
+          <p:nvPr/>
+        </p:nvSpPr>
+        <p:spPr>
+          <a:xfrm>
+            <a:off x="5669570" y="3143645"/>
+            <a:ext cx="2236111" cy="1915935"/>
+          </a:xfrm>
+          <a:prstGeom prst="hexagon">
+            <a:avLst/>
+          </a:prstGeom>
+        </p:spPr>
+        <p:style>
+          <a:lnRef idx="2">
+            <a:schemeClr val="accent1">
+              <a:shade val="50000"/>
+            </a:schemeClr>
+          </a:lnRef>
+          <a:fillRef idx="1">
+            <a:schemeClr val="accent1"/>
+          </a:fillRef>
+          <a:effectRef idx="0">
+            <a:schemeClr val="accent1"/>
+          </a:effectRef>
+          <a:fontRef idx="minor">
+            <a:schemeClr val="lt1"/>
+          </a:fontRef>
+        </p:style>
+        <p:txBody>
+          <a:bodyPr rtlCol="0" anchor="ctr"/>
+          <a:lstStyle/>
+          <a:p>
+            <a:pPr algn="ctr"/>
+            <a:r>
+              <a:rPr lang="en-GB" sz="1600" dirty="0" err="1"/>
+              <a:t>DataExpresser</a:t>
             </a:r>
             <a:endParaRPr lang="en-GB" dirty="0"/>
           </a:p>
@@ -5095,20 +5065,263 @@
       </p:sp>
       <p:sp>
         <p:nvSpPr>
-          <p:cNvPr id="3" name="Content Placeholder 2"/>
-          <p:cNvSpPr>
-            <a:spLocks noGrp="1"/>
-          </p:cNvSpPr>
-          <p:nvPr>
-            <p:ph idx="1"/>
-          </p:nvPr>
-        </p:nvSpPr>
-        <p:spPr/>
-        <p:txBody>
-          <a:bodyPr/>
-          <a:lstStyle/>
-          <a:p>
-            <a:endParaRPr lang="en-GB"/>
+          <p:cNvPr id="5" name="Hexagon 4">
+            <a:extLst>
+              <a:ext uri="{FF2B5EF4-FFF2-40B4-BE49-F238E27FC236}">
+                <a16:creationId xmlns:a16="http://schemas.microsoft.com/office/drawing/2014/main" id="{EA89B7BB-A7DA-4C8D-A583-70E0A72C10D5}"/>
+              </a:ext>
+            </a:extLst>
+          </p:cNvPr>
+          <p:cNvSpPr/>
+          <p:nvPr/>
+        </p:nvSpPr>
+        <p:spPr>
+          <a:xfrm>
+            <a:off x="7660377" y="4174426"/>
+            <a:ext cx="2236111" cy="1915935"/>
+          </a:xfrm>
+          <a:prstGeom prst="hexagon">
+            <a:avLst/>
+          </a:prstGeom>
+        </p:spPr>
+        <p:style>
+          <a:lnRef idx="2">
+            <a:schemeClr val="accent1">
+              <a:shade val="50000"/>
+            </a:schemeClr>
+          </a:lnRef>
+          <a:fillRef idx="1">
+            <a:schemeClr val="accent1"/>
+          </a:fillRef>
+          <a:effectRef idx="0">
+            <a:schemeClr val="accent1"/>
+          </a:effectRef>
+          <a:fontRef idx="minor">
+            <a:schemeClr val="lt1"/>
+          </a:fontRef>
+        </p:style>
+        <p:txBody>
+          <a:bodyPr rtlCol="0" anchor="ctr"/>
+          <a:lstStyle/>
+          <a:p>
+            <a:pPr algn="ctr"/>
+            <a:r>
+              <a:rPr lang="en-GB" dirty="0" err="1"/>
+              <a:t>RowAnalyser</a:t>
+            </a:r>
+            <a:endParaRPr lang="en-GB" dirty="0"/>
+          </a:p>
+          <a:p>
+            <a:pPr algn="ctr"/>
+            <a:r>
+              <a:rPr lang="en-GB" dirty="0" err="1"/>
+              <a:t>getRowMax</a:t>
+            </a:r>
+            <a:r>
+              <a:rPr lang="en-GB" dirty="0"/>
+              <a:t>()</a:t>
+            </a:r>
+          </a:p>
+          <a:p>
+            <a:pPr algn="ctr"/>
+            <a:r>
+              <a:rPr lang="en-GB" dirty="0"/>
+              <a:t>Etc, etc</a:t>
+            </a:r>
+          </a:p>
+        </p:txBody>
+      </p:sp>
+      <p:sp>
+        <p:nvSpPr>
+          <p:cNvPr id="6" name="Hexagon 5">
+            <a:extLst>
+              <a:ext uri="{FF2B5EF4-FFF2-40B4-BE49-F238E27FC236}">
+                <a16:creationId xmlns:a16="http://schemas.microsoft.com/office/drawing/2014/main" id="{BA49DE4D-BAD3-4F72-A44D-B28267AF92DC}"/>
+              </a:ext>
+            </a:extLst>
+          </p:cNvPr>
+          <p:cNvSpPr/>
+          <p:nvPr/>
+        </p:nvSpPr>
+        <p:spPr>
+          <a:xfrm>
+            <a:off x="3671099" y="2023935"/>
+            <a:ext cx="2236111" cy="1915935"/>
+          </a:xfrm>
+          <a:prstGeom prst="hexagon">
+            <a:avLst/>
+          </a:prstGeom>
+        </p:spPr>
+        <p:style>
+          <a:lnRef idx="2">
+            <a:schemeClr val="accent1">
+              <a:shade val="50000"/>
+            </a:schemeClr>
+          </a:lnRef>
+          <a:fillRef idx="1">
+            <a:schemeClr val="accent1"/>
+          </a:fillRef>
+          <a:effectRef idx="0">
+            <a:schemeClr val="accent1"/>
+          </a:effectRef>
+          <a:fontRef idx="minor">
+            <a:schemeClr val="lt1"/>
+          </a:fontRef>
+        </p:style>
+        <p:txBody>
+          <a:bodyPr rtlCol="0" anchor="ctr"/>
+          <a:lstStyle/>
+          <a:p>
+            <a:pPr algn="ctr"/>
+            <a:r>
+              <a:rPr lang="en-GB" sz="2000" dirty="0" err="1"/>
+              <a:t>RTQuiCSheet</a:t>
+            </a:r>
+            <a:endParaRPr lang="en-GB" sz="2000" dirty="0"/>
+          </a:p>
+          <a:p>
+            <a:pPr algn="ctr"/>
+            <a:r>
+              <a:rPr lang="en-GB" dirty="0" err="1"/>
+              <a:t>getSheet</a:t>
+            </a:r>
+            <a:r>
+              <a:rPr lang="en-GB" dirty="0"/>
+              <a:t>()</a:t>
+            </a:r>
+          </a:p>
+        </p:txBody>
+      </p:sp>
+      <p:sp>
+        <p:nvSpPr>
+          <p:cNvPr id="7" name="Hexagon 6">
+            <a:extLst>
+              <a:ext uri="{FF2B5EF4-FFF2-40B4-BE49-F238E27FC236}">
+                <a16:creationId xmlns:a16="http://schemas.microsoft.com/office/drawing/2014/main" id="{F8AF4FCF-1E5E-496C-B719-D51B1362C90B}"/>
+              </a:ext>
+            </a:extLst>
+          </p:cNvPr>
+          <p:cNvSpPr/>
+          <p:nvPr/>
+        </p:nvSpPr>
+        <p:spPr>
+          <a:xfrm>
+            <a:off x="3678763" y="4174426"/>
+            <a:ext cx="2236111" cy="1915935"/>
+          </a:xfrm>
+          <a:prstGeom prst="hexagon">
+            <a:avLst/>
+          </a:prstGeom>
+        </p:spPr>
+        <p:style>
+          <a:lnRef idx="2">
+            <a:schemeClr val="accent1">
+              <a:shade val="50000"/>
+            </a:schemeClr>
+          </a:lnRef>
+          <a:fillRef idx="1">
+            <a:schemeClr val="accent1"/>
+          </a:fillRef>
+          <a:effectRef idx="0">
+            <a:schemeClr val="accent1"/>
+          </a:effectRef>
+          <a:fontRef idx="minor">
+            <a:schemeClr val="lt1"/>
+          </a:fontRef>
+        </p:style>
+        <p:txBody>
+          <a:bodyPr rtlCol="0" anchor="ctr"/>
+          <a:lstStyle/>
+          <a:p>
+            <a:pPr algn="ctr"/>
+            <a:r>
+              <a:rPr lang="en-GB" dirty="0" err="1"/>
+              <a:t>DataAnalyser</a:t>
+            </a:r>
+            <a:endParaRPr lang="en-GB" dirty="0"/>
+          </a:p>
+          <a:p>
+            <a:pPr algn="ctr"/>
+            <a:r>
+              <a:rPr lang="en-GB" dirty="0" err="1"/>
+              <a:t>getMean</a:t>
+            </a:r>
+            <a:r>
+              <a:rPr lang="en-GB" dirty="0"/>
+              <a:t> ()</a:t>
+            </a:r>
+          </a:p>
+          <a:p>
+            <a:pPr algn="ctr"/>
+            <a:r>
+              <a:rPr lang="en-GB" dirty="0" err="1"/>
+              <a:t>getStd</a:t>
+            </a:r>
+            <a:r>
+              <a:rPr lang="en-GB" dirty="0"/>
+              <a:t>()</a:t>
+            </a:r>
+          </a:p>
+          <a:p>
+            <a:pPr algn="ctr"/>
+            <a:r>
+              <a:rPr lang="en-GB" dirty="0" err="1"/>
+              <a:t>getLabel</a:t>
+            </a:r>
+            <a:r>
+              <a:rPr lang="en-GB" dirty="0"/>
+              <a:t>()</a:t>
+            </a:r>
+          </a:p>
+        </p:txBody>
+      </p:sp>
+      <p:sp>
+        <p:nvSpPr>
+          <p:cNvPr id="8" name="Hexagon 7">
+            <a:extLst>
+              <a:ext uri="{FF2B5EF4-FFF2-40B4-BE49-F238E27FC236}">
+                <a16:creationId xmlns:a16="http://schemas.microsoft.com/office/drawing/2014/main" id="{8AA1333C-E419-4FEB-BBEC-0F0F1E525B42}"/>
+              </a:ext>
+            </a:extLst>
+          </p:cNvPr>
+          <p:cNvSpPr/>
+          <p:nvPr/>
+        </p:nvSpPr>
+        <p:spPr>
+          <a:xfrm>
+            <a:off x="7668041" y="2014291"/>
+            <a:ext cx="2236111" cy="1915935"/>
+          </a:xfrm>
+          <a:prstGeom prst="hexagon">
+            <a:avLst/>
+          </a:prstGeom>
+        </p:spPr>
+        <p:style>
+          <a:lnRef idx="2">
+            <a:schemeClr val="accent1">
+              <a:shade val="50000"/>
+            </a:schemeClr>
+          </a:lnRef>
+          <a:fillRef idx="1">
+            <a:schemeClr val="accent1"/>
+          </a:fillRef>
+          <a:effectRef idx="0">
+            <a:schemeClr val="accent1"/>
+          </a:effectRef>
+          <a:fontRef idx="minor">
+            <a:schemeClr val="lt1"/>
+          </a:fontRef>
+        </p:style>
+        <p:txBody>
+          <a:bodyPr rtlCol="0" anchor="ctr"/>
+          <a:lstStyle/>
+          <a:p>
+            <a:pPr algn="ctr"/>
+            <a:r>
+              <a:rPr lang="en-GB" dirty="0" err="1"/>
+              <a:t>RTQuICData</a:t>
+            </a:r>
+            <a:endParaRPr lang="en-GB" dirty="0"/>
           </a:p>
         </p:txBody>
       </p:sp>
@@ -5682,6 +5895,21 @@
 </file>
 
 <file path=customXml/item1.xml><?xml version="1.0" encoding="utf-8"?>
+<p:properties xmlns:p="http://schemas.microsoft.com/office/2006/metadata/properties" xmlns:xsi="http://www.w3.org/2001/XMLSchema-instance" xmlns:pc="http://schemas.microsoft.com/office/infopath/2007/PartnerControls">
+  <documentManagement/>
+</p:properties>
+</file>
+
+<file path=customXml/item2.xml><?xml version="1.0" encoding="utf-8"?>
+<?mso-contentType ?>
+<FormTemplates xmlns="http://schemas.microsoft.com/sharepoint/v3/contenttype/forms">
+  <Display>DocumentLibraryForm</Display>
+  <Edit>DocumentLibraryForm</Edit>
+  <New>DocumentLibraryForm</New>
+</FormTemplates>
+</file>
+
+<file path=customXml/item3.xml><?xml version="1.0" encoding="utf-8"?>
 <ct:contentTypeSchema xmlns:ct="http://schemas.microsoft.com/office/2006/metadata/contentType" xmlns:ma="http://schemas.microsoft.com/office/2006/metadata/properties/metaAttributes" ct:_="" ma:_="" ma:contentTypeName="Document" ma:contentTypeID="0x010100BD040C1824D65149AC9B1FD660D8A3F1" ma:contentTypeVersion="11" ma:contentTypeDescription="Create a new document." ma:contentTypeScope="" ma:versionID="3c3f67249dc6be545a15595bcfbff70f">
   <xsd:schema xmlns:xsd="http://www.w3.org/2001/XMLSchema" xmlns:xs="http://www.w3.org/2001/XMLSchema" xmlns:p="http://schemas.microsoft.com/office/2006/metadata/properties" xmlns:ns3="97b682e7-e3ed-4854-817b-0fce634c2d8e" xmlns:ns4="99209309-3759-4f51-932e-9315a7d88f37" targetNamespace="http://schemas.microsoft.com/office/2006/metadata/properties" ma:root="true" ma:fieldsID="878f822e268caf5dc395cee3d0d9cbd5" ns3:_="" ns4:_="">
     <xsd:import namespace="97b682e7-e3ed-4854-817b-0fce634c2d8e"/>
@@ -5890,22 +6118,32 @@
 </ct:contentTypeSchema>
 </file>
 
-<file path=customXml/item2.xml><?xml version="1.0" encoding="utf-8"?>
-<?mso-contentType ?>
-<FormTemplates xmlns="http://schemas.microsoft.com/sharepoint/v3/contenttype/forms">
-  <Display>DocumentLibraryForm</Display>
-  <Edit>DocumentLibraryForm</Edit>
-  <New>DocumentLibraryForm</New>
-</FormTemplates>
+<file path=customXml/itemProps1.xml><?xml version="1.0" encoding="utf-8"?>
+<ds:datastoreItem xmlns:ds="http://schemas.openxmlformats.org/officeDocument/2006/customXml" ds:itemID="{653D6C7D-661B-4C18-8F7A-272231617E86}">
+  <ds:schemaRefs>
+    <ds:schemaRef ds:uri="http://schemas.microsoft.com/office/2006/metadata/properties"/>
+    <ds:schemaRef ds:uri="http://purl.org/dc/terms/"/>
+    <ds:schemaRef ds:uri="99209309-3759-4f51-932e-9315a7d88f37"/>
+    <ds:schemaRef ds:uri="http://purl.org/dc/dcmitype/"/>
+    <ds:schemaRef ds:uri="http://schemas.openxmlformats.org/package/2006/metadata/core-properties"/>
+    <ds:schemaRef ds:uri="97b682e7-e3ed-4854-817b-0fce634c2d8e"/>
+    <ds:schemaRef ds:uri="http://schemas.microsoft.com/office/2006/documentManagement/types"/>
+    <ds:schemaRef ds:uri="http://purl.org/dc/elements/1.1/"/>
+    <ds:schemaRef ds:uri="http://schemas.microsoft.com/office/infopath/2007/PartnerControls"/>
+    <ds:schemaRef ds:uri="http://www.w3.org/XML/1998/namespace"/>
+  </ds:schemaRefs>
+</ds:datastoreItem>
 </file>
 
-<file path=customXml/item3.xml><?xml version="1.0" encoding="utf-8"?>
-<p:properties xmlns:p="http://schemas.microsoft.com/office/2006/metadata/properties" xmlns:xsi="http://www.w3.org/2001/XMLSchema-instance" xmlns:pc="http://schemas.microsoft.com/office/infopath/2007/PartnerControls">
-  <documentManagement/>
-</p:properties>
+<file path=customXml/itemProps2.xml><?xml version="1.0" encoding="utf-8"?>
+<ds:datastoreItem xmlns:ds="http://schemas.openxmlformats.org/officeDocument/2006/customXml" ds:itemID="{9471339E-8D97-4F0A-A404-FD3C74C355AE}">
+  <ds:schemaRefs>
+    <ds:schemaRef ds:uri="http://schemas.microsoft.com/sharepoint/v3/contenttype/forms"/>
+  </ds:schemaRefs>
+</ds:datastoreItem>
 </file>
 
-<file path=customXml/itemProps1.xml><?xml version="1.0" encoding="utf-8"?>
+<file path=customXml/itemProps3.xml><?xml version="1.0" encoding="utf-8"?>
 <ds:datastoreItem xmlns:ds="http://schemas.openxmlformats.org/officeDocument/2006/customXml" ds:itemID="{14F43C5B-E0AC-4D67-A5E8-E604DFF31DE7}">
   <ds:schemaRefs>
     <ds:schemaRef ds:uri="http://schemas.microsoft.com/office/2006/metadata/contentType"/>
@@ -5922,29 +6160,4 @@
     <ds:schemaRef ds:uri="http://schemas.microsoft.com/internal/obd"/>
   </ds:schemaRefs>
 </ds:datastoreItem>
-</file>
-
-<file path=customXml/itemProps2.xml><?xml version="1.0" encoding="utf-8"?>
-<ds:datastoreItem xmlns:ds="http://schemas.openxmlformats.org/officeDocument/2006/customXml" ds:itemID="{9471339E-8D97-4F0A-A404-FD3C74C355AE}">
-  <ds:schemaRefs>
-    <ds:schemaRef ds:uri="http://schemas.microsoft.com/sharepoint/v3/contenttype/forms"/>
-  </ds:schemaRefs>
-</ds:datastoreItem>
-</file>
-
-<file path=customXml/itemProps3.xml><?xml version="1.0" encoding="utf-8"?>
-<ds:datastoreItem xmlns:ds="http://schemas.openxmlformats.org/officeDocument/2006/customXml" ds:itemID="{653D6C7D-661B-4C18-8F7A-272231617E86}">
-  <ds:schemaRefs>
-    <ds:schemaRef ds:uri="http://schemas.microsoft.com/office/2006/metadata/properties"/>
-    <ds:schemaRef ds:uri="http://purl.org/dc/terms/"/>
-    <ds:schemaRef ds:uri="99209309-3759-4f51-932e-9315a7d88f37"/>
-    <ds:schemaRef ds:uri="http://purl.org/dc/dcmitype/"/>
-    <ds:schemaRef ds:uri="http://schemas.openxmlformats.org/package/2006/metadata/core-properties"/>
-    <ds:schemaRef ds:uri="97b682e7-e3ed-4854-817b-0fce634c2d8e"/>
-    <ds:schemaRef ds:uri="http://schemas.microsoft.com/office/2006/documentManagement/types"/>
-    <ds:schemaRef ds:uri="http://purl.org/dc/elements/1.1/"/>
-    <ds:schemaRef ds:uri="http://schemas.microsoft.com/office/infopath/2007/PartnerControls"/>
-    <ds:schemaRef ds:uri="http://www.w3.org/XML/1998/namespace"/>
-  </ds:schemaRefs>
-</ds:datastoreItem>
 </file>
</xml_diff>